<commit_message>
Powerpoint: Änderung an den Notizen und Beispielen
</commit_message>
<xml_diff>
--- a/ORGINAL.pptx
+++ b/ORGINAL.pptx
@@ -5,7 +5,7 @@
     <p:sldMasterId id="2147483718" r:id="rId1"/>
   </p:sldMasterIdLst>
   <p:notesMasterIdLst>
-    <p:notesMasterId r:id="rId18"/>
+    <p:notesMasterId r:id="rId15"/>
   </p:notesMasterIdLst>
   <p:sldIdLst>
     <p:sldId id="262" r:id="rId2"/>
@@ -18,12 +18,9 @@
     <p:sldId id="269" r:id="rId9"/>
     <p:sldId id="270" r:id="rId10"/>
     <p:sldId id="271" r:id="rId11"/>
-    <p:sldId id="272" r:id="rId12"/>
-    <p:sldId id="273" r:id="rId13"/>
-    <p:sldId id="274" r:id="rId14"/>
-    <p:sldId id="275" r:id="rId15"/>
-    <p:sldId id="276" r:id="rId16"/>
-    <p:sldId id="277" r:id="rId17"/>
+    <p:sldId id="281" r:id="rId12"/>
+    <p:sldId id="276" r:id="rId13"/>
+    <p:sldId id="277" r:id="rId14"/>
   </p:sldIdLst>
   <p:sldSz cx="12192000" cy="6858000"/>
   <p:notesSz cx="6858000" cy="9144000"/>
@@ -252,7 +249,7 @@
           <a:p>
             <a:fld id="{B4E54C08-6F04-4474-B109-EF04CDCC6547}" type="datetimeFigureOut">
               <a:rPr lang="de-DE" smtClean="0"/>
-              <a:t>04.11.2019</a:t>
+              <a:t>06.11.19</a:t>
             </a:fld>
             <a:endParaRPr lang="de-DE"/>
           </a:p>
@@ -563,44 +560,7 @@
           <a:bodyPr/>
           <a:lstStyle/>
           <a:p>
-            <a:r>
-              <a:rPr lang="de-DE" dirty="0"/>
-              <a:t>- im Rahmen seiner Masterarbeit entwickelt</a:t>
-            </a:r>
-          </a:p>
-          <a:p>
-            <a:r>
-              <a:rPr lang="de-DE" dirty="0"/>
-              <a:t>- 2013 wurde Evan von Prezi als Open-Source-Engineer angestellt (um weiter an Elm zu arbeiten)</a:t>
-            </a:r>
-          </a:p>
-          <a:p>
-            <a:r>
-              <a:rPr lang="de-DE" dirty="0"/>
-              <a:t>- 2016 Elm Software </a:t>
-            </a:r>
-            <a:r>
-              <a:rPr lang="de-DE" dirty="0" err="1"/>
-              <a:t>Foundation</a:t>
-            </a:r>
-            <a:r>
-              <a:rPr lang="de-DE" dirty="0"/>
-              <a:t> gegründet (für Weiterentwicklung)</a:t>
-            </a:r>
-          </a:p>
-          <a:p>
-            <a:r>
-              <a:rPr lang="de-DE" dirty="0"/>
-              <a:t>- Zur Unterstützung der Verbreitung wurde „Elm-</a:t>
-            </a:r>
-            <a:r>
-              <a:rPr lang="de-DE" dirty="0" err="1"/>
-              <a:t>Confi</a:t>
-            </a:r>
-            <a:r>
-              <a:rPr lang="de-DE" dirty="0"/>
-              <a:t>“ ins Leben gerufen</a:t>
-            </a:r>
+            <a:endParaRPr lang="de-DE" dirty="0"/>
           </a:p>
         </p:txBody>
       </p:sp>
@@ -621,7 +581,7 @@
           <a:p>
             <a:fld id="{5DC9EF4A-F8D7-48F7-82A7-E61885A6BB32}" type="slidenum">
               <a:rPr lang="de-DE" smtClean="0"/>
-              <a:t>3</a:t>
+              <a:t>2</a:t>
             </a:fld>
             <a:endParaRPr lang="de-DE"/>
           </a:p>
@@ -630,7 +590,7 @@
     </p:spTree>
     <p:extLst>
       <p:ext uri="{BB962C8B-B14F-4D97-AF65-F5344CB8AC3E}">
-        <p14:creationId xmlns:p14="http://schemas.microsoft.com/office/powerpoint/2010/main" val="842594280"/>
+        <p14:creationId xmlns:p14="http://schemas.microsoft.com/office/powerpoint/2010/main" val="1527900175"/>
       </p:ext>
     </p:extLst>
   </p:cSld>
@@ -686,37 +646,41 @@
           <a:p>
             <a:r>
               <a:rPr lang="de-DE" dirty="0"/>
-              <a:t>1. Warten Sie auf eine Benutzereingabe</a:t>
+              <a:t>- im Rahmen seiner Masterarbeit entwickelt</a:t>
             </a:r>
           </a:p>
           <a:p>
             <a:r>
               <a:rPr lang="de-DE" dirty="0"/>
-              <a:t>2. Senden Sie eine Nachricht Aktualisieren</a:t>
+              <a:t>- 2013 wurde Evan von Prezi als Open-Source-Engineer angestellt (um weiter an Elm zu arbeiten)</a:t>
             </a:r>
           </a:p>
           <a:p>
             <a:r>
               <a:rPr lang="de-DE" dirty="0"/>
-              <a:t>3. Produzieren Sie das Modell</a:t>
-            </a:r>
-          </a:p>
-          <a:p>
+              <a:t>- 2016 Elm Software </a:t>
+            </a:r>
+            <a:r>
+              <a:rPr lang="de-DE" dirty="0" err="1"/>
+              <a:t>Foundation</a:t>
+            </a:r>
             <a:r>
               <a:rPr lang="de-DE" dirty="0"/>
-              <a:t>4. Rufen Sie Ansicht an, um ein neues HTML zu erhalten</a:t>
+              <a:t> gegründet (für Weiterentwicklung)</a:t>
             </a:r>
           </a:p>
           <a:p>
             <a:r>
               <a:rPr lang="de-DE" dirty="0"/>
-              <a:t>5. Zeigen Sie das neue HTML auf dem Bildschirm an</a:t>
-            </a:r>
-          </a:p>
-          <a:p>
+              <a:t>- Zur Unterstützung der Verbreitung wurde „Elm-</a:t>
+            </a:r>
+            <a:r>
+              <a:rPr lang="de-DE" dirty="0" err="1"/>
+              <a:t>Confi</a:t>
+            </a:r>
             <a:r>
               <a:rPr lang="de-DE" dirty="0"/>
-              <a:t>6. Wiederholen</a:t>
+              <a:t>“ ins Leben gerufen</a:t>
             </a:r>
           </a:p>
         </p:txBody>
@@ -738,6 +702,427 @@
           <a:p>
             <a:fld id="{5DC9EF4A-F8D7-48F7-82A7-E61885A6BB32}" type="slidenum">
               <a:rPr lang="de-DE" smtClean="0"/>
+              <a:t>3</a:t>
+            </a:fld>
+            <a:endParaRPr lang="de-DE"/>
+          </a:p>
+        </p:txBody>
+      </p:sp>
+    </p:spTree>
+    <p:extLst>
+      <p:ext uri="{BB962C8B-B14F-4D97-AF65-F5344CB8AC3E}">
+        <p14:creationId xmlns:p14="http://schemas.microsoft.com/office/powerpoint/2010/main" val="842594280"/>
+      </p:ext>
+    </p:extLst>
+  </p:cSld>
+  <p:clrMapOvr>
+    <a:masterClrMapping/>
+  </p:clrMapOvr>
+</p:notes>
+</file>
+
+<file path=ppt/notesSlides/notesSlide3.xml><?xml version="1.0" encoding="utf-8"?>
+<p:notes xmlns:a="http://schemas.openxmlformats.org/drawingml/2006/main" xmlns:r="http://schemas.openxmlformats.org/officeDocument/2006/relationships" xmlns:p="http://schemas.openxmlformats.org/presentationml/2006/main">
+  <p:cSld>
+    <p:spTree>
+      <p:nvGrpSpPr>
+        <p:cNvPr id="1" name=""/>
+        <p:cNvGrpSpPr/>
+        <p:nvPr/>
+      </p:nvGrpSpPr>
+      <p:grpSpPr>
+        <a:xfrm>
+          <a:off x="0" y="0"/>
+          <a:ext cx="0" cy="0"/>
+          <a:chOff x="0" y="0"/>
+          <a:chExt cx="0" cy="0"/>
+        </a:xfrm>
+      </p:grpSpPr>
+      <p:sp>
+        <p:nvSpPr>
+          <p:cNvPr id="2" name="Folienbildplatzhalter 1"/>
+          <p:cNvSpPr>
+            <a:spLocks noGrp="1" noRot="1" noChangeAspect="1"/>
+          </p:cNvSpPr>
+          <p:nvPr>
+            <p:ph type="sldImg"/>
+          </p:nvPr>
+        </p:nvSpPr>
+        <p:spPr/>
+      </p:sp>
+      <p:sp>
+        <p:nvSpPr>
+          <p:cNvPr id="3" name="Notizenplatzhalter 2"/>
+          <p:cNvSpPr>
+            <a:spLocks noGrp="1"/>
+          </p:cNvSpPr>
+          <p:nvPr>
+            <p:ph type="body" idx="1"/>
+          </p:nvPr>
+        </p:nvSpPr>
+        <p:spPr/>
+        <p:txBody>
+          <a:bodyPr/>
+          <a:lstStyle/>
+          <a:p>
+            <a:r>
+              <a:rPr lang="de-DE" dirty="0"/>
+              <a:t>1. Bei gleichen Parameter muss immer das gleiche </a:t>
+            </a:r>
+            <a:r>
+              <a:rPr lang="de-DE" dirty="0" err="1"/>
+              <a:t>Ergbnis</a:t>
+            </a:r>
+            <a:r>
+              <a:rPr lang="de-DE" dirty="0"/>
+              <a:t> rauskommen</a:t>
+            </a:r>
+          </a:p>
+          <a:p>
+            <a:r>
+              <a:rPr lang="de-DE" dirty="0"/>
+              <a:t>2. Nicht alle Funktionen müssen neue Variablen errechnen. Wir wollen nur nicht die Aufgaben einer Funktion mischen</a:t>
+            </a:r>
+          </a:p>
+          <a:p>
+            <a:r>
+              <a:rPr lang="de-DE" dirty="0"/>
+              <a:t>3. Variablen dürfen nicht überschrieben werden</a:t>
+            </a:r>
+          </a:p>
+        </p:txBody>
+      </p:sp>
+      <p:sp>
+        <p:nvSpPr>
+          <p:cNvPr id="4" name="Foliennummernplatzhalter 3"/>
+          <p:cNvSpPr>
+            <a:spLocks noGrp="1"/>
+          </p:cNvSpPr>
+          <p:nvPr>
+            <p:ph type="sldNum" sz="quarter" idx="5"/>
+          </p:nvPr>
+        </p:nvSpPr>
+        <p:spPr/>
+        <p:txBody>
+          <a:bodyPr/>
+          <a:lstStyle/>
+          <a:p>
+            <a:fld id="{5DC9EF4A-F8D7-48F7-82A7-E61885A6BB32}" type="slidenum">
+              <a:rPr lang="de-DE" smtClean="0"/>
+              <a:t>6</a:t>
+            </a:fld>
+            <a:endParaRPr lang="de-DE"/>
+          </a:p>
+        </p:txBody>
+      </p:sp>
+    </p:spTree>
+    <p:extLst>
+      <p:ext uri="{BB962C8B-B14F-4D97-AF65-F5344CB8AC3E}">
+        <p14:creationId xmlns:p14="http://schemas.microsoft.com/office/powerpoint/2010/main" val="4026746291"/>
+      </p:ext>
+    </p:extLst>
+  </p:cSld>
+  <p:clrMapOvr>
+    <a:masterClrMapping/>
+  </p:clrMapOvr>
+</p:notes>
+</file>
+
+<file path=ppt/notesSlides/notesSlide4.xml><?xml version="1.0" encoding="utf-8"?>
+<p:notes xmlns:a="http://schemas.openxmlformats.org/drawingml/2006/main" xmlns:r="http://schemas.openxmlformats.org/officeDocument/2006/relationships" xmlns:p="http://schemas.openxmlformats.org/presentationml/2006/main">
+  <p:cSld>
+    <p:spTree>
+      <p:nvGrpSpPr>
+        <p:cNvPr id="1" name=""/>
+        <p:cNvGrpSpPr/>
+        <p:nvPr/>
+      </p:nvGrpSpPr>
+      <p:grpSpPr>
+        <a:xfrm>
+          <a:off x="0" y="0"/>
+          <a:ext cx="0" cy="0"/>
+          <a:chOff x="0" y="0"/>
+          <a:chExt cx="0" cy="0"/>
+        </a:xfrm>
+      </p:grpSpPr>
+      <p:sp>
+        <p:nvSpPr>
+          <p:cNvPr id="2" name="Folienbildplatzhalter 1"/>
+          <p:cNvSpPr>
+            <a:spLocks noGrp="1" noRot="1" noChangeAspect="1"/>
+          </p:cNvSpPr>
+          <p:nvPr>
+            <p:ph type="sldImg"/>
+          </p:nvPr>
+        </p:nvSpPr>
+        <p:spPr/>
+      </p:sp>
+      <p:sp>
+        <p:nvSpPr>
+          <p:cNvPr id="3" name="Notizenplatzhalter 2"/>
+          <p:cNvSpPr>
+            <a:spLocks noGrp="1"/>
+          </p:cNvSpPr>
+          <p:nvPr>
+            <p:ph type="body" idx="1"/>
+          </p:nvPr>
+        </p:nvSpPr>
+        <p:spPr/>
+        <p:txBody>
+          <a:bodyPr/>
+          <a:lstStyle/>
+          <a:p>
+            <a:r>
+              <a:rPr lang="de-DE" dirty="0"/>
+              <a:t>Problem mit Überschreibung von Variablen</a:t>
+            </a:r>
+          </a:p>
+          <a:p>
+            <a:r>
+              <a:rPr lang="de-DE" dirty="0"/>
+              <a:t>-&gt; </a:t>
+            </a:r>
+            <a:r>
+              <a:rPr lang="de-DE" dirty="0" err="1"/>
+              <a:t>for</a:t>
+            </a:r>
+            <a:r>
+              <a:rPr lang="de-DE" dirty="0"/>
+              <a:t>-funktion</a:t>
+            </a:r>
+          </a:p>
+          <a:p>
+            <a:endParaRPr lang="de-DE" dirty="0"/>
+          </a:p>
+          <a:p>
+            <a:r>
+              <a:rPr lang="de-DE" dirty="0"/>
+              <a:t>Funktion in JS-Syntax (weil vielleicht die meisten das eher verstehen)</a:t>
+            </a:r>
+          </a:p>
+        </p:txBody>
+      </p:sp>
+      <p:sp>
+        <p:nvSpPr>
+          <p:cNvPr id="4" name="Foliennummernplatzhalter 3"/>
+          <p:cNvSpPr>
+            <a:spLocks noGrp="1"/>
+          </p:cNvSpPr>
+          <p:nvPr>
+            <p:ph type="sldNum" sz="quarter" idx="5"/>
+          </p:nvPr>
+        </p:nvSpPr>
+        <p:spPr/>
+        <p:txBody>
+          <a:bodyPr/>
+          <a:lstStyle/>
+          <a:p>
+            <a:fld id="{5DC9EF4A-F8D7-48F7-82A7-E61885A6BB32}" type="slidenum">
+              <a:rPr lang="de-DE" smtClean="0"/>
+              <a:t>7</a:t>
+            </a:fld>
+            <a:endParaRPr lang="de-DE"/>
+          </a:p>
+        </p:txBody>
+      </p:sp>
+    </p:spTree>
+    <p:extLst>
+      <p:ext uri="{BB962C8B-B14F-4D97-AF65-F5344CB8AC3E}">
+        <p14:creationId xmlns:p14="http://schemas.microsoft.com/office/powerpoint/2010/main" val="2802163142"/>
+      </p:ext>
+    </p:extLst>
+  </p:cSld>
+  <p:clrMapOvr>
+    <a:masterClrMapping/>
+  </p:clrMapOvr>
+</p:notes>
+</file>
+
+<file path=ppt/notesSlides/notesSlide5.xml><?xml version="1.0" encoding="utf-8"?>
+<p:notes xmlns:a="http://schemas.openxmlformats.org/drawingml/2006/main" xmlns:r="http://schemas.openxmlformats.org/officeDocument/2006/relationships" xmlns:p="http://schemas.openxmlformats.org/presentationml/2006/main">
+  <p:cSld>
+    <p:spTree>
+      <p:nvGrpSpPr>
+        <p:cNvPr id="1" name=""/>
+        <p:cNvGrpSpPr/>
+        <p:nvPr/>
+      </p:nvGrpSpPr>
+      <p:grpSpPr>
+        <a:xfrm>
+          <a:off x="0" y="0"/>
+          <a:ext cx="0" cy="0"/>
+          <a:chOff x="0" y="0"/>
+          <a:chExt cx="0" cy="0"/>
+        </a:xfrm>
+      </p:grpSpPr>
+      <p:sp>
+        <p:nvSpPr>
+          <p:cNvPr id="2" name="Folienbildplatzhalter 1"/>
+          <p:cNvSpPr>
+            <a:spLocks noGrp="1" noRot="1" noChangeAspect="1"/>
+          </p:cNvSpPr>
+          <p:nvPr>
+            <p:ph type="sldImg"/>
+          </p:nvPr>
+        </p:nvSpPr>
+        <p:spPr/>
+      </p:sp>
+      <p:sp>
+        <p:nvSpPr>
+          <p:cNvPr id="3" name="Notizenplatzhalter 2"/>
+          <p:cNvSpPr>
+            <a:spLocks noGrp="1"/>
+          </p:cNvSpPr>
+          <p:nvPr>
+            <p:ph type="body" idx="1"/>
+          </p:nvPr>
+        </p:nvSpPr>
+        <p:spPr/>
+        <p:txBody>
+          <a:bodyPr/>
+          <a:lstStyle/>
+          <a:p>
+            <a:r>
+              <a:rPr lang="de-DE" dirty="0"/>
+              <a:t>Problem: Wenn wir einer Funktion immer nur eine klare Aufgabe geben können. Wie können wir zwei Aufgaben kombinieren?</a:t>
+            </a:r>
+          </a:p>
+        </p:txBody>
+      </p:sp>
+      <p:sp>
+        <p:nvSpPr>
+          <p:cNvPr id="4" name="Foliennummernplatzhalter 3"/>
+          <p:cNvSpPr>
+            <a:spLocks noGrp="1"/>
+          </p:cNvSpPr>
+          <p:nvPr>
+            <p:ph type="sldNum" sz="quarter" idx="5"/>
+          </p:nvPr>
+        </p:nvSpPr>
+        <p:spPr/>
+        <p:txBody>
+          <a:bodyPr/>
+          <a:lstStyle/>
+          <a:p>
+            <a:fld id="{5DC9EF4A-F8D7-48F7-82A7-E61885A6BB32}" type="slidenum">
+              <a:rPr lang="de-DE" smtClean="0"/>
+              <a:t>8</a:t>
+            </a:fld>
+            <a:endParaRPr lang="de-DE"/>
+          </a:p>
+        </p:txBody>
+      </p:sp>
+    </p:spTree>
+    <p:extLst>
+      <p:ext uri="{BB962C8B-B14F-4D97-AF65-F5344CB8AC3E}">
+        <p14:creationId xmlns:p14="http://schemas.microsoft.com/office/powerpoint/2010/main" val="1304329099"/>
+      </p:ext>
+    </p:extLst>
+  </p:cSld>
+  <p:clrMapOvr>
+    <a:masterClrMapping/>
+  </p:clrMapOvr>
+</p:notes>
+</file>
+
+<file path=ppt/notesSlides/notesSlide6.xml><?xml version="1.0" encoding="utf-8"?>
+<p:notes xmlns:a="http://schemas.openxmlformats.org/drawingml/2006/main" xmlns:r="http://schemas.openxmlformats.org/officeDocument/2006/relationships" xmlns:p="http://schemas.openxmlformats.org/presentationml/2006/main">
+  <p:cSld>
+    <p:spTree>
+      <p:nvGrpSpPr>
+        <p:cNvPr id="1" name=""/>
+        <p:cNvGrpSpPr/>
+        <p:nvPr/>
+      </p:nvGrpSpPr>
+      <p:grpSpPr>
+        <a:xfrm>
+          <a:off x="0" y="0"/>
+          <a:ext cx="0" cy="0"/>
+          <a:chOff x="0" y="0"/>
+          <a:chExt cx="0" cy="0"/>
+        </a:xfrm>
+      </p:grpSpPr>
+      <p:sp>
+        <p:nvSpPr>
+          <p:cNvPr id="2" name="Folienbildplatzhalter 1"/>
+          <p:cNvSpPr>
+            <a:spLocks noGrp="1" noRot="1" noChangeAspect="1"/>
+          </p:cNvSpPr>
+          <p:nvPr>
+            <p:ph type="sldImg"/>
+          </p:nvPr>
+        </p:nvSpPr>
+        <p:spPr/>
+      </p:sp>
+      <p:sp>
+        <p:nvSpPr>
+          <p:cNvPr id="3" name="Notizenplatzhalter 2"/>
+          <p:cNvSpPr>
+            <a:spLocks noGrp="1"/>
+          </p:cNvSpPr>
+          <p:nvPr>
+            <p:ph type="body" idx="1"/>
+          </p:nvPr>
+        </p:nvSpPr>
+        <p:spPr/>
+        <p:txBody>
+          <a:bodyPr/>
+          <a:lstStyle/>
+          <a:p>
+            <a:r>
+              <a:rPr lang="de-DE" dirty="0"/>
+              <a:t>1. Warten Sie auf eine Benutzereingabe</a:t>
+            </a:r>
+          </a:p>
+          <a:p>
+            <a:r>
+              <a:rPr lang="de-DE" dirty="0"/>
+              <a:t>2. Senden Sie eine Nachricht Aktualisieren</a:t>
+            </a:r>
+          </a:p>
+          <a:p>
+            <a:r>
+              <a:rPr lang="de-DE" dirty="0"/>
+              <a:t>3. Produzieren Sie das Modell</a:t>
+            </a:r>
+          </a:p>
+          <a:p>
+            <a:r>
+              <a:rPr lang="de-DE" dirty="0"/>
+              <a:t>4. Rufen Sie Ansicht an, um ein neues HTML zu erhalten</a:t>
+            </a:r>
+          </a:p>
+          <a:p>
+            <a:r>
+              <a:rPr lang="de-DE" dirty="0"/>
+              <a:t>5. Zeigen Sie das neue HTML auf dem Bildschirm an</a:t>
+            </a:r>
+          </a:p>
+          <a:p>
+            <a:r>
+              <a:rPr lang="de-DE" dirty="0"/>
+              <a:t>6. Wiederholen</a:t>
+            </a:r>
+          </a:p>
+        </p:txBody>
+      </p:sp>
+      <p:sp>
+        <p:nvSpPr>
+          <p:cNvPr id="4" name="Foliennummernplatzhalter 3"/>
+          <p:cNvSpPr>
+            <a:spLocks noGrp="1"/>
+          </p:cNvSpPr>
+          <p:nvPr>
+            <p:ph type="sldNum" sz="quarter" idx="5"/>
+          </p:nvPr>
+        </p:nvSpPr>
+        <p:spPr/>
+        <p:txBody>
+          <a:bodyPr/>
+          <a:lstStyle/>
+          <a:p>
+            <a:fld id="{5DC9EF4A-F8D7-48F7-82A7-E61885A6BB32}" type="slidenum">
+              <a:rPr lang="de-DE" smtClean="0"/>
               <a:t>9</a:t>
             </a:fld>
             <a:endParaRPr lang="de-DE"/>
@@ -748,6 +1133,202 @@
     <p:extLst>
       <p:ext uri="{BB962C8B-B14F-4D97-AF65-F5344CB8AC3E}">
         <p14:creationId xmlns:p14="http://schemas.microsoft.com/office/powerpoint/2010/main" val="3185252785"/>
+      </p:ext>
+    </p:extLst>
+  </p:cSld>
+  <p:clrMapOvr>
+    <a:masterClrMapping/>
+  </p:clrMapOvr>
+</p:notes>
+</file>
+
+<file path=ppt/notesSlides/notesSlide7.xml><?xml version="1.0" encoding="utf-8"?>
+<p:notes xmlns:a="http://schemas.openxmlformats.org/drawingml/2006/main" xmlns:r="http://schemas.openxmlformats.org/officeDocument/2006/relationships" xmlns:p="http://schemas.openxmlformats.org/presentationml/2006/main">
+  <p:cSld>
+    <p:spTree>
+      <p:nvGrpSpPr>
+        <p:cNvPr id="1" name=""/>
+        <p:cNvGrpSpPr/>
+        <p:nvPr/>
+      </p:nvGrpSpPr>
+      <p:grpSpPr>
+        <a:xfrm>
+          <a:off x="0" y="0"/>
+          <a:ext cx="0" cy="0"/>
+          <a:chOff x="0" y="0"/>
+          <a:chExt cx="0" cy="0"/>
+        </a:xfrm>
+      </p:grpSpPr>
+      <p:sp>
+        <p:nvSpPr>
+          <p:cNvPr id="2" name="Folienbildplatzhalter 1"/>
+          <p:cNvSpPr>
+            <a:spLocks noGrp="1" noRot="1" noChangeAspect="1"/>
+          </p:cNvSpPr>
+          <p:nvPr>
+            <p:ph type="sldImg"/>
+          </p:nvPr>
+        </p:nvSpPr>
+        <p:spPr/>
+      </p:sp>
+      <p:sp>
+        <p:nvSpPr>
+          <p:cNvPr id="3" name="Notizenplatzhalter 2"/>
+          <p:cNvSpPr>
+            <a:spLocks noGrp="1"/>
+          </p:cNvSpPr>
+          <p:nvPr>
+            <p:ph type="body" idx="1"/>
+          </p:nvPr>
+        </p:nvSpPr>
+        <p:spPr/>
+        <p:txBody>
+          <a:bodyPr/>
+          <a:lstStyle/>
+          <a:p>
+            <a:pPr marL="0" marR="0" lvl="0" indent="0" algn="l" defTabSz="914400" rtl="0" eaLnBrk="1" fontAlgn="auto" latinLnBrk="0" hangingPunct="1">
+              <a:lnSpc>
+                <a:spcPct val="100000"/>
+              </a:lnSpc>
+              <a:spcBef>
+                <a:spcPts val="0"/>
+              </a:spcBef>
+              <a:spcAft>
+                <a:spcPts val="0"/>
+              </a:spcAft>
+              <a:buClrTx/>
+              <a:buSzTx/>
+              <a:buFontTx/>
+              <a:buNone/>
+              <a:tabLst/>
+              <a:defRPr/>
+            </a:pPr>
+            <a:r>
+              <a:rPr lang="de-DE" dirty="0"/>
+              <a:t>Wir müssen den String in Klammern setzten, damit der Compiler </a:t>
+            </a:r>
+            <a:r>
+              <a:rPr lang="de-DE"/>
+              <a:t>nicht durch einander kommt mit der Verkettung von Strings.</a:t>
+            </a:r>
+            <a:endParaRPr lang="de-DE" dirty="0"/>
+          </a:p>
+          <a:p>
+            <a:endParaRPr lang="de-DE" dirty="0"/>
+          </a:p>
+        </p:txBody>
+      </p:sp>
+      <p:sp>
+        <p:nvSpPr>
+          <p:cNvPr id="4" name="Foliennummernplatzhalter 3"/>
+          <p:cNvSpPr>
+            <a:spLocks noGrp="1"/>
+          </p:cNvSpPr>
+          <p:nvPr>
+            <p:ph type="sldNum" sz="quarter" idx="5"/>
+          </p:nvPr>
+        </p:nvSpPr>
+        <p:spPr/>
+        <p:txBody>
+          <a:bodyPr/>
+          <a:lstStyle/>
+          <a:p>
+            <a:fld id="{5DC9EF4A-F8D7-48F7-82A7-E61885A6BB32}" type="slidenum">
+              <a:rPr lang="de-DE" smtClean="0"/>
+              <a:t>11</a:t>
+            </a:fld>
+            <a:endParaRPr lang="de-DE"/>
+          </a:p>
+        </p:txBody>
+      </p:sp>
+    </p:spTree>
+    <p:extLst>
+      <p:ext uri="{BB962C8B-B14F-4D97-AF65-F5344CB8AC3E}">
+        <p14:creationId xmlns:p14="http://schemas.microsoft.com/office/powerpoint/2010/main" val="4131630600"/>
+      </p:ext>
+    </p:extLst>
+  </p:cSld>
+  <p:clrMapOvr>
+    <a:masterClrMapping/>
+  </p:clrMapOvr>
+</p:notes>
+</file>
+
+<file path=ppt/notesSlides/notesSlide8.xml><?xml version="1.0" encoding="utf-8"?>
+<p:notes xmlns:a="http://schemas.openxmlformats.org/drawingml/2006/main" xmlns:r="http://schemas.openxmlformats.org/officeDocument/2006/relationships" xmlns:p="http://schemas.openxmlformats.org/presentationml/2006/main">
+  <p:cSld>
+    <p:spTree>
+      <p:nvGrpSpPr>
+        <p:cNvPr id="1" name=""/>
+        <p:cNvGrpSpPr/>
+        <p:nvPr/>
+      </p:nvGrpSpPr>
+      <p:grpSpPr>
+        <a:xfrm>
+          <a:off x="0" y="0"/>
+          <a:ext cx="0" cy="0"/>
+          <a:chOff x="0" y="0"/>
+          <a:chExt cx="0" cy="0"/>
+        </a:xfrm>
+      </p:grpSpPr>
+      <p:sp>
+        <p:nvSpPr>
+          <p:cNvPr id="2" name="Folienbildplatzhalter 1"/>
+          <p:cNvSpPr>
+            <a:spLocks noGrp="1" noRot="1" noChangeAspect="1"/>
+          </p:cNvSpPr>
+          <p:nvPr>
+            <p:ph type="sldImg"/>
+          </p:nvPr>
+        </p:nvSpPr>
+        <p:spPr/>
+      </p:sp>
+      <p:sp>
+        <p:nvSpPr>
+          <p:cNvPr id="3" name="Notizenplatzhalter 2"/>
+          <p:cNvSpPr>
+            <a:spLocks noGrp="1"/>
+          </p:cNvSpPr>
+          <p:nvPr>
+            <p:ph type="body" idx="1"/>
+          </p:nvPr>
+        </p:nvSpPr>
+        <p:spPr/>
+        <p:txBody>
+          <a:bodyPr/>
+          <a:lstStyle/>
+          <a:p>
+            <a:endParaRPr lang="de-DE" dirty="0"/>
+          </a:p>
+        </p:txBody>
+      </p:sp>
+      <p:sp>
+        <p:nvSpPr>
+          <p:cNvPr id="4" name="Foliennummernplatzhalter 3"/>
+          <p:cNvSpPr>
+            <a:spLocks noGrp="1"/>
+          </p:cNvSpPr>
+          <p:nvPr>
+            <p:ph type="sldNum" sz="quarter" idx="5"/>
+          </p:nvPr>
+        </p:nvSpPr>
+        <p:spPr/>
+        <p:txBody>
+          <a:bodyPr/>
+          <a:lstStyle/>
+          <a:p>
+            <a:fld id="{5DC9EF4A-F8D7-48F7-82A7-E61885A6BB32}" type="slidenum">
+              <a:rPr lang="de-DE" smtClean="0"/>
+              <a:t>13</a:t>
+            </a:fld>
+            <a:endParaRPr lang="de-DE"/>
+          </a:p>
+        </p:txBody>
+      </p:sp>
+    </p:spTree>
+    <p:extLst>
+      <p:ext uri="{BB962C8B-B14F-4D97-AF65-F5344CB8AC3E}">
+        <p14:creationId xmlns:p14="http://schemas.microsoft.com/office/powerpoint/2010/main" val="295519596"/>
       </p:ext>
     </p:extLst>
   </p:cSld>
@@ -904,7 +1485,7 @@
           <a:p>
             <a:fld id="{B81AF98B-18BF-42AA-A0FC-32820FA6E810}" type="datetimeFigureOut">
               <a:rPr lang="de-DE" smtClean="0"/>
-              <a:t>04.11.2019</a:t>
+              <a:t>06.11.19</a:t>
             </a:fld>
             <a:endParaRPr lang="de-DE"/>
           </a:p>
@@ -1102,7 +1683,7 @@
           <a:p>
             <a:fld id="{B81AF98B-18BF-42AA-A0FC-32820FA6E810}" type="datetimeFigureOut">
               <a:rPr lang="de-DE" smtClean="0"/>
-              <a:t>04.11.2019</a:t>
+              <a:t>06.11.19</a:t>
             </a:fld>
             <a:endParaRPr lang="de-DE"/>
           </a:p>
@@ -1310,7 +1891,7 @@
           <a:p>
             <a:fld id="{B81AF98B-18BF-42AA-A0FC-32820FA6E810}" type="datetimeFigureOut">
               <a:rPr lang="de-DE" smtClean="0"/>
-              <a:t>04.11.2019</a:t>
+              <a:t>06.11.19</a:t>
             </a:fld>
             <a:endParaRPr lang="de-DE"/>
           </a:p>
@@ -1508,7 +2089,7 @@
           <a:p>
             <a:fld id="{B81AF98B-18BF-42AA-A0FC-32820FA6E810}" type="datetimeFigureOut">
               <a:rPr lang="de-DE" smtClean="0"/>
-              <a:t>04.11.2019</a:t>
+              <a:t>06.11.19</a:t>
             </a:fld>
             <a:endParaRPr lang="de-DE"/>
           </a:p>
@@ -1783,7 +2364,7 @@
           <a:p>
             <a:fld id="{B81AF98B-18BF-42AA-A0FC-32820FA6E810}" type="datetimeFigureOut">
               <a:rPr lang="de-DE" smtClean="0"/>
-              <a:t>04.11.2019</a:t>
+              <a:t>06.11.19</a:t>
             </a:fld>
             <a:endParaRPr lang="de-DE"/>
           </a:p>
@@ -2048,7 +2629,7 @@
           <a:p>
             <a:fld id="{B81AF98B-18BF-42AA-A0FC-32820FA6E810}" type="datetimeFigureOut">
               <a:rPr lang="de-DE" smtClean="0"/>
-              <a:t>04.11.2019</a:t>
+              <a:t>06.11.19</a:t>
             </a:fld>
             <a:endParaRPr lang="de-DE"/>
           </a:p>
@@ -2460,7 +3041,7 @@
           <a:p>
             <a:fld id="{B81AF98B-18BF-42AA-A0FC-32820FA6E810}" type="datetimeFigureOut">
               <a:rPr lang="de-DE" smtClean="0"/>
-              <a:t>04.11.2019</a:t>
+              <a:t>06.11.19</a:t>
             </a:fld>
             <a:endParaRPr lang="de-DE"/>
           </a:p>
@@ -2601,7 +3182,7 @@
           <a:p>
             <a:fld id="{B81AF98B-18BF-42AA-A0FC-32820FA6E810}" type="datetimeFigureOut">
               <a:rPr lang="de-DE" smtClean="0"/>
-              <a:t>04.11.2019</a:t>
+              <a:t>06.11.19</a:t>
             </a:fld>
             <a:endParaRPr lang="de-DE"/>
           </a:p>
@@ -2715,7 +3296,7 @@
             <a:fld id="{B61BEF0D-F0BB-DE4B-95CE-6DB70DBA9567}" type="datetimeFigureOut">
               <a:rPr lang="en-US" smtClean="0"/>
               <a:pPr/>
-              <a:t>11/4/2019</a:t>
+              <a:t>11/6/19</a:t>
             </a:fld>
             <a:endParaRPr lang="en-US" dirty="0"/>
           </a:p>
@@ -2866,18 +3447,18 @@
                 <a:solidFill>
                   <a:schemeClr val="bg1"/>
                 </a:solidFill>
-                <a:latin typeface="Kallisto Lined" panose="00000A00000000000000" pitchFamily="50" charset="0"/>
+                <a:latin typeface="Open Sans" panose="020B0606030504020204" pitchFamily="34" charset="0"/>
                 <a:ea typeface="Open Sans" panose="020B0606030504020204" pitchFamily="34" charset="0"/>
                 <a:cs typeface="Open Sans" panose="020B0606030504020204" pitchFamily="34" charset="0"/>
               </a:rPr>
-              <a:t>ELM – Funktionale Programmiersprache                      </a:t>
+              <a:t>ELM – Funktionale Programmiersprache                      		 </a:t>
             </a:r>
             <a:r>
               <a:rPr lang="de-DE" sz="1600" spc="-100" baseline="0" dirty="0">
                 <a:solidFill>
                   <a:schemeClr val="bg1"/>
                 </a:solidFill>
-                <a:latin typeface="Kallisto Lined" panose="00000A00000000000000" pitchFamily="50" charset="0"/>
+                <a:latin typeface="Open Sans" panose="020B0606030504020204" pitchFamily="34" charset="0"/>
                 <a:ea typeface="Open Sans" panose="020B0606030504020204" pitchFamily="34" charset="0"/>
                 <a:cs typeface="Open Sans" panose="020B0606030504020204" pitchFamily="34" charset="0"/>
               </a:rPr>
@@ -2888,7 +3469,7 @@
                 <a:solidFill>
                   <a:schemeClr val="bg1"/>
                 </a:solidFill>
-                <a:latin typeface="Kallisto Lined" panose="00000A00000000000000" pitchFamily="50" charset="0"/>
+                <a:latin typeface="Open Sans" panose="020B0606030504020204" pitchFamily="34" charset="0"/>
                 <a:ea typeface="Open Sans" panose="020B0606030504020204" pitchFamily="34" charset="0"/>
                 <a:cs typeface="Open Sans" panose="020B0606030504020204" pitchFamily="34" charset="0"/>
               </a:rPr>
@@ -2899,7 +3480,7 @@
                 <a:solidFill>
                   <a:schemeClr val="bg1"/>
                 </a:solidFill>
-                <a:latin typeface="Kallisto Lined" panose="00000A00000000000000" pitchFamily="50" charset="0"/>
+                <a:latin typeface="Open Sans" panose="020B0606030504020204" pitchFamily="34" charset="0"/>
                 <a:ea typeface="Open Sans" panose="020B0606030504020204" pitchFamily="34" charset="0"/>
                 <a:cs typeface="Open Sans" panose="020B0606030504020204" pitchFamily="34" charset="0"/>
               </a:rPr>
@@ -2910,7 +3491,7 @@
                 <a:solidFill>
                   <a:schemeClr val="bg1"/>
                 </a:solidFill>
-                <a:latin typeface="Kallisto Lined" panose="00000A00000000000000" pitchFamily="50" charset="0"/>
+                <a:latin typeface="Open Sans" panose="020B0606030504020204" pitchFamily="34" charset="0"/>
                 <a:ea typeface="Open Sans" panose="020B0606030504020204" pitchFamily="34" charset="0"/>
                 <a:cs typeface="Open Sans" panose="020B0606030504020204" pitchFamily="34" charset="0"/>
               </a:rPr>
@@ -2921,7 +3502,7 @@
                 <a:solidFill>
                   <a:schemeClr val="bg1"/>
                 </a:solidFill>
-                <a:latin typeface="Kallisto Lined" panose="00000A00000000000000" pitchFamily="50" charset="0"/>
+                <a:latin typeface="Open Sans" panose="020B0606030504020204" pitchFamily="34" charset="0"/>
                 <a:ea typeface="Open Sans" panose="020B0606030504020204" pitchFamily="34" charset="0"/>
                 <a:cs typeface="Open Sans" panose="020B0606030504020204" pitchFamily="34" charset="0"/>
               </a:rPr>
@@ -3373,7 +3954,7 @@
           <a:p>
             <a:fld id="{B81AF98B-18BF-42AA-A0FC-32820FA6E810}" type="datetimeFigureOut">
               <a:rPr lang="de-DE" smtClean="0"/>
-              <a:t>04.11.2019</a:t>
+              <a:t>06.11.19</a:t>
             </a:fld>
             <a:endParaRPr lang="de-DE"/>
           </a:p>
@@ -3661,7 +4242,7 @@
           <a:p>
             <a:fld id="{B81AF98B-18BF-42AA-A0FC-32820FA6E810}" type="datetimeFigureOut">
               <a:rPr lang="de-DE" smtClean="0"/>
-              <a:t>04.11.2019</a:t>
+              <a:t>06.11.19</a:t>
             </a:fld>
             <a:endParaRPr lang="de-DE"/>
           </a:p>
@@ -3902,7 +4483,7 @@
           <a:p>
             <a:fld id="{B81AF98B-18BF-42AA-A0FC-32820FA6E810}" type="datetimeFigureOut">
               <a:rPr lang="de-DE" smtClean="0"/>
-              <a:t>04.11.2019</a:t>
+              <a:t>06.11.19</a:t>
             </a:fld>
             <a:endParaRPr lang="de-DE"/>
           </a:p>
@@ -4597,11 +5178,22 @@
                 <a:solidFill>
                   <a:schemeClr val="bg1"/>
                 </a:solidFill>
+                <a:latin typeface="Open Sans" panose="020B0606030504020204" pitchFamily="34" charset="0"/>
+                <a:ea typeface="Open Sans" panose="020B0606030504020204" pitchFamily="34" charset="0"/>
+                <a:cs typeface="Open Sans" panose="020B0606030504020204" pitchFamily="34" charset="0"/>
+              </a:rPr>
+              <a:t>funktionale</a:t>
+            </a:r>
+            <a:r>
+              <a:rPr lang="de-DE" sz="3600" dirty="0">
+                <a:solidFill>
+                  <a:schemeClr val="bg1"/>
+                </a:solidFill>
                 <a:latin typeface="Kallisto Lined" panose="00000A00000000000000" pitchFamily="50" charset="0"/>
                 <a:ea typeface="MS Gothic" panose="020B0609070205080204" pitchFamily="49" charset="-128"/>
                 <a:cs typeface="Open Sans" panose="020B0606030504020204" pitchFamily="34" charset="0"/>
               </a:rPr>
-              <a:t>funktionale Programmiersprache</a:t>
+              <a:t> Programmiersprache</a:t>
             </a:r>
           </a:p>
         </p:txBody>
@@ -4809,36 +5401,16 @@
           <a:p>
             <a:r>
               <a:rPr lang="de-DE" sz="3200" b="1" dirty="0">
-                <a:latin typeface="Kallisto Lined" panose="00000A00000000000000" pitchFamily="50" charset="0"/>
-              </a:rPr>
-              <a:t>COM</a:t>
-            </a:r>
-            <a:r>
-              <a:rPr lang="de-DE" sz="3200" b="1" spc="-300" dirty="0">
-                <a:latin typeface="Kallisto Lined" panose="00000A00000000000000" pitchFamily="50" charset="0"/>
-              </a:rPr>
-              <a:t>P</a:t>
-            </a:r>
-            <a:r>
-              <a:rPr lang="de-DE" sz="3200" b="1" spc="600" dirty="0">
-                <a:latin typeface="Kallisto Lined" panose="00000A00000000000000" pitchFamily="50" charset="0"/>
-              </a:rPr>
-              <a:t>I</a:t>
-            </a:r>
-            <a:r>
-              <a:rPr lang="de-DE" sz="3200" b="1" spc="-150" dirty="0">
-                <a:latin typeface="Kallisto Lined" panose="00000A00000000000000" pitchFamily="50" charset="0"/>
-              </a:rPr>
-              <a:t>L</a:t>
-            </a:r>
-            <a:r>
-              <a:rPr lang="de-DE" sz="3200" b="1" dirty="0">
-                <a:latin typeface="Kallisto Lined" panose="00000A00000000000000" pitchFamily="50" charset="0"/>
-              </a:rPr>
-              <a:t>ER</a:t>
-            </a:r>
-            <a:endParaRPr lang="de-DE" spc="-650" dirty="0">
-              <a:latin typeface="Kallisto Lined" panose="00000A00000000000000" pitchFamily="50" charset="0"/>
+                <a:latin typeface="Open Sans" panose="020B0606030504020204" pitchFamily="34" charset="0"/>
+                <a:ea typeface="Open Sans" panose="020B0606030504020204" pitchFamily="34" charset="0"/>
+                <a:cs typeface="Open Sans" panose="020B0606030504020204" pitchFamily="34" charset="0"/>
+              </a:rPr>
+              <a:t>COMPILER</a:t>
+            </a:r>
+            <a:endParaRPr lang="de-DE" dirty="0">
+              <a:latin typeface="Open Sans" panose="020B0606030504020204" pitchFamily="34" charset="0"/>
+              <a:ea typeface="Open Sans" panose="020B0606030504020204" pitchFamily="34" charset="0"/>
+              <a:cs typeface="Open Sans" panose="020B0606030504020204" pitchFamily="34" charset="0"/>
             </a:endParaRPr>
           </a:p>
         </p:txBody>
@@ -4975,7 +5547,9 @@
             </a:pPr>
             <a:r>
               <a:rPr lang="de-DE" sz="2000" dirty="0">
-                <a:latin typeface="Kallisto Lined" panose="00000A00000000000000" pitchFamily="50" charset="0"/>
+                <a:latin typeface="Open Sans" panose="020B0606030504020204" pitchFamily="34" charset="0"/>
+                <a:ea typeface="Open Sans" panose="020B0606030504020204" pitchFamily="34" charset="0"/>
+                <a:cs typeface="Open Sans" panose="020B0606030504020204" pitchFamily="34" charset="0"/>
               </a:rPr>
               <a:t>man könnte Elm als eigene Programmiersprache bezeichnen</a:t>
             </a:r>
@@ -4993,7 +5567,9 @@
             </a:pPr>
             <a:r>
               <a:rPr lang="de-DE" sz="2000" dirty="0">
-                <a:latin typeface="Kallisto Lined" panose="00000A00000000000000" pitchFamily="50" charset="0"/>
+                <a:latin typeface="Open Sans" panose="020B0606030504020204" pitchFamily="34" charset="0"/>
+                <a:ea typeface="Open Sans" panose="020B0606030504020204" pitchFamily="34" charset="0"/>
+                <a:cs typeface="Open Sans" panose="020B0606030504020204" pitchFamily="34" charset="0"/>
               </a:rPr>
               <a:t>Elm ist jedoch eine JS – Framework</a:t>
             </a:r>
@@ -5010,7 +5586,9 @@
               <a:buChar char="§"/>
             </a:pPr>
             <a:endParaRPr lang="de-DE" sz="2000" dirty="0">
-              <a:latin typeface="Kallisto Lined" panose="00000A00000000000000" pitchFamily="50" charset="0"/>
+              <a:latin typeface="Open Sans" panose="020B0606030504020204" pitchFamily="34" charset="0"/>
+              <a:ea typeface="Open Sans" panose="020B0606030504020204" pitchFamily="34" charset="0"/>
+              <a:cs typeface="Open Sans" panose="020B0606030504020204" pitchFamily="34" charset="0"/>
             </a:endParaRPr>
           </a:p>
           <a:p>
@@ -5026,7 +5604,9 @@
             </a:pPr>
             <a:r>
               <a:rPr lang="de-DE" sz="2000" dirty="0">
-                <a:latin typeface="Kallisto Lined" panose="00000A00000000000000" pitchFamily="50" charset="0"/>
+                <a:latin typeface="Open Sans" panose="020B0606030504020204" pitchFamily="34" charset="0"/>
+                <a:ea typeface="Open Sans" panose="020B0606030504020204" pitchFamily="34" charset="0"/>
+                <a:cs typeface="Open Sans" panose="020B0606030504020204" pitchFamily="34" charset="0"/>
               </a:rPr>
               <a:t>Was ist ein Compiler?</a:t>
             </a:r>
@@ -5045,9 +5625,11 @@
             </a:pPr>
             <a:r>
               <a:rPr lang="de-DE" sz="2000" dirty="0">
-                <a:latin typeface="Kallisto Lined" panose="00000A00000000000000" pitchFamily="50" charset="0"/>
-              </a:rPr>
-              <a:t>	Ein Compiler ist ein Übersetzer, welcher einen menschlich gut lesbaren 	Code in einen für einen Computer ausführbaren Quellcode übersetzt.</a:t>
+                <a:latin typeface="Open Sans" panose="020B0606030504020204" pitchFamily="34" charset="0"/>
+                <a:ea typeface="Open Sans" panose="020B0606030504020204" pitchFamily="34" charset="0"/>
+                <a:cs typeface="Open Sans" panose="020B0606030504020204" pitchFamily="34" charset="0"/>
+              </a:rPr>
+              <a:t>	Ein Compiler ist ein Übersetzer, welcher einen menschlich gut lesbaren Code in einen 	für einen Computer ausführbaren Quellcode übersetzt.</a:t>
             </a:r>
           </a:p>
           <a:p>
@@ -5063,7 +5645,9 @@
             </a:pPr>
             <a:r>
               <a:rPr lang="de-DE" sz="2000" dirty="0">
-                <a:latin typeface="Kallisto Lined" panose="00000A00000000000000" pitchFamily="50" charset="0"/>
+                <a:latin typeface="Open Sans" panose="020B0606030504020204" pitchFamily="34" charset="0"/>
+                <a:ea typeface="Open Sans" panose="020B0606030504020204" pitchFamily="34" charset="0"/>
+                <a:cs typeface="Open Sans" panose="020B0606030504020204" pitchFamily="34" charset="0"/>
               </a:rPr>
               <a:t>Elm Compiler</a:t>
             </a:r>
@@ -5082,9 +5666,11 @@
             </a:pPr>
             <a:r>
               <a:rPr lang="de-DE" sz="2000" dirty="0">
-                <a:latin typeface="Kallisto Lined" panose="00000A00000000000000" pitchFamily="50" charset="0"/>
-              </a:rPr>
-              <a:t>	Der Elm Compiler ist deine bessere „Programmierhälfte“. Er sagt dir wo 	deine Fehler liegen und gibt dir Tipps was du ändern könntest. </a:t>
+                <a:latin typeface="Open Sans" panose="020B0606030504020204" pitchFamily="34" charset="0"/>
+                <a:ea typeface="Open Sans" panose="020B0606030504020204" pitchFamily="34" charset="0"/>
+                <a:cs typeface="Open Sans" panose="020B0606030504020204" pitchFamily="34" charset="0"/>
+              </a:rPr>
+              <a:t>	Der Elm Compiler ist dein Programmierpartner. Er sagt dir wo deine Fehler liegen und 	gibt dir Tipps was du ändern könntest. </a:t>
             </a:r>
           </a:p>
         </p:txBody>
@@ -5161,31 +5747,12 @@
           <a:p>
             <a:r>
               <a:rPr lang="de-DE" sz="2000" dirty="0">
-                <a:latin typeface="Kallisto Lined" panose="00000A00000000000000"/>
-              </a:rPr>
-              <a:t>aus Elm wird </a:t>
-            </a:r>
-            <a:r>
-              <a:rPr lang="de-DE" sz="2000" spc="-300" dirty="0">
-                <a:latin typeface="Kallisto Lined" panose="00000A00000000000000" pitchFamily="50" charset="0"/>
-              </a:rPr>
-              <a:t>J</a:t>
-            </a:r>
-            <a:r>
-              <a:rPr lang="de-DE" sz="2000" spc="300" dirty="0">
-                <a:latin typeface="Kallisto Lined" panose="00000A00000000000000" pitchFamily="50" charset="0"/>
-              </a:rPr>
-              <a:t>av</a:t>
-            </a:r>
-            <a:r>
-              <a:rPr lang="de-DE" sz="2000" dirty="0">
-                <a:latin typeface="Kallisto Lined" panose="00000A00000000000000" pitchFamily="50" charset="0"/>
-              </a:rPr>
-              <a:t>aScript</a:t>
-            </a:r>
-            <a:endParaRPr lang="de-DE" sz="2000" dirty="0">
-              <a:latin typeface="Kallisto Lined" panose="00000A00000000000000"/>
-            </a:endParaRPr>
+                <a:latin typeface="Open Sans" panose="020B0606030504020204" pitchFamily="34" charset="0"/>
+                <a:ea typeface="Open Sans" panose="020B0606030504020204" pitchFamily="34" charset="0"/>
+                <a:cs typeface="Open Sans" panose="020B0606030504020204" pitchFamily="34" charset="0"/>
+              </a:rPr>
+              <a:t>aus Elm wird JavaScript</a:t>
+            </a:r>
           </a:p>
         </p:txBody>
       </p:sp>
@@ -5987,10 +6554,10 @@
       </p:grpSpPr>
       <p:pic>
         <p:nvPicPr>
-          <p:cNvPr id="12" name="Grafik 11">
+          <p:cNvPr id="2" name="Grafik 1">
             <a:extLst>
               <a:ext uri="{FF2B5EF4-FFF2-40B4-BE49-F238E27FC236}">
-                <a16:creationId xmlns:a16="http://schemas.microsoft.com/office/drawing/2014/main" id="{16DCA9F1-7A95-4C9B-9AAF-D86BABE3146B}"/>
+                <a16:creationId xmlns:a16="http://schemas.microsoft.com/office/drawing/2014/main" id="{E71F756A-49D2-D54C-8511-C95218BA1739}"/>
               </a:ext>
             </a:extLst>
           </p:cNvPr>
@@ -5999,22 +6566,15 @@
           </p:cNvPicPr>
           <p:nvPr/>
         </p:nvPicPr>
-        <p:blipFill>
-          <a:blip r:embed="rId2">
-            <a:extLst>
-              <a:ext uri="{28A0092B-C50C-407E-A947-70E740481C1C}">
-                <a14:useLocalDpi xmlns:a14="http://schemas.microsoft.com/office/drawing/2010/main" val="0"/>
-              </a:ext>
-            </a:extLst>
-          </a:blip>
-          <a:stretch>
-            <a:fillRect/>
-          </a:stretch>
+        <p:blipFill rotWithShape="1">
+          <a:blip r:embed="rId3"/>
+          <a:srcRect l="-65" t="7059" r="32222" b="50000"/>
+          <a:stretch/>
         </p:blipFill>
         <p:spPr>
           <a:xfrm>
-            <a:off x="546756" y="1262980"/>
-            <a:ext cx="9907570" cy="4303601"/>
+            <a:off x="580912" y="1514138"/>
+            <a:ext cx="9878133" cy="3907715"/>
           </a:xfrm>
           <a:prstGeom prst="rect">
             <a:avLst/>
@@ -6024,7 +6584,7 @@
     </p:spTree>
     <p:extLst>
       <p:ext uri="{BB962C8B-B14F-4D97-AF65-F5344CB8AC3E}">
-        <p14:creationId xmlns:p14="http://schemas.microsoft.com/office/powerpoint/2010/main" val="4187066482"/>
+        <p14:creationId xmlns:p14="http://schemas.microsoft.com/office/powerpoint/2010/main" val="4112260837"/>
       </p:ext>
     </p:extLst>
   </p:cSld>
@@ -6035,204 +6595,6 @@
 </file>
 
 <file path=ppt/slides/slide12.xml><?xml version="1.0" encoding="utf-8"?>
-<p:sld xmlns:a="http://schemas.openxmlformats.org/drawingml/2006/main" xmlns:r="http://schemas.openxmlformats.org/officeDocument/2006/relationships" xmlns:p="http://schemas.openxmlformats.org/presentationml/2006/main">
-  <p:cSld>
-    <p:spTree>
-      <p:nvGrpSpPr>
-        <p:cNvPr id="1" name=""/>
-        <p:cNvGrpSpPr/>
-        <p:nvPr/>
-      </p:nvGrpSpPr>
-      <p:grpSpPr>
-        <a:xfrm>
-          <a:off x="0" y="0"/>
-          <a:ext cx="0" cy="0"/>
-          <a:chOff x="0" y="0"/>
-          <a:chExt cx="0" cy="0"/>
-        </a:xfrm>
-      </p:grpSpPr>
-      <p:pic>
-        <p:nvPicPr>
-          <p:cNvPr id="5" name="Grafik 4">
-            <a:extLst>
-              <a:ext uri="{FF2B5EF4-FFF2-40B4-BE49-F238E27FC236}">
-                <a16:creationId xmlns:a16="http://schemas.microsoft.com/office/drawing/2014/main" id="{099C967B-3D57-4AB4-BBD7-FBC2FB0809E2}"/>
-              </a:ext>
-            </a:extLst>
-          </p:cNvPr>
-          <p:cNvPicPr>
-            <a:picLocks noChangeAspect="1"/>
-          </p:cNvPicPr>
-          <p:nvPr/>
-        </p:nvPicPr>
-        <p:blipFill>
-          <a:blip r:embed="rId2">
-            <a:extLst>
-              <a:ext uri="{28A0092B-C50C-407E-A947-70E740481C1C}">
-                <a14:useLocalDpi xmlns:a14="http://schemas.microsoft.com/office/drawing/2010/main" val="0"/>
-              </a:ext>
-            </a:extLst>
-          </a:blip>
-          <a:stretch>
-            <a:fillRect/>
-          </a:stretch>
-        </p:blipFill>
-        <p:spPr>
-          <a:xfrm>
-            <a:off x="527902" y="1262980"/>
-            <a:ext cx="9935852" cy="4024020"/>
-          </a:xfrm>
-          <a:prstGeom prst="rect">
-            <a:avLst/>
-          </a:prstGeom>
-        </p:spPr>
-      </p:pic>
-    </p:spTree>
-    <p:extLst>
-      <p:ext uri="{BB962C8B-B14F-4D97-AF65-F5344CB8AC3E}">
-        <p14:creationId xmlns:p14="http://schemas.microsoft.com/office/powerpoint/2010/main" val="2495741774"/>
-      </p:ext>
-    </p:extLst>
-  </p:cSld>
-  <p:clrMapOvr>
-    <a:masterClrMapping/>
-  </p:clrMapOvr>
-</p:sld>
-</file>
-
-<file path=ppt/slides/slide13.xml><?xml version="1.0" encoding="utf-8"?>
-<p:sld xmlns:a="http://schemas.openxmlformats.org/drawingml/2006/main" xmlns:r="http://schemas.openxmlformats.org/officeDocument/2006/relationships" xmlns:p="http://schemas.openxmlformats.org/presentationml/2006/main">
-  <p:cSld>
-    <p:spTree>
-      <p:nvGrpSpPr>
-        <p:cNvPr id="1" name=""/>
-        <p:cNvGrpSpPr/>
-        <p:nvPr/>
-      </p:nvGrpSpPr>
-      <p:grpSpPr>
-        <a:xfrm>
-          <a:off x="0" y="0"/>
-          <a:ext cx="0" cy="0"/>
-          <a:chOff x="0" y="0"/>
-          <a:chExt cx="0" cy="0"/>
-        </a:xfrm>
-      </p:grpSpPr>
-      <p:pic>
-        <p:nvPicPr>
-          <p:cNvPr id="9" name="Grafik 8">
-            <a:extLst>
-              <a:ext uri="{FF2B5EF4-FFF2-40B4-BE49-F238E27FC236}">
-                <a16:creationId xmlns:a16="http://schemas.microsoft.com/office/drawing/2014/main" id="{234546DA-7D72-48F6-B8FB-D4079D322AFB}"/>
-              </a:ext>
-            </a:extLst>
-          </p:cNvPr>
-          <p:cNvPicPr>
-            <a:picLocks noChangeAspect="1"/>
-          </p:cNvPicPr>
-          <p:nvPr/>
-        </p:nvPicPr>
-        <p:blipFill>
-          <a:blip r:embed="rId2">
-            <a:extLst>
-              <a:ext uri="{28A0092B-C50C-407E-A947-70E740481C1C}">
-                <a14:useLocalDpi xmlns:a14="http://schemas.microsoft.com/office/drawing/2010/main" val="0"/>
-              </a:ext>
-            </a:extLst>
-          </a:blip>
-          <a:stretch>
-            <a:fillRect/>
-          </a:stretch>
-        </p:blipFill>
-        <p:spPr>
-          <a:xfrm>
-            <a:off x="536030" y="1262980"/>
-            <a:ext cx="9910723" cy="3648385"/>
-          </a:xfrm>
-          <a:prstGeom prst="rect">
-            <a:avLst/>
-          </a:prstGeom>
-        </p:spPr>
-      </p:pic>
-    </p:spTree>
-    <p:extLst>
-      <p:ext uri="{BB962C8B-B14F-4D97-AF65-F5344CB8AC3E}">
-        <p14:creationId xmlns:p14="http://schemas.microsoft.com/office/powerpoint/2010/main" val="943867450"/>
-      </p:ext>
-    </p:extLst>
-  </p:cSld>
-  <p:clrMapOvr>
-    <a:masterClrMapping/>
-  </p:clrMapOvr>
-</p:sld>
-</file>
-
-<file path=ppt/slides/slide14.xml><?xml version="1.0" encoding="utf-8"?>
-<p:sld xmlns:a="http://schemas.openxmlformats.org/drawingml/2006/main" xmlns:r="http://schemas.openxmlformats.org/officeDocument/2006/relationships" xmlns:p="http://schemas.openxmlformats.org/presentationml/2006/main">
-  <p:cSld>
-    <p:spTree>
-      <p:nvGrpSpPr>
-        <p:cNvPr id="1" name=""/>
-        <p:cNvGrpSpPr/>
-        <p:nvPr/>
-      </p:nvGrpSpPr>
-      <p:grpSpPr>
-        <a:xfrm>
-          <a:off x="0" y="0"/>
-          <a:ext cx="0" cy="0"/>
-          <a:chOff x="0" y="0"/>
-          <a:chExt cx="0" cy="0"/>
-        </a:xfrm>
-      </p:grpSpPr>
-      <p:pic>
-        <p:nvPicPr>
-          <p:cNvPr id="3" name="Grafik 2">
-            <a:extLst>
-              <a:ext uri="{FF2B5EF4-FFF2-40B4-BE49-F238E27FC236}">
-                <a16:creationId xmlns:a16="http://schemas.microsoft.com/office/drawing/2014/main" id="{3CA491A3-C209-4236-A99A-D3BE35B818EB}"/>
-              </a:ext>
-            </a:extLst>
-          </p:cNvPr>
-          <p:cNvPicPr>
-            <a:picLocks noChangeAspect="1"/>
-          </p:cNvPicPr>
-          <p:nvPr/>
-        </p:nvPicPr>
-        <p:blipFill>
-          <a:blip r:embed="rId2">
-            <a:extLst>
-              <a:ext uri="{28A0092B-C50C-407E-A947-70E740481C1C}">
-                <a14:useLocalDpi xmlns:a14="http://schemas.microsoft.com/office/drawing/2010/main" val="0"/>
-              </a:ext>
-            </a:extLst>
-          </a:blip>
-          <a:stretch>
-            <a:fillRect/>
-          </a:stretch>
-        </p:blipFill>
-        <p:spPr>
-          <a:xfrm>
-            <a:off x="518475" y="1270379"/>
-            <a:ext cx="9839866" cy="4317241"/>
-          </a:xfrm>
-          <a:prstGeom prst="rect">
-            <a:avLst/>
-          </a:prstGeom>
-        </p:spPr>
-      </p:pic>
-    </p:spTree>
-    <p:extLst>
-      <p:ext uri="{BB962C8B-B14F-4D97-AF65-F5344CB8AC3E}">
-        <p14:creationId xmlns:p14="http://schemas.microsoft.com/office/powerpoint/2010/main" val="1104820439"/>
-      </p:ext>
-    </p:extLst>
-  </p:cSld>
-  <p:clrMapOvr>
-    <a:masterClrMapping/>
-  </p:clrMapOvr>
-</p:sld>
-</file>
-
-<file path=ppt/slides/slide15.xml><?xml version="1.0" encoding="utf-8"?>
 <p:sld xmlns:a="http://schemas.openxmlformats.org/drawingml/2006/main" xmlns:r="http://schemas.openxmlformats.org/officeDocument/2006/relationships" xmlns:p="http://schemas.openxmlformats.org/presentationml/2006/main">
   <p:cSld>
     <p:spTree>
@@ -6325,12 +6687,16 @@
           <a:p>
             <a:r>
               <a:rPr lang="de-DE" sz="3200" b="1" dirty="0">
-                <a:latin typeface="Kallisto Lined" panose="00000A00000000000000" pitchFamily="50" charset="0"/>
+                <a:latin typeface="Open Sans" panose="020B0606030504020204" pitchFamily="34" charset="0"/>
+                <a:ea typeface="Open Sans" panose="020B0606030504020204" pitchFamily="34" charset="0"/>
+                <a:cs typeface="Open Sans" panose="020B0606030504020204" pitchFamily="34" charset="0"/>
               </a:rPr>
               <a:t>BEWERTUNG</a:t>
             </a:r>
-            <a:endParaRPr lang="de-DE" spc="-650" dirty="0">
-              <a:latin typeface="Kallisto Lined" panose="00000A00000000000000" pitchFamily="50" charset="0"/>
+            <a:endParaRPr lang="de-DE" dirty="0">
+              <a:latin typeface="Open Sans" panose="020B0606030504020204" pitchFamily="34" charset="0"/>
+              <a:ea typeface="Open Sans" panose="020B0606030504020204" pitchFamily="34" charset="0"/>
+              <a:cs typeface="Open Sans" panose="020B0606030504020204" pitchFamily="34" charset="0"/>
             </a:endParaRPr>
           </a:p>
         </p:txBody>
@@ -6468,7 +6834,9 @@
             <a:r>
               <a:rPr lang="de-DE" sz="2000" dirty="0">
                 <a:effectLst/>
-                <a:latin typeface="Kallisto Lined" panose="00000A00000000000000" pitchFamily="50" charset="0"/>
+                <a:latin typeface="Open Sans" panose="020B0606030504020204" pitchFamily="34" charset="0"/>
+                <a:ea typeface="Open Sans" panose="020B0606030504020204" pitchFamily="34" charset="0"/>
+                <a:cs typeface="Open Sans" panose="020B0606030504020204" pitchFamily="34" charset="0"/>
               </a:rPr>
               <a:t>Positiv:</a:t>
             </a:r>
@@ -6486,7 +6854,9 @@
             </a:pPr>
             <a:r>
               <a:rPr lang="de-DE" sz="2000" dirty="0">
-                <a:latin typeface="Kallisto Lined" panose="00000A00000000000000" pitchFamily="50" charset="0"/>
+                <a:latin typeface="Open Sans" panose="020B0606030504020204" pitchFamily="34" charset="0"/>
+                <a:ea typeface="Open Sans" panose="020B0606030504020204" pitchFamily="34" charset="0"/>
+                <a:cs typeface="Open Sans" panose="020B0606030504020204" pitchFamily="34" charset="0"/>
               </a:rPr>
               <a:t>gut verständlich</a:t>
             </a:r>
@@ -6504,18 +6874,24 @@
             </a:pPr>
             <a:r>
               <a:rPr lang="de-DE" sz="2000" dirty="0">
-                <a:latin typeface="Kallisto Lined" panose="00000A00000000000000" pitchFamily="50" charset="0"/>
+                <a:latin typeface="Open Sans" panose="020B0606030504020204" pitchFamily="34" charset="0"/>
+                <a:ea typeface="Open Sans" panose="020B0606030504020204" pitchFamily="34" charset="0"/>
+                <a:cs typeface="Open Sans" panose="020B0606030504020204" pitchFamily="34" charset="0"/>
               </a:rPr>
               <a:t>gutes </a:t>
             </a:r>
             <a:r>
               <a:rPr lang="de-DE" sz="2000" dirty="0" err="1">
-                <a:latin typeface="Kallisto Lined" panose="00000A00000000000000" pitchFamily="50" charset="0"/>
+                <a:latin typeface="Open Sans" panose="020B0606030504020204" pitchFamily="34" charset="0"/>
+                <a:ea typeface="Open Sans" panose="020B0606030504020204" pitchFamily="34" charset="0"/>
+                <a:cs typeface="Open Sans" panose="020B0606030504020204" pitchFamily="34" charset="0"/>
               </a:rPr>
               <a:t>Errorhandling</a:t>
             </a:r>
             <a:endParaRPr lang="de-DE" sz="2000" dirty="0">
-              <a:latin typeface="Kallisto Lined" panose="00000A00000000000000" pitchFamily="50" charset="0"/>
+              <a:latin typeface="Open Sans" panose="020B0606030504020204" pitchFamily="34" charset="0"/>
+              <a:ea typeface="Open Sans" panose="020B0606030504020204" pitchFamily="34" charset="0"/>
+              <a:cs typeface="Open Sans" panose="020B0606030504020204" pitchFamily="34" charset="0"/>
             </a:endParaRPr>
           </a:p>
           <a:p>
@@ -6531,7 +6907,9 @@
             </a:pPr>
             <a:r>
               <a:rPr lang="de-DE" sz="2000" dirty="0">
-                <a:latin typeface="Kallisto Lined" panose="00000A00000000000000" pitchFamily="50" charset="0"/>
+                <a:latin typeface="Open Sans" panose="020B0606030504020204" pitchFamily="34" charset="0"/>
+                <a:ea typeface="Open Sans" panose="020B0606030504020204" pitchFamily="34" charset="0"/>
+                <a:cs typeface="Open Sans" panose="020B0606030504020204" pitchFamily="34" charset="0"/>
               </a:rPr>
               <a:t>funktionale Programmierung</a:t>
             </a:r>
@@ -6549,7 +6927,9 @@
             </a:pPr>
             <a:r>
               <a:rPr lang="de-DE" sz="2000" dirty="0">
-                <a:latin typeface="Kallisto Lined" panose="00000A00000000000000" pitchFamily="50" charset="0"/>
+                <a:latin typeface="Open Sans" panose="020B0606030504020204" pitchFamily="34" charset="0"/>
+                <a:ea typeface="Open Sans" panose="020B0606030504020204" pitchFamily="34" charset="0"/>
+                <a:cs typeface="Open Sans" panose="020B0606030504020204" pitchFamily="34" charset="0"/>
               </a:rPr>
               <a:t>sauberer Code</a:t>
             </a:r>
@@ -6564,7 +6944,9 @@
               </a:buClr>
             </a:pPr>
             <a:endParaRPr lang="de-DE" sz="2000" dirty="0">
-              <a:latin typeface="Kallisto Lined" panose="00000A00000000000000" pitchFamily="50" charset="0"/>
+              <a:latin typeface="Open Sans" panose="020B0606030504020204" pitchFamily="34" charset="0"/>
+              <a:ea typeface="Open Sans" panose="020B0606030504020204" pitchFamily="34" charset="0"/>
+              <a:cs typeface="Open Sans" panose="020B0606030504020204" pitchFamily="34" charset="0"/>
             </a:endParaRPr>
           </a:p>
           <a:p>
@@ -6581,7 +6963,9 @@
             <a:r>
               <a:rPr lang="de-DE" sz="2000" dirty="0">
                 <a:effectLst/>
-                <a:latin typeface="Kallisto Lined" panose="00000A00000000000000" pitchFamily="50" charset="0"/>
+                <a:latin typeface="Open Sans" panose="020B0606030504020204" pitchFamily="34" charset="0"/>
+                <a:ea typeface="Open Sans" panose="020B0606030504020204" pitchFamily="34" charset="0"/>
+                <a:cs typeface="Open Sans" panose="020B0606030504020204" pitchFamily="34" charset="0"/>
               </a:rPr>
               <a:t>Negativ:</a:t>
             </a:r>
@@ -6600,23 +6984,11 @@
             <a:r>
               <a:rPr lang="de-DE" sz="2000" dirty="0">
                 <a:effectLst/>
-                <a:latin typeface="Kallisto Lined" panose="00000A00000000000000" pitchFamily="50" charset="0"/>
-              </a:rPr>
-              <a:t>aufwendige Einarbeitung erforderli</a:t>
-            </a:r>
-            <a:r>
-              <a:rPr lang="de-DE" sz="2000" spc="-300" dirty="0">
-                <a:effectLst/>
-                <a:latin typeface="Kallisto Lined" panose="00000A00000000000000" pitchFamily="50" charset="0"/>
-              </a:rPr>
-              <a:t>c</a:t>
-            </a:r>
-            <a:r>
-              <a:rPr lang="de-DE" sz="2000" dirty="0">
-                <a:effectLst/>
-                <a:latin typeface="Kallisto Lined" panose="00000A00000000000000" pitchFamily="50" charset="0"/>
-              </a:rPr>
-              <a:t>h</a:t>
+                <a:latin typeface="Open Sans" panose="020B0606030504020204" pitchFamily="34" charset="0"/>
+                <a:ea typeface="Open Sans" panose="020B0606030504020204" pitchFamily="34" charset="0"/>
+                <a:cs typeface="Open Sans" panose="020B0606030504020204" pitchFamily="34" charset="0"/>
+              </a:rPr>
+              <a:t>aufwendige Einarbeitung erforderlich</a:t>
             </a:r>
           </a:p>
         </p:txBody>
@@ -7291,7 +7663,7 @@
 </p:sld>
 </file>
 
-<file path=ppt/slides/slide16.xml><?xml version="1.0" encoding="utf-8"?>
+<file path=ppt/slides/slide13.xml><?xml version="1.0" encoding="utf-8"?>
 <p:sld xmlns:a="http://schemas.openxmlformats.org/drawingml/2006/main" xmlns:r="http://schemas.openxmlformats.org/officeDocument/2006/relationships" xmlns:p="http://schemas.openxmlformats.org/presentationml/2006/main">
   <p:cSld>
     <p:spTree>
@@ -7323,7 +7695,7 @@
           <p:nvPr/>
         </p:nvPicPr>
         <p:blipFill>
-          <a:blip r:embed="rId2">
+          <a:blip r:embed="rId3">
             <a:extLst>
               <a:ext uri="{28A0092B-C50C-407E-A947-70E740481C1C}">
                 <a14:useLocalDpi xmlns:a14="http://schemas.microsoft.com/office/drawing/2010/main" val="0"/>
@@ -7582,6 +7954,17 @@
           <a:p>
             <a:pPr algn="ctr"/>
             <a:r>
+              <a:rPr lang="de-DE" sz="4000" dirty="0">
+                <a:solidFill>
+                  <a:schemeClr val="bg1"/>
+                </a:solidFill>
+                <a:latin typeface="Open Sans" panose="020B0606030504020204" pitchFamily="34" charset="0"/>
+                <a:ea typeface="Open Sans" panose="020B0606030504020204" pitchFamily="34" charset="0"/>
+                <a:cs typeface="Open Sans" panose="020B0606030504020204" pitchFamily="34" charset="0"/>
+              </a:rPr>
+              <a:t>Noch</a:t>
+            </a:r>
+            <a:r>
               <a:rPr lang="de-DE" sz="4000" spc="300" dirty="0">
                 <a:solidFill>
                   <a:schemeClr val="bg1"/>
@@ -7590,7 +7973,7 @@
                 <a:ea typeface="MS Gothic" panose="020B0609070205080204" pitchFamily="49" charset="-128"/>
                 <a:cs typeface="Open Sans" panose="020B0606030504020204" pitchFamily="34" charset="0"/>
               </a:rPr>
-              <a:t>Noch Fragen ?</a:t>
+              <a:t> Fragen ?</a:t>
             </a:r>
           </a:p>
         </p:txBody>
@@ -7828,7 +8211,7 @@
         </p:nvSpPr>
         <p:spPr>
           <a:xfrm>
-            <a:off x="2401039" y="682566"/>
+            <a:off x="2248348" y="682566"/>
             <a:ext cx="450850" cy="584775"/>
           </a:xfrm>
           <a:prstGeom prst="rect">
@@ -7838,7 +8221,7 @@
         </p:spPr>
         <p:txBody>
           <a:bodyPr wrap="square" rtlCol="0">
-            <a:spAutoFit/>
+            <a:noAutofit/>
           </a:bodyPr>
           <a:lstStyle/>
           <a:p>
@@ -7875,7 +8258,7 @@
         <p:spPr>
           <a:xfrm>
             <a:off x="465847" y="682565"/>
-            <a:ext cx="2151063" cy="584775"/>
+            <a:ext cx="1782501" cy="584775"/>
           </a:xfrm>
           <a:prstGeom prst="rect">
             <a:avLst/>
@@ -7890,18 +8273,16 @@
           <a:p>
             <a:r>
               <a:rPr lang="de-DE" sz="3200" b="1" dirty="0">
-                <a:latin typeface="Kallisto Lined" panose="00000A00000000000000" pitchFamily="50" charset="0"/>
-              </a:rPr>
-              <a:t>WAS I</a:t>
-            </a:r>
-            <a:r>
-              <a:rPr lang="de-DE" sz="3200" b="1" spc="-650" dirty="0">
-                <a:latin typeface="Kallisto Lined" panose="00000A00000000000000" pitchFamily="50" charset="0"/>
-              </a:rPr>
-              <a:t>ST</a:t>
-            </a:r>
-            <a:endParaRPr lang="de-DE" spc="-650" dirty="0">
-              <a:latin typeface="Kallisto Lined" panose="00000A00000000000000" pitchFamily="50" charset="0"/>
+                <a:latin typeface="Open Sans" panose="020B0606030504020204" pitchFamily="34" charset="0"/>
+                <a:ea typeface="Open Sans" panose="020B0606030504020204" pitchFamily="34" charset="0"/>
+                <a:cs typeface="Open Sans" panose="020B0606030504020204" pitchFamily="34" charset="0"/>
+              </a:rPr>
+              <a:t>WAS IST</a:t>
+            </a:r>
+            <a:endParaRPr lang="de-DE" dirty="0">
+              <a:latin typeface="Open Sans" panose="020B0606030504020204" pitchFamily="34" charset="0"/>
+              <a:ea typeface="Open Sans" panose="020B0606030504020204" pitchFamily="34" charset="0"/>
+              <a:cs typeface="Open Sans" panose="020B0606030504020204" pitchFamily="34" charset="0"/>
             </a:endParaRPr>
           </a:p>
         </p:txBody>
@@ -7920,7 +8301,7 @@
         </p:nvSpPr>
         <p:spPr>
           <a:xfrm>
-            <a:off x="2677264" y="682566"/>
+            <a:off x="2524573" y="682566"/>
             <a:ext cx="450850" cy="584775"/>
           </a:xfrm>
           <a:prstGeom prst="rect">
@@ -7930,7 +8311,7 @@
         </p:spPr>
         <p:txBody>
           <a:bodyPr wrap="square" rtlCol="0">
-            <a:spAutoFit/>
+            <a:noAutofit/>
           </a:bodyPr>
           <a:lstStyle/>
           <a:p>
@@ -7966,7 +8347,7 @@
         </p:nvSpPr>
         <p:spPr>
           <a:xfrm>
-            <a:off x="2912214" y="682565"/>
+            <a:off x="2759523" y="682565"/>
             <a:ext cx="450850" cy="584775"/>
           </a:xfrm>
           <a:prstGeom prst="rect">
@@ -7976,7 +8357,7 @@
         </p:spPr>
         <p:txBody>
           <a:bodyPr wrap="square" rtlCol="0">
-            <a:spAutoFit/>
+            <a:noAutofit/>
           </a:bodyPr>
           <a:lstStyle/>
           <a:p>
@@ -8012,7 +8393,7 @@
         </p:nvSpPr>
         <p:spPr>
           <a:xfrm>
-            <a:off x="3372590" y="682565"/>
+            <a:off x="3219899" y="682565"/>
             <a:ext cx="450850" cy="584775"/>
           </a:xfrm>
           <a:prstGeom prst="rect">
@@ -8022,7 +8403,7 @@
         </p:spPr>
         <p:txBody>
           <a:bodyPr wrap="square" rtlCol="0">
-            <a:spAutoFit/>
+            <a:noAutofit/>
           </a:bodyPr>
           <a:lstStyle/>
           <a:p>
@@ -8078,7 +8459,9 @@
             </a:pPr>
             <a:r>
               <a:rPr lang="de-DE" sz="2400" dirty="0">
-                <a:latin typeface="Kallisto Lined" panose="00000A00000000000000" pitchFamily="50" charset="0"/>
+                <a:latin typeface="Open Sans" panose="020B0606030504020204" pitchFamily="34" charset="0"/>
+                <a:ea typeface="Open Sans" panose="020B0606030504020204" pitchFamily="34" charset="0"/>
+                <a:cs typeface="Open Sans" panose="020B0606030504020204" pitchFamily="34" charset="0"/>
               </a:rPr>
               <a:t>Ist ein Framework</a:t>
             </a:r>
@@ -8096,7 +8479,9 @@
             </a:pPr>
             <a:r>
               <a:rPr lang="de-DE" sz="2400" dirty="0">
-                <a:latin typeface="Kallisto Lined" panose="00000A00000000000000" pitchFamily="50" charset="0"/>
+                <a:latin typeface="Open Sans" panose="020B0606030504020204" pitchFamily="34" charset="0"/>
+                <a:ea typeface="Open Sans" panose="020B0606030504020204" pitchFamily="34" charset="0"/>
+                <a:cs typeface="Open Sans" panose="020B0606030504020204" pitchFamily="34" charset="0"/>
               </a:rPr>
               <a:t>„eigene Programmiersprache“</a:t>
             </a:r>
@@ -8114,27 +8499,11 @@
             </a:pPr>
             <a:r>
               <a:rPr lang="de-DE" sz="2400" dirty="0">
-                <a:latin typeface="Kallisto Lined" panose="00000A00000000000000" pitchFamily="50" charset="0"/>
-              </a:rPr>
-              <a:t>Basiert auf  </a:t>
-            </a:r>
-            <a:r>
-              <a:rPr lang="de-DE" sz="2400" spc="-300" dirty="0">
-                <a:latin typeface="Kallisto Lined" panose="00000A00000000000000" pitchFamily="50" charset="0"/>
-              </a:rPr>
-              <a:t>J</a:t>
-            </a:r>
-            <a:r>
-              <a:rPr lang="de-DE" sz="2400" spc="300" dirty="0">
-                <a:latin typeface="Kallisto Lined" panose="00000A00000000000000" pitchFamily="50" charset="0"/>
-              </a:rPr>
-              <a:t>av</a:t>
-            </a:r>
-            <a:r>
-              <a:rPr lang="de-DE" sz="2400" dirty="0">
-                <a:latin typeface="Kallisto Lined" panose="00000A00000000000000" pitchFamily="50" charset="0"/>
-              </a:rPr>
-              <a:t>aScript </a:t>
+                <a:latin typeface="Open Sans" panose="020B0606030504020204" pitchFamily="34" charset="0"/>
+                <a:ea typeface="Open Sans" panose="020B0606030504020204" pitchFamily="34" charset="0"/>
+                <a:cs typeface="Open Sans" panose="020B0606030504020204" pitchFamily="34" charset="0"/>
+              </a:rPr>
+              <a:t>Basiert auf  JavaScript </a:t>
             </a:r>
           </a:p>
           <a:p>
@@ -8150,27 +8519,11 @@
             </a:pPr>
             <a:r>
               <a:rPr lang="de-DE" sz="2400" dirty="0">
-                <a:latin typeface="Kallisto Lined" panose="00000A00000000000000" pitchFamily="50" charset="0"/>
-              </a:rPr>
-              <a:t>Wird zu </a:t>
-            </a:r>
-            <a:r>
-              <a:rPr lang="de-DE" sz="2400" spc="-300" dirty="0">
-                <a:latin typeface="Kallisto Lined" panose="00000A00000000000000" pitchFamily="50" charset="0"/>
-              </a:rPr>
-              <a:t>J</a:t>
-            </a:r>
-            <a:r>
-              <a:rPr lang="de-DE" sz="2400" spc="300" dirty="0">
-                <a:latin typeface="Kallisto Lined" panose="00000A00000000000000" pitchFamily="50" charset="0"/>
-              </a:rPr>
-              <a:t>av</a:t>
-            </a:r>
-            <a:r>
-              <a:rPr lang="de-DE" sz="2400" dirty="0">
-                <a:latin typeface="Kallisto Lined" panose="00000A00000000000000" pitchFamily="50" charset="0"/>
-              </a:rPr>
-              <a:t>aScript umgewandelt</a:t>
+                <a:latin typeface="Open Sans" panose="020B0606030504020204" pitchFamily="34" charset="0"/>
+                <a:ea typeface="Open Sans" panose="020B0606030504020204" pitchFamily="34" charset="0"/>
+                <a:cs typeface="Open Sans" panose="020B0606030504020204" pitchFamily="34" charset="0"/>
+              </a:rPr>
+              <a:t>Wird zu JavaScript umgewandelt</a:t>
             </a:r>
           </a:p>
         </p:txBody>
@@ -8697,7 +9050,7 @@
         </p:nvSpPr>
         <p:spPr>
           <a:xfrm>
-            <a:off x="4083789" y="682566"/>
+            <a:off x="3937300" y="682566"/>
             <a:ext cx="450850" cy="584775"/>
           </a:xfrm>
           <a:prstGeom prst="rect">
@@ -8743,8 +9096,8 @@
         </p:nvSpPr>
         <p:spPr>
           <a:xfrm>
-            <a:off x="465847" y="682565"/>
-            <a:ext cx="3805267" cy="584775"/>
+            <a:off x="465848" y="682565"/>
+            <a:ext cx="3471452" cy="584775"/>
           </a:xfrm>
           <a:prstGeom prst="rect">
             <a:avLst/>
@@ -8759,12 +9112,16 @@
           <a:p>
             <a:r>
               <a:rPr lang="de-DE" sz="3200" b="1" dirty="0">
-                <a:latin typeface="Kallisto Lined" panose="00000A00000000000000" pitchFamily="50" charset="0"/>
+                <a:latin typeface="Open Sans" panose="020B0606030504020204" pitchFamily="34" charset="0"/>
+                <a:ea typeface="Open Sans" panose="020B0606030504020204" pitchFamily="34" charset="0"/>
+                <a:cs typeface="Open Sans" panose="020B0606030504020204" pitchFamily="34" charset="0"/>
               </a:rPr>
               <a:t>WOHER KOMMT</a:t>
             </a:r>
             <a:endParaRPr lang="de-DE" spc="-650" dirty="0">
-              <a:latin typeface="Kallisto Lined" panose="00000A00000000000000" pitchFamily="50" charset="0"/>
+              <a:latin typeface="Open Sans" panose="020B0606030504020204" pitchFamily="34" charset="0"/>
+              <a:ea typeface="Open Sans" panose="020B0606030504020204" pitchFamily="34" charset="0"/>
+              <a:cs typeface="Open Sans" panose="020B0606030504020204" pitchFamily="34" charset="0"/>
             </a:endParaRPr>
           </a:p>
         </p:txBody>
@@ -8783,7 +9140,7 @@
         </p:nvSpPr>
         <p:spPr>
           <a:xfrm>
-            <a:off x="4360014" y="682566"/>
+            <a:off x="4213525" y="682566"/>
             <a:ext cx="450850" cy="584775"/>
           </a:xfrm>
           <a:prstGeom prst="rect">
@@ -8829,7 +9186,7 @@
         </p:nvSpPr>
         <p:spPr>
           <a:xfrm>
-            <a:off x="4594964" y="682565"/>
+            <a:off x="4448475" y="682565"/>
             <a:ext cx="450850" cy="584775"/>
           </a:xfrm>
           <a:prstGeom prst="rect">
@@ -8875,7 +9232,7 @@
         </p:nvSpPr>
         <p:spPr>
           <a:xfrm>
-            <a:off x="5055340" y="682565"/>
+            <a:off x="4908851" y="682565"/>
             <a:ext cx="450850" cy="584775"/>
           </a:xfrm>
           <a:prstGeom prst="rect">
@@ -8916,7 +9273,7 @@
         <p:spPr>
           <a:xfrm>
             <a:off x="468662" y="1444695"/>
-            <a:ext cx="8935688" cy="843051"/>
+            <a:ext cx="8935688" cy="858697"/>
           </a:xfrm>
           <a:prstGeom prst="rect">
             <a:avLst/>
@@ -8936,199 +9293,265 @@
             </a:pPr>
             <a:r>
               <a:rPr lang="de-DE" sz="2000" dirty="0">
-                <a:latin typeface="Kallisto Lined" panose="00000A00000000000000" pitchFamily="50" charset="0"/>
+                <a:latin typeface="Open Sans" panose="020B0606030504020204" pitchFamily="34" charset="0"/>
+                <a:ea typeface="Open Sans" panose="020B0606030504020204" pitchFamily="34" charset="0"/>
+                <a:cs typeface="Open Sans" panose="020B0606030504020204" pitchFamily="34" charset="0"/>
               </a:rPr>
               <a:t>„I </a:t>
             </a:r>
             <a:r>
               <a:rPr lang="de-DE" sz="2000" dirty="0" err="1">
-                <a:latin typeface="Kallisto Lined" panose="00000A00000000000000" pitchFamily="50" charset="0"/>
+                <a:latin typeface="Open Sans" panose="020B0606030504020204" pitchFamily="34" charset="0"/>
+                <a:ea typeface="Open Sans" panose="020B0606030504020204" pitchFamily="34" charset="0"/>
+                <a:cs typeface="Open Sans" panose="020B0606030504020204" pitchFamily="34" charset="0"/>
               </a:rPr>
               <a:t>wanted</a:t>
             </a:r>
             <a:r>
               <a:rPr lang="de-DE" sz="2000" dirty="0">
-                <a:latin typeface="Kallisto Lined" panose="00000A00000000000000" pitchFamily="50" charset="0"/>
+                <a:latin typeface="Open Sans" panose="020B0606030504020204" pitchFamily="34" charset="0"/>
+                <a:ea typeface="Open Sans" panose="020B0606030504020204" pitchFamily="34" charset="0"/>
+                <a:cs typeface="Open Sans" panose="020B0606030504020204" pitchFamily="34" charset="0"/>
               </a:rPr>
               <a:t> </a:t>
             </a:r>
             <a:r>
               <a:rPr lang="de-DE" sz="2000" dirty="0" err="1">
-                <a:latin typeface="Kallisto Lined" panose="00000A00000000000000" pitchFamily="50" charset="0"/>
+                <a:latin typeface="Open Sans" panose="020B0606030504020204" pitchFamily="34" charset="0"/>
+                <a:ea typeface="Open Sans" panose="020B0606030504020204" pitchFamily="34" charset="0"/>
+                <a:cs typeface="Open Sans" panose="020B0606030504020204" pitchFamily="34" charset="0"/>
               </a:rPr>
               <a:t>to</a:t>
             </a:r>
             <a:r>
               <a:rPr lang="de-DE" sz="2000" dirty="0">
-                <a:latin typeface="Kallisto Lined" panose="00000A00000000000000" pitchFamily="50" charset="0"/>
+                <a:latin typeface="Open Sans" panose="020B0606030504020204" pitchFamily="34" charset="0"/>
+                <a:ea typeface="Open Sans" panose="020B0606030504020204" pitchFamily="34" charset="0"/>
+                <a:cs typeface="Open Sans" panose="020B0606030504020204" pitchFamily="34" charset="0"/>
               </a:rPr>
               <a:t> </a:t>
             </a:r>
             <a:r>
               <a:rPr lang="de-DE" sz="2000" dirty="0" err="1">
-                <a:latin typeface="Kallisto Lined" panose="00000A00000000000000" pitchFamily="50" charset="0"/>
+                <a:latin typeface="Open Sans" panose="020B0606030504020204" pitchFamily="34" charset="0"/>
+                <a:ea typeface="Open Sans" panose="020B0606030504020204" pitchFamily="34" charset="0"/>
+                <a:cs typeface="Open Sans" panose="020B0606030504020204" pitchFamily="34" charset="0"/>
               </a:rPr>
               <a:t>name</a:t>
             </a:r>
             <a:r>
               <a:rPr lang="de-DE" sz="2000" dirty="0">
-                <a:latin typeface="Kallisto Lined" panose="00000A00000000000000" pitchFamily="50" charset="0"/>
+                <a:latin typeface="Open Sans" panose="020B0606030504020204" pitchFamily="34" charset="0"/>
+                <a:ea typeface="Open Sans" panose="020B0606030504020204" pitchFamily="34" charset="0"/>
+                <a:cs typeface="Open Sans" panose="020B0606030504020204" pitchFamily="34" charset="0"/>
               </a:rPr>
               <a:t> </a:t>
             </a:r>
             <a:r>
               <a:rPr lang="de-DE" sz="2000" dirty="0" err="1">
-                <a:latin typeface="Kallisto Lined" panose="00000A00000000000000" pitchFamily="50" charset="0"/>
+                <a:latin typeface="Open Sans" panose="020B0606030504020204" pitchFamily="34" charset="0"/>
+                <a:ea typeface="Open Sans" panose="020B0606030504020204" pitchFamily="34" charset="0"/>
+                <a:cs typeface="Open Sans" panose="020B0606030504020204" pitchFamily="34" charset="0"/>
               </a:rPr>
               <a:t>it</a:t>
             </a:r>
             <a:r>
               <a:rPr lang="de-DE" sz="2000" dirty="0">
-                <a:latin typeface="Kallisto Lined" panose="00000A00000000000000" pitchFamily="50" charset="0"/>
+                <a:latin typeface="Open Sans" panose="020B0606030504020204" pitchFamily="34" charset="0"/>
+                <a:ea typeface="Open Sans" panose="020B0606030504020204" pitchFamily="34" charset="0"/>
+                <a:cs typeface="Open Sans" panose="020B0606030504020204" pitchFamily="34" charset="0"/>
               </a:rPr>
               <a:t> after a </a:t>
             </a:r>
             <a:r>
               <a:rPr lang="de-DE" sz="2000" dirty="0" err="1">
-                <a:latin typeface="Kallisto Lined" panose="00000A00000000000000" pitchFamily="50" charset="0"/>
+                <a:latin typeface="Open Sans" panose="020B0606030504020204" pitchFamily="34" charset="0"/>
+                <a:ea typeface="Open Sans" panose="020B0606030504020204" pitchFamily="34" charset="0"/>
+                <a:cs typeface="Open Sans" panose="020B0606030504020204" pitchFamily="34" charset="0"/>
               </a:rPr>
               <a:t>tree</a:t>
             </a:r>
             <a:r>
               <a:rPr lang="de-DE" sz="2000" dirty="0">
-                <a:latin typeface="Kallisto Lined" panose="00000A00000000000000" pitchFamily="50" charset="0"/>
+                <a:latin typeface="Open Sans" panose="020B0606030504020204" pitchFamily="34" charset="0"/>
+                <a:ea typeface="Open Sans" panose="020B0606030504020204" pitchFamily="34" charset="0"/>
+                <a:cs typeface="Open Sans" panose="020B0606030504020204" pitchFamily="34" charset="0"/>
               </a:rPr>
               <a:t>. I </a:t>
             </a:r>
             <a:r>
               <a:rPr lang="de-DE" sz="2000" dirty="0" err="1">
-                <a:latin typeface="Kallisto Lined" panose="00000A00000000000000" pitchFamily="50" charset="0"/>
+                <a:latin typeface="Open Sans" panose="020B0606030504020204" pitchFamily="34" charset="0"/>
+                <a:ea typeface="Open Sans" panose="020B0606030504020204" pitchFamily="34" charset="0"/>
+                <a:cs typeface="Open Sans" panose="020B0606030504020204" pitchFamily="34" charset="0"/>
               </a:rPr>
               <a:t>made</a:t>
             </a:r>
             <a:r>
               <a:rPr lang="de-DE" sz="2000" dirty="0">
-                <a:latin typeface="Kallisto Lined" panose="00000A00000000000000" pitchFamily="50" charset="0"/>
+                <a:latin typeface="Open Sans" panose="020B0606030504020204" pitchFamily="34" charset="0"/>
+                <a:ea typeface="Open Sans" panose="020B0606030504020204" pitchFamily="34" charset="0"/>
+                <a:cs typeface="Open Sans" panose="020B0606030504020204" pitchFamily="34" charset="0"/>
               </a:rPr>
               <a:t> a </a:t>
             </a:r>
             <a:r>
               <a:rPr lang="de-DE" sz="2000" dirty="0" err="1">
-                <a:latin typeface="Kallisto Lined" panose="00000A00000000000000" pitchFamily="50" charset="0"/>
+                <a:latin typeface="Open Sans" panose="020B0606030504020204" pitchFamily="34" charset="0"/>
+                <a:ea typeface="Open Sans" panose="020B0606030504020204" pitchFamily="34" charset="0"/>
+                <a:cs typeface="Open Sans" panose="020B0606030504020204" pitchFamily="34" charset="0"/>
               </a:rPr>
               <a:t>big</a:t>
             </a:r>
             <a:r>
               <a:rPr lang="de-DE" sz="2000" dirty="0">
-                <a:latin typeface="Kallisto Lined" panose="00000A00000000000000" pitchFamily="50" charset="0"/>
+                <a:latin typeface="Open Sans" panose="020B0606030504020204" pitchFamily="34" charset="0"/>
+                <a:ea typeface="Open Sans" panose="020B0606030504020204" pitchFamily="34" charset="0"/>
+                <a:cs typeface="Open Sans" panose="020B0606030504020204" pitchFamily="34" charset="0"/>
               </a:rPr>
               <a:t> </a:t>
             </a:r>
             <a:r>
               <a:rPr lang="de-DE" sz="2000" dirty="0" err="1">
-                <a:latin typeface="Kallisto Lined" panose="00000A00000000000000" pitchFamily="50" charset="0"/>
+                <a:latin typeface="Open Sans" panose="020B0606030504020204" pitchFamily="34" charset="0"/>
+                <a:ea typeface="Open Sans" panose="020B0606030504020204" pitchFamily="34" charset="0"/>
+                <a:cs typeface="Open Sans" panose="020B0606030504020204" pitchFamily="34" charset="0"/>
               </a:rPr>
               <a:t>list</a:t>
             </a:r>
             <a:r>
               <a:rPr lang="de-DE" sz="2000" dirty="0">
-                <a:latin typeface="Kallisto Lined" panose="00000A00000000000000" pitchFamily="50" charset="0"/>
+                <a:latin typeface="Open Sans" panose="020B0606030504020204" pitchFamily="34" charset="0"/>
+                <a:ea typeface="Open Sans" panose="020B0606030504020204" pitchFamily="34" charset="0"/>
+                <a:cs typeface="Open Sans" panose="020B0606030504020204" pitchFamily="34" charset="0"/>
               </a:rPr>
               <a:t> </a:t>
             </a:r>
             <a:r>
               <a:rPr lang="de-DE" sz="2000" dirty="0" err="1">
-                <a:latin typeface="Kallisto Lined" panose="00000A00000000000000" pitchFamily="50" charset="0"/>
+                <a:latin typeface="Open Sans" panose="020B0606030504020204" pitchFamily="34" charset="0"/>
+                <a:ea typeface="Open Sans" panose="020B0606030504020204" pitchFamily="34" charset="0"/>
+                <a:cs typeface="Open Sans" panose="020B0606030504020204" pitchFamily="34" charset="0"/>
               </a:rPr>
               <a:t>of</a:t>
             </a:r>
             <a:r>
               <a:rPr lang="de-DE" sz="2000" dirty="0">
-                <a:latin typeface="Kallisto Lined" panose="00000A00000000000000" pitchFamily="50" charset="0"/>
+                <a:latin typeface="Open Sans" panose="020B0606030504020204" pitchFamily="34" charset="0"/>
+                <a:ea typeface="Open Sans" panose="020B0606030504020204" pitchFamily="34" charset="0"/>
+                <a:cs typeface="Open Sans" panose="020B0606030504020204" pitchFamily="34" charset="0"/>
               </a:rPr>
               <a:t> </a:t>
             </a:r>
             <a:r>
               <a:rPr lang="de-DE" sz="2000" dirty="0" err="1">
-                <a:latin typeface="Kallisto Lined" panose="00000A00000000000000" pitchFamily="50" charset="0"/>
+                <a:latin typeface="Open Sans" panose="020B0606030504020204" pitchFamily="34" charset="0"/>
+                <a:ea typeface="Open Sans" panose="020B0606030504020204" pitchFamily="34" charset="0"/>
+                <a:cs typeface="Open Sans" panose="020B0606030504020204" pitchFamily="34" charset="0"/>
               </a:rPr>
               <a:t>pleasing</a:t>
             </a:r>
             <a:r>
               <a:rPr lang="de-DE" sz="2000" dirty="0">
-                <a:latin typeface="Kallisto Lined" panose="00000A00000000000000" pitchFamily="50" charset="0"/>
+                <a:latin typeface="Open Sans" panose="020B0606030504020204" pitchFamily="34" charset="0"/>
+                <a:ea typeface="Open Sans" panose="020B0606030504020204" pitchFamily="34" charset="0"/>
+                <a:cs typeface="Open Sans" panose="020B0606030504020204" pitchFamily="34" charset="0"/>
               </a:rPr>
               <a:t> </a:t>
             </a:r>
             <a:r>
               <a:rPr lang="de-DE" sz="2000" dirty="0" err="1">
-                <a:latin typeface="Kallisto Lined" panose="00000A00000000000000" pitchFamily="50" charset="0"/>
+                <a:latin typeface="Open Sans" panose="020B0606030504020204" pitchFamily="34" charset="0"/>
+                <a:ea typeface="Open Sans" panose="020B0606030504020204" pitchFamily="34" charset="0"/>
+                <a:cs typeface="Open Sans" panose="020B0606030504020204" pitchFamily="34" charset="0"/>
               </a:rPr>
               <a:t>tree</a:t>
             </a:r>
             <a:r>
               <a:rPr lang="de-DE" sz="2000" dirty="0">
-                <a:latin typeface="Kallisto Lined" panose="00000A00000000000000" pitchFamily="50" charset="0"/>
+                <a:latin typeface="Open Sans" panose="020B0606030504020204" pitchFamily="34" charset="0"/>
+                <a:ea typeface="Open Sans" panose="020B0606030504020204" pitchFamily="34" charset="0"/>
+                <a:cs typeface="Open Sans" panose="020B0606030504020204" pitchFamily="34" charset="0"/>
               </a:rPr>
               <a:t> </a:t>
             </a:r>
             <a:r>
               <a:rPr lang="de-DE" sz="2000" dirty="0" err="1">
-                <a:latin typeface="Kallisto Lined" panose="00000A00000000000000" pitchFamily="50" charset="0"/>
+                <a:latin typeface="Open Sans" panose="020B0606030504020204" pitchFamily="34" charset="0"/>
+                <a:ea typeface="Open Sans" panose="020B0606030504020204" pitchFamily="34" charset="0"/>
+                <a:cs typeface="Open Sans" panose="020B0606030504020204" pitchFamily="34" charset="0"/>
               </a:rPr>
               <a:t>names</a:t>
             </a:r>
             <a:r>
               <a:rPr lang="de-DE" sz="2000" dirty="0">
-                <a:latin typeface="Kallisto Lined" panose="00000A00000000000000" pitchFamily="50" charset="0"/>
+                <a:latin typeface="Open Sans" panose="020B0606030504020204" pitchFamily="34" charset="0"/>
+                <a:ea typeface="Open Sans" panose="020B0606030504020204" pitchFamily="34" charset="0"/>
+                <a:cs typeface="Open Sans" panose="020B0606030504020204" pitchFamily="34" charset="0"/>
               </a:rPr>
               <a:t> and </a:t>
             </a:r>
             <a:r>
               <a:rPr lang="de-DE" sz="2000" dirty="0" err="1">
-                <a:latin typeface="Kallisto Lined" panose="00000A00000000000000" pitchFamily="50" charset="0"/>
+                <a:latin typeface="Open Sans" panose="020B0606030504020204" pitchFamily="34" charset="0"/>
+                <a:ea typeface="Open Sans" panose="020B0606030504020204" pitchFamily="34" charset="0"/>
+                <a:cs typeface="Open Sans" panose="020B0606030504020204" pitchFamily="34" charset="0"/>
               </a:rPr>
               <a:t>noticed</a:t>
             </a:r>
             <a:r>
               <a:rPr lang="de-DE" sz="2000" dirty="0">
-                <a:latin typeface="Kallisto Lined" panose="00000A00000000000000" pitchFamily="50" charset="0"/>
+                <a:latin typeface="Open Sans" panose="020B0606030504020204" pitchFamily="34" charset="0"/>
+                <a:ea typeface="Open Sans" panose="020B0606030504020204" pitchFamily="34" charset="0"/>
+                <a:cs typeface="Open Sans" panose="020B0606030504020204" pitchFamily="34" charset="0"/>
               </a:rPr>
               <a:t> </a:t>
             </a:r>
             <a:r>
               <a:rPr lang="de-DE" sz="2000" dirty="0" err="1">
-                <a:latin typeface="Kallisto Lined" panose="00000A00000000000000" pitchFamily="50" charset="0"/>
+                <a:latin typeface="Open Sans" panose="020B0606030504020204" pitchFamily="34" charset="0"/>
+                <a:ea typeface="Open Sans" panose="020B0606030504020204" pitchFamily="34" charset="0"/>
+                <a:cs typeface="Open Sans" panose="020B0606030504020204" pitchFamily="34" charset="0"/>
               </a:rPr>
               <a:t>that</a:t>
             </a:r>
             <a:r>
               <a:rPr lang="de-DE" sz="2000" dirty="0">
-                <a:latin typeface="Kallisto Lined" panose="00000A00000000000000" pitchFamily="50" charset="0"/>
+                <a:latin typeface="Open Sans" panose="020B0606030504020204" pitchFamily="34" charset="0"/>
+                <a:ea typeface="Open Sans" panose="020B0606030504020204" pitchFamily="34" charset="0"/>
+                <a:cs typeface="Open Sans" panose="020B0606030504020204" pitchFamily="34" charset="0"/>
               </a:rPr>
               <a:t> Elm </a:t>
             </a:r>
             <a:r>
               <a:rPr lang="de-DE" sz="2000" dirty="0" err="1">
-                <a:latin typeface="Kallisto Lined" panose="00000A00000000000000" pitchFamily="50" charset="0"/>
+                <a:latin typeface="Open Sans" panose="020B0606030504020204" pitchFamily="34" charset="0"/>
+                <a:ea typeface="Open Sans" panose="020B0606030504020204" pitchFamily="34" charset="0"/>
+                <a:cs typeface="Open Sans" panose="020B0606030504020204" pitchFamily="34" charset="0"/>
               </a:rPr>
               <a:t>sounded</a:t>
             </a:r>
             <a:r>
               <a:rPr lang="de-DE" sz="2000" dirty="0">
-                <a:latin typeface="Kallisto Lined" panose="00000A00000000000000" pitchFamily="50" charset="0"/>
+                <a:latin typeface="Open Sans" panose="020B0606030504020204" pitchFamily="34" charset="0"/>
+                <a:ea typeface="Open Sans" panose="020B0606030504020204" pitchFamily="34" charset="0"/>
+                <a:cs typeface="Open Sans" panose="020B0606030504020204" pitchFamily="34" charset="0"/>
               </a:rPr>
               <a:t> </a:t>
             </a:r>
             <a:r>
               <a:rPr lang="de-DE" sz="2000" dirty="0" err="1">
-                <a:latin typeface="Kallisto Lined" panose="00000A00000000000000" pitchFamily="50" charset="0"/>
+                <a:latin typeface="Open Sans" panose="020B0606030504020204" pitchFamily="34" charset="0"/>
+                <a:ea typeface="Open Sans" panose="020B0606030504020204" pitchFamily="34" charset="0"/>
+                <a:cs typeface="Open Sans" panose="020B0606030504020204" pitchFamily="34" charset="0"/>
               </a:rPr>
               <a:t>quite</a:t>
             </a:r>
             <a:r>
               <a:rPr lang="de-DE" sz="2000" dirty="0">
-                <a:latin typeface="Kallisto Lined" panose="00000A00000000000000" pitchFamily="50" charset="0"/>
+                <a:latin typeface="Open Sans" panose="020B0606030504020204" pitchFamily="34" charset="0"/>
+                <a:ea typeface="Open Sans" panose="020B0606030504020204" pitchFamily="34" charset="0"/>
+                <a:cs typeface="Open Sans" panose="020B0606030504020204" pitchFamily="34" charset="0"/>
               </a:rPr>
               <a:t> like ELEMENT.“</a:t>
             </a:r>
@@ -9290,7 +9713,7 @@
         <p:spPr>
           <a:xfrm>
             <a:off x="468662" y="2469461"/>
-            <a:ext cx="8252604" cy="706988"/>
+            <a:ext cx="8252604" cy="725776"/>
           </a:xfrm>
           <a:prstGeom prst="rect">
             <a:avLst/>
@@ -9315,37 +9738,25 @@
             </a:pPr>
             <a:r>
               <a:rPr lang="de-DE" sz="2400" dirty="0">
-                <a:latin typeface="Kallisto Lined" panose="00000A00000000000000" pitchFamily="50" charset="0"/>
-              </a:rPr>
-              <a:t>2</a:t>
-            </a:r>
-            <a:r>
-              <a:rPr lang="de-DE" sz="2400" spc="-300" dirty="0">
-                <a:latin typeface="Kallisto Lined" panose="00000A00000000000000" pitchFamily="50" charset="0"/>
-              </a:rPr>
-              <a:t>0</a:t>
-            </a:r>
-            <a:r>
-              <a:rPr lang="de-DE" sz="2400" spc="600" dirty="0">
-                <a:latin typeface="Kallisto Lined" panose="00000A00000000000000" pitchFamily="50" charset="0"/>
-              </a:rPr>
-              <a:t>12</a:t>
+                <a:latin typeface="Open Sans" panose="020B0606030504020204" pitchFamily="34" charset="0"/>
+                <a:ea typeface="Open Sans" panose="020B0606030504020204" pitchFamily="34" charset="0"/>
+                <a:cs typeface="Open Sans" panose="020B0606030504020204" pitchFamily="34" charset="0"/>
+              </a:rPr>
+              <a:t>2012 von Evan </a:t>
+            </a:r>
+            <a:r>
+              <a:rPr lang="de-DE" sz="2400" dirty="0" err="1">
+                <a:latin typeface="Open Sans" panose="020B0606030504020204" pitchFamily="34" charset="0"/>
+                <a:ea typeface="Open Sans" panose="020B0606030504020204" pitchFamily="34" charset="0"/>
+                <a:cs typeface="Open Sans" panose="020B0606030504020204" pitchFamily="34" charset="0"/>
+              </a:rPr>
+              <a:t>Czaplicki</a:t>
             </a:r>
             <a:r>
               <a:rPr lang="de-DE" sz="2400" dirty="0">
-                <a:latin typeface="Kallisto Lined" panose="00000A00000000000000" pitchFamily="50" charset="0"/>
-              </a:rPr>
-              <a:t> von Evan </a:t>
-            </a:r>
-            <a:r>
-              <a:rPr lang="de-DE" sz="2400" dirty="0" err="1">
-                <a:latin typeface="Kallisto Lined" panose="00000A00000000000000" pitchFamily="50" charset="0"/>
-              </a:rPr>
-              <a:t>Czaplicki</a:t>
-            </a:r>
-            <a:r>
-              <a:rPr lang="de-DE" sz="2400" dirty="0">
-                <a:latin typeface="Kallisto Lined" panose="00000A00000000000000" pitchFamily="50" charset="0"/>
+                <a:latin typeface="Open Sans" panose="020B0606030504020204" pitchFamily="34" charset="0"/>
+                <a:ea typeface="Open Sans" panose="020B0606030504020204" pitchFamily="34" charset="0"/>
+                <a:cs typeface="Open Sans" panose="020B0606030504020204" pitchFamily="34" charset="0"/>
               </a:rPr>
               <a:t>  entwickelt</a:t>
             </a:r>
@@ -10188,12 +10599,16 @@
           <a:p>
             <a:r>
               <a:rPr lang="de-DE" sz="3200" b="1" dirty="0">
-                <a:latin typeface="Kallisto Lined" panose="00000A00000000000000" pitchFamily="50" charset="0"/>
+                <a:latin typeface="Open Sans" panose="020B0606030504020204" pitchFamily="34" charset="0"/>
+                <a:ea typeface="Open Sans" panose="020B0606030504020204" pitchFamily="34" charset="0"/>
+                <a:cs typeface="Open Sans" panose="020B0606030504020204" pitchFamily="34" charset="0"/>
               </a:rPr>
               <a:t>CORE LANGUAGE</a:t>
             </a:r>
-            <a:endParaRPr lang="de-DE" spc="-650" dirty="0">
-              <a:latin typeface="Kallisto Lined" panose="00000A00000000000000" pitchFamily="50" charset="0"/>
+            <a:endParaRPr lang="de-DE" dirty="0">
+              <a:latin typeface="Open Sans" panose="020B0606030504020204" pitchFamily="34" charset="0"/>
+              <a:ea typeface="Open Sans" panose="020B0606030504020204" pitchFamily="34" charset="0"/>
+              <a:cs typeface="Open Sans" panose="020B0606030504020204" pitchFamily="34" charset="0"/>
             </a:endParaRPr>
           </a:p>
         </p:txBody>
@@ -10330,7 +10745,9 @@
             </a:pPr>
             <a:r>
               <a:rPr lang="de-DE" sz="2000" dirty="0">
-                <a:latin typeface="Kallisto Lined" panose="00000A00000000000000" pitchFamily="50" charset="0"/>
+                <a:latin typeface="Open Sans" panose="020B0606030504020204" pitchFamily="34" charset="0"/>
+                <a:ea typeface="Open Sans" panose="020B0606030504020204" pitchFamily="34" charset="0"/>
+                <a:cs typeface="Open Sans" panose="020B0606030504020204" pitchFamily="34" charset="0"/>
               </a:rPr>
               <a:t>Elemente wie Semikolon und Klammern fallen in vielen Fällen weg</a:t>
             </a:r>
@@ -10343,7 +10760,9 @@
             </a:pPr>
             <a:r>
               <a:rPr lang="de-DE" sz="2000" dirty="0">
-                <a:latin typeface="Kallisto Lined" panose="00000A00000000000000" pitchFamily="50" charset="0"/>
+                <a:latin typeface="Open Sans" panose="020B0606030504020204" pitchFamily="34" charset="0"/>
+                <a:ea typeface="Open Sans" panose="020B0606030504020204" pitchFamily="34" charset="0"/>
+                <a:cs typeface="Open Sans" panose="020B0606030504020204" pitchFamily="34" charset="0"/>
               </a:rPr>
               <a:t>	Code wird “cleaner”</a:t>
             </a:r>
@@ -10356,15 +10775,25 @@
             </a:pPr>
             <a:r>
               <a:rPr lang="de-DE" sz="2000" dirty="0" err="1">
-                <a:latin typeface="Kallisto Lined" panose="00000A00000000000000" pitchFamily="50" charset="0"/>
+                <a:latin typeface="Open Sans" panose="020B0606030504020204" pitchFamily="34" charset="0"/>
+                <a:ea typeface="Open Sans" panose="020B0606030504020204" pitchFamily="34" charset="0"/>
+                <a:cs typeface="Open Sans" panose="020B0606030504020204" pitchFamily="34" charset="0"/>
               </a:rPr>
               <a:t>z.B</a:t>
+            </a:r>
+            <a:r>
+              <a:rPr lang="de-DE" sz="2000" dirty="0">
+                <a:latin typeface="Open Sans" panose="020B0606030504020204" pitchFamily="34" charset="0"/>
+                <a:ea typeface="Open Sans" panose="020B0606030504020204" pitchFamily="34" charset="0"/>
+                <a:cs typeface="Open Sans" panose="020B0606030504020204" pitchFamily="34" charset="0"/>
+              </a:rPr>
+              <a:t>: </a:t>
             </a:r>
             <a:r>
               <a:rPr lang="de-DE" sz="2000" dirty="0">
                 <a:latin typeface="Kallisto Lined" panose="00000A00000000000000" pitchFamily="50" charset="0"/>
               </a:rPr>
-              <a:t>: 	</a:t>
+              <a:t>	</a:t>
             </a:r>
             <a:r>
               <a:rPr lang="de-DE" sz="2000" dirty="0" err="1">
@@ -10637,31 +11066,41 @@
             </a:pPr>
             <a:r>
               <a:rPr lang="de-DE" sz="2000" dirty="0">
-                <a:latin typeface="Kallisto Lined" panose="00000A00000000000000" pitchFamily="50" charset="0"/>
+                <a:latin typeface="Open Sans" panose="020B0606030504020204" pitchFamily="34" charset="0"/>
+                <a:ea typeface="Open Sans" panose="020B0606030504020204" pitchFamily="34" charset="0"/>
+                <a:cs typeface="Open Sans" panose="020B0606030504020204" pitchFamily="34" charset="0"/>
               </a:rPr>
               <a:t>Konkatenation in Elm mit “</a:t>
             </a:r>
             <a:r>
               <a:rPr lang="de-DE" sz="2000" b="1" dirty="0">
-                <a:latin typeface="Kallisto Lined" panose="00000A00000000000000" pitchFamily="50" charset="0"/>
+                <a:latin typeface="Open Sans" panose="020B0606030504020204" pitchFamily="34" charset="0"/>
+                <a:ea typeface="Open Sans" panose="020B0606030504020204" pitchFamily="34" charset="0"/>
+                <a:cs typeface="Open Sans" panose="020B0606030504020204" pitchFamily="34" charset="0"/>
               </a:rPr>
               <a:t>++</a:t>
             </a:r>
             <a:r>
               <a:rPr lang="de-DE" sz="2000" dirty="0">
-                <a:latin typeface="Kallisto Lined" panose="00000A00000000000000" pitchFamily="50" charset="0"/>
+                <a:latin typeface="Open Sans" panose="020B0606030504020204" pitchFamily="34" charset="0"/>
+                <a:ea typeface="Open Sans" panose="020B0606030504020204" pitchFamily="34" charset="0"/>
+                <a:cs typeface="Open Sans" panose="020B0606030504020204" pitchFamily="34" charset="0"/>
               </a:rPr>
               <a:t>” statt mit “</a:t>
             </a:r>
             <a:r>
               <a:rPr lang="de-DE" sz="2000" b="1" dirty="0">
-                <a:latin typeface="Kallisto Lined" panose="00000A00000000000000" pitchFamily="50" charset="0"/>
+                <a:latin typeface="Open Sans" panose="020B0606030504020204" pitchFamily="34" charset="0"/>
+                <a:ea typeface="Open Sans" panose="020B0606030504020204" pitchFamily="34" charset="0"/>
+                <a:cs typeface="Open Sans" panose="020B0606030504020204" pitchFamily="34" charset="0"/>
               </a:rPr>
               <a:t>+</a:t>
             </a:r>
             <a:r>
               <a:rPr lang="de-DE" sz="2000" dirty="0">
-                <a:latin typeface="Kallisto Lined" panose="00000A00000000000000" pitchFamily="50" charset="0"/>
+                <a:latin typeface="Open Sans" panose="020B0606030504020204" pitchFamily="34" charset="0"/>
+                <a:ea typeface="Open Sans" panose="020B0606030504020204" pitchFamily="34" charset="0"/>
+                <a:cs typeface="Open Sans" panose="020B0606030504020204" pitchFamily="34" charset="0"/>
               </a:rPr>
               <a:t>”</a:t>
             </a:r>
@@ -10676,7 +11115,9 @@
               </a:buClr>
             </a:pPr>
             <a:endParaRPr lang="de-DE" sz="600" dirty="0">
-              <a:latin typeface="Kallisto Lined" panose="00000A00000000000000" pitchFamily="50" charset="0"/>
+              <a:latin typeface="Open Sans" panose="020B0606030504020204" pitchFamily="34" charset="0"/>
+              <a:ea typeface="Open Sans" panose="020B0606030504020204" pitchFamily="34" charset="0"/>
+              <a:cs typeface="Open Sans" panose="020B0606030504020204" pitchFamily="34" charset="0"/>
             </a:endParaRPr>
           </a:p>
           <a:p>
@@ -10692,66 +11133,88 @@
             </a:pPr>
             <a:r>
               <a:rPr lang="de-DE" sz="2000" dirty="0">
-                <a:latin typeface="Kallisto Lined" panose="00000A00000000000000" pitchFamily="50" charset="0"/>
+                <a:latin typeface="Open Sans" panose="020B0606030504020204" pitchFamily="34" charset="0"/>
+                <a:ea typeface="Open Sans" panose="020B0606030504020204" pitchFamily="34" charset="0"/>
+                <a:cs typeface="Open Sans" panose="020B0606030504020204" pitchFamily="34" charset="0"/>
               </a:rPr>
               <a:t>Single </a:t>
             </a:r>
             <a:r>
               <a:rPr lang="de-DE" sz="2000" dirty="0" err="1">
-                <a:latin typeface="Kallisto Lined" panose="00000A00000000000000" pitchFamily="50" charset="0"/>
+                <a:latin typeface="Open Sans" panose="020B0606030504020204" pitchFamily="34" charset="0"/>
+                <a:ea typeface="Open Sans" panose="020B0606030504020204" pitchFamily="34" charset="0"/>
+                <a:cs typeface="Open Sans" panose="020B0606030504020204" pitchFamily="34" charset="0"/>
               </a:rPr>
               <a:t>quotes</a:t>
             </a:r>
             <a:r>
               <a:rPr lang="de-DE" sz="2000" dirty="0">
-                <a:latin typeface="Kallisto Lined" panose="00000A00000000000000" pitchFamily="50" charset="0"/>
+                <a:latin typeface="Open Sans" panose="020B0606030504020204" pitchFamily="34" charset="0"/>
+                <a:ea typeface="Open Sans" panose="020B0606030504020204" pitchFamily="34" charset="0"/>
+                <a:cs typeface="Open Sans" panose="020B0606030504020204" pitchFamily="34" charset="0"/>
               </a:rPr>
               <a:t> für </a:t>
             </a:r>
             <a:r>
               <a:rPr lang="de-DE" sz="2000" dirty="0" err="1">
-                <a:latin typeface="Kallisto Lined" panose="00000A00000000000000" pitchFamily="50" charset="0"/>
+                <a:latin typeface="Open Sans" panose="020B0606030504020204" pitchFamily="34" charset="0"/>
+                <a:ea typeface="Open Sans" panose="020B0606030504020204" pitchFamily="34" charset="0"/>
+                <a:cs typeface="Open Sans" panose="020B0606030504020204" pitchFamily="34" charset="0"/>
               </a:rPr>
               <a:t>strings</a:t>
             </a:r>
             <a:r>
               <a:rPr lang="de-DE" sz="2000" dirty="0">
-                <a:latin typeface="Kallisto Lined" panose="00000A00000000000000" pitchFamily="50" charset="0"/>
+                <a:latin typeface="Open Sans" panose="020B0606030504020204" pitchFamily="34" charset="0"/>
+                <a:ea typeface="Open Sans" panose="020B0606030504020204" pitchFamily="34" charset="0"/>
+                <a:cs typeface="Open Sans" panose="020B0606030504020204" pitchFamily="34" charset="0"/>
               </a:rPr>
               <a:t> sind in Elm </a:t>
             </a:r>
             <a:r>
               <a:rPr lang="de-DE" sz="2000" b="1" dirty="0">
-                <a:latin typeface="Kallisto Lined" panose="00000A00000000000000" pitchFamily="50" charset="0"/>
+                <a:latin typeface="Open Sans" panose="020B0606030504020204" pitchFamily="34" charset="0"/>
+                <a:ea typeface="Open Sans" panose="020B0606030504020204" pitchFamily="34" charset="0"/>
+                <a:cs typeface="Open Sans" panose="020B0606030504020204" pitchFamily="34" charset="0"/>
               </a:rPr>
               <a:t>nicht zulässig</a:t>
             </a:r>
             <a:br>
               <a:rPr lang="de-DE" sz="2400" dirty="0">
-                <a:latin typeface="Kallisto Lined" panose="00000A00000000000000" pitchFamily="50" charset="0"/>
+                <a:latin typeface="Open Sans" panose="020B0606030504020204" pitchFamily="34" charset="0"/>
+                <a:ea typeface="Open Sans" panose="020B0606030504020204" pitchFamily="34" charset="0"/>
+                <a:cs typeface="Open Sans" panose="020B0606030504020204" pitchFamily="34" charset="0"/>
               </a:rPr>
             </a:br>
             <a:r>
               <a:rPr lang="de-DE" sz="2000" dirty="0">
-                <a:latin typeface="Kallisto Lined" panose="00000A00000000000000" pitchFamily="50" charset="0"/>
+                <a:latin typeface="Open Sans" panose="020B0606030504020204" pitchFamily="34" charset="0"/>
+                <a:ea typeface="Open Sans" panose="020B0606030504020204" pitchFamily="34" charset="0"/>
+                <a:cs typeface="Open Sans" panose="020B0606030504020204" pitchFamily="34" charset="0"/>
               </a:rPr>
               <a:t>   	diese sind für einzelne </a:t>
             </a:r>
             <a:r>
               <a:rPr lang="de-DE" sz="2000" dirty="0" err="1">
-                <a:latin typeface="Kallisto Lined" panose="00000A00000000000000" pitchFamily="50" charset="0"/>
+                <a:latin typeface="Open Sans" panose="020B0606030504020204" pitchFamily="34" charset="0"/>
+                <a:ea typeface="Open Sans" panose="020B0606030504020204" pitchFamily="34" charset="0"/>
+                <a:cs typeface="Open Sans" panose="020B0606030504020204" pitchFamily="34" charset="0"/>
               </a:rPr>
               <a:t>characters</a:t>
             </a:r>
             <a:r>
               <a:rPr lang="de-DE" sz="2000" dirty="0">
-                <a:latin typeface="Kallisto Lined" panose="00000A00000000000000" pitchFamily="50" charset="0"/>
+                <a:latin typeface="Open Sans" panose="020B0606030504020204" pitchFamily="34" charset="0"/>
+                <a:ea typeface="Open Sans" panose="020B0606030504020204" pitchFamily="34" charset="0"/>
+                <a:cs typeface="Open Sans" panose="020B0606030504020204" pitchFamily="34" charset="0"/>
               </a:rPr>
               <a:t> vorgesehen </a:t>
             </a:r>
             <a:endParaRPr lang="de-DE" sz="2000" dirty="0">
               <a:effectLst/>
-              <a:latin typeface="Kallisto Lined" panose="00000A00000000000000" pitchFamily="50" charset="0"/>
+              <a:latin typeface="Open Sans" panose="020B0606030504020204" pitchFamily="34" charset="0"/>
+              <a:ea typeface="Open Sans" panose="020B0606030504020204" pitchFamily="34" charset="0"/>
+              <a:cs typeface="Open Sans" panose="020B0606030504020204" pitchFamily="34" charset="0"/>
             </a:endParaRPr>
           </a:p>
         </p:txBody>
@@ -11752,12 +12215,16 @@
           <a:p>
             <a:r>
               <a:rPr lang="de-DE" sz="3200" b="1" dirty="0">
-                <a:latin typeface="Kallisto Lined" panose="00000A00000000000000" pitchFamily="50" charset="0"/>
+                <a:latin typeface="Open Sans" panose="020B0606030504020204" pitchFamily="34" charset="0"/>
+                <a:ea typeface="Open Sans" panose="020B0606030504020204" pitchFamily="34" charset="0"/>
+                <a:cs typeface="Open Sans" panose="020B0606030504020204" pitchFamily="34" charset="0"/>
               </a:rPr>
               <a:t>CORE LANGUAGE</a:t>
             </a:r>
             <a:endParaRPr lang="de-DE" spc="-650" dirty="0">
-              <a:latin typeface="Kallisto Lined" panose="00000A00000000000000" pitchFamily="50" charset="0"/>
+              <a:latin typeface="Open Sans" panose="020B0606030504020204" pitchFamily="34" charset="0"/>
+              <a:ea typeface="Open Sans" panose="020B0606030504020204" pitchFamily="34" charset="0"/>
+              <a:cs typeface="Open Sans" panose="020B0606030504020204" pitchFamily="34" charset="0"/>
             </a:endParaRPr>
           </a:p>
         </p:txBody>
@@ -11894,7 +12361,9 @@
             </a:pPr>
             <a:r>
               <a:rPr lang="de-DE" sz="2000" dirty="0">
-                <a:latin typeface="Kallisto Lined" panose="00000A00000000000000" pitchFamily="50" charset="0"/>
+                <a:latin typeface="Open Sans" panose="020B0606030504020204" pitchFamily="34" charset="0"/>
+                <a:ea typeface="Open Sans" panose="020B0606030504020204" pitchFamily="34" charset="0"/>
+                <a:cs typeface="Open Sans" panose="020B0606030504020204" pitchFamily="34" charset="0"/>
               </a:rPr>
               <a:t>Kommentare:</a:t>
             </a:r>
@@ -11907,25 +12376,33 @@
             </a:pPr>
             <a:r>
               <a:rPr lang="de-DE" sz="2000" b="1" dirty="0">
-                <a:latin typeface="Kallisto Lined" panose="00000A00000000000000" pitchFamily="50" charset="0"/>
+                <a:latin typeface="Open Sans" panose="020B0606030504020204" pitchFamily="34" charset="0"/>
+                <a:ea typeface="Open Sans" panose="020B0606030504020204" pitchFamily="34" charset="0"/>
+                <a:cs typeface="Open Sans" panose="020B0606030504020204" pitchFamily="34" charset="0"/>
               </a:rPr>
               <a:t>Einzeilig:</a:t>
             </a:r>
             <a:r>
               <a:rPr lang="de-DE" sz="2000" dirty="0">
-                <a:latin typeface="Kallisto Lined" panose="00000A00000000000000" pitchFamily="50" charset="0"/>
+                <a:latin typeface="Open Sans" panose="020B0606030504020204" pitchFamily="34" charset="0"/>
+                <a:ea typeface="Open Sans" panose="020B0606030504020204" pitchFamily="34" charset="0"/>
+                <a:cs typeface="Open Sans" panose="020B0606030504020204" pitchFamily="34" charset="0"/>
               </a:rPr>
               <a:t>     -- “Kommentar”	    </a:t>
             </a:r>
             <a:r>
               <a:rPr lang="de-DE" sz="2000" b="1" dirty="0">
-                <a:latin typeface="Kallisto Lined" panose="00000A00000000000000" pitchFamily="50" charset="0"/>
+                <a:latin typeface="Open Sans" panose="020B0606030504020204" pitchFamily="34" charset="0"/>
+                <a:ea typeface="Open Sans" panose="020B0606030504020204" pitchFamily="34" charset="0"/>
+                <a:cs typeface="Open Sans" panose="020B0606030504020204" pitchFamily="34" charset="0"/>
               </a:rPr>
               <a:t>Mehrzeilig:</a:t>
             </a:r>
             <a:r>
               <a:rPr lang="de-DE" sz="2000" dirty="0">
-                <a:latin typeface="Kallisto Lined" panose="00000A00000000000000" pitchFamily="50" charset="0"/>
+                <a:latin typeface="Open Sans" panose="020B0606030504020204" pitchFamily="34" charset="0"/>
+                <a:ea typeface="Open Sans" panose="020B0606030504020204" pitchFamily="34" charset="0"/>
+                <a:cs typeface="Open Sans" panose="020B0606030504020204" pitchFamily="34" charset="0"/>
               </a:rPr>
               <a:t>    {- “Kommentar” -}</a:t>
             </a:r>
@@ -11937,7 +12414,9 @@
               </a:lnSpc>
             </a:pPr>
             <a:endParaRPr lang="de-DE" sz="600" dirty="0">
-              <a:latin typeface="Kallisto Lined" panose="00000A00000000000000" pitchFamily="50" charset="0"/>
+              <a:latin typeface="Open Sans" panose="020B0606030504020204" pitchFamily="34" charset="0"/>
+              <a:ea typeface="Open Sans" panose="020B0606030504020204" pitchFamily="34" charset="0"/>
+              <a:cs typeface="Open Sans" panose="020B0606030504020204" pitchFamily="34" charset="0"/>
             </a:endParaRPr>
           </a:p>
           <a:p>
@@ -11953,7 +12432,9 @@
             </a:pPr>
             <a:r>
               <a:rPr lang="de-DE" sz="2000" dirty="0">
-                <a:latin typeface="Kallisto Lined" panose="00000A00000000000000" pitchFamily="50" charset="0"/>
+                <a:latin typeface="Open Sans" panose="020B0606030504020204" pitchFamily="34" charset="0"/>
+                <a:ea typeface="Open Sans" panose="020B0606030504020204" pitchFamily="34" charset="0"/>
+                <a:cs typeface="Open Sans" panose="020B0606030504020204" pitchFamily="34" charset="0"/>
               </a:rPr>
               <a:t>Benennung von Konstanten:</a:t>
             </a:r>
@@ -11968,13 +12449,17 @@
             </a:pPr>
             <a:r>
               <a:rPr lang="de-DE" sz="2000" b="1" dirty="0">
-                <a:latin typeface="Kallisto Lined" panose="00000A00000000000000" pitchFamily="50" charset="0"/>
+                <a:latin typeface="Open Sans" panose="020B0606030504020204" pitchFamily="34" charset="0"/>
+                <a:ea typeface="Open Sans" panose="020B0606030504020204" pitchFamily="34" charset="0"/>
+                <a:cs typeface="Open Sans" panose="020B0606030504020204" pitchFamily="34" charset="0"/>
               </a:rPr>
               <a:t>Camel Case </a:t>
             </a:r>
             <a:r>
               <a:rPr lang="de-DE" sz="2000" dirty="0">
-                <a:latin typeface="Kallisto Lined" panose="00000A00000000000000" pitchFamily="50" charset="0"/>
+                <a:latin typeface="Open Sans" panose="020B0606030504020204" pitchFamily="34" charset="0"/>
+                <a:ea typeface="Open Sans" panose="020B0606030504020204" pitchFamily="34" charset="0"/>
+                <a:cs typeface="Open Sans" panose="020B0606030504020204" pitchFamily="34" charset="0"/>
               </a:rPr>
               <a:t>muss verwendet werden (z.B. </a:t>
             </a:r>
@@ -11987,7 +12472,9 @@
             </a:r>
             <a:r>
               <a:rPr lang="de-DE" sz="2000" dirty="0">
-                <a:latin typeface="Kallisto Lined" panose="00000A00000000000000" pitchFamily="50" charset="0"/>
+                <a:latin typeface="Open Sans" panose="020B0606030504020204" pitchFamily="34" charset="0"/>
+                <a:ea typeface="Open Sans" panose="020B0606030504020204" pitchFamily="34" charset="0"/>
+                <a:cs typeface="Open Sans" panose="020B0606030504020204" pitchFamily="34" charset="0"/>
               </a:rPr>
               <a:t>)</a:t>
             </a:r>
@@ -12027,13 +12514,17 @@
             </a:r>
             <a:r>
               <a:rPr lang="de-DE" sz="2000" dirty="0">
-                <a:latin typeface="Kallisto Lined" panose="00000A00000000000000" pitchFamily="50" charset="0"/>
+                <a:latin typeface="Open Sans" panose="020B0606030504020204" pitchFamily="34" charset="0"/>
+                <a:ea typeface="Open Sans" panose="020B0606030504020204" pitchFamily="34" charset="0"/>
+                <a:cs typeface="Open Sans" panose="020B0606030504020204" pitchFamily="34" charset="0"/>
               </a:rPr>
               <a:t>wäre nicht zulässig</a:t>
             </a:r>
             <a:endParaRPr lang="de-DE" sz="2000" dirty="0">
               <a:effectLst/>
-              <a:latin typeface="Kallisto Lined" panose="00000A00000000000000" pitchFamily="50" charset="0"/>
+              <a:latin typeface="Open Sans" panose="020B0606030504020204" pitchFamily="34" charset="0"/>
+              <a:ea typeface="Open Sans" panose="020B0606030504020204" pitchFamily="34" charset="0"/>
+              <a:cs typeface="Open Sans" panose="020B0606030504020204" pitchFamily="34" charset="0"/>
             </a:endParaRPr>
           </a:p>
           <a:p>
@@ -12041,6 +12532,9 @@
               <a:lnSpc>
                 <a:spcPct val="130000"/>
               </a:lnSpc>
+              <a:buClr>
+                <a:schemeClr val="tx1"/>
+              </a:buClr>
               <a:buFont typeface="Symbol" panose="05050102010706020507" pitchFamily="18" charset="2"/>
               <a:buChar char="-"/>
             </a:pPr>
@@ -12049,13 +12543,17 @@
                 <a:solidFill>
                   <a:srgbClr val="5A6278"/>
                 </a:solidFill>
-                <a:latin typeface="Kallisto Lined" panose="00000A00000000000000" pitchFamily="50" charset="0"/>
+                <a:latin typeface="Open Sans" panose="020B0606030504020204" pitchFamily="34" charset="0"/>
+                <a:ea typeface="Open Sans" panose="020B0606030504020204" pitchFamily="34" charset="0"/>
+                <a:cs typeface="Open Sans" panose="020B0606030504020204" pitchFamily="34" charset="0"/>
               </a:rPr>
               <a:t>Apostrophe</a:t>
             </a:r>
             <a:r>
               <a:rPr lang="de-DE" sz="2000" dirty="0">
-                <a:latin typeface="Kallisto Lined" panose="00000A00000000000000" pitchFamily="50" charset="0"/>
+                <a:latin typeface="Open Sans" panose="020B0606030504020204" pitchFamily="34" charset="0"/>
+                <a:ea typeface="Open Sans" panose="020B0606030504020204" pitchFamily="34" charset="0"/>
+                <a:cs typeface="Open Sans" panose="020B0606030504020204" pitchFamily="34" charset="0"/>
               </a:rPr>
               <a:t> und </a:t>
             </a:r>
@@ -12064,13 +12562,17 @@
                 <a:solidFill>
                   <a:srgbClr val="5A6278"/>
                 </a:solidFill>
-                <a:latin typeface="Kallisto Lined" panose="00000A00000000000000" pitchFamily="50" charset="0"/>
+                <a:latin typeface="Open Sans" panose="020B0606030504020204" pitchFamily="34" charset="0"/>
+                <a:ea typeface="Open Sans" panose="020B0606030504020204" pitchFamily="34" charset="0"/>
+                <a:cs typeface="Open Sans" panose="020B0606030504020204" pitchFamily="34" charset="0"/>
               </a:rPr>
               <a:t>Sonderzeichen</a:t>
             </a:r>
             <a:r>
               <a:rPr lang="de-DE" sz="2000" dirty="0">
-                <a:latin typeface="Kallisto Lined" panose="00000A00000000000000" pitchFamily="50" charset="0"/>
+                <a:latin typeface="Open Sans" panose="020B0606030504020204" pitchFamily="34" charset="0"/>
+                <a:ea typeface="Open Sans" panose="020B0606030504020204" pitchFamily="34" charset="0"/>
+                <a:cs typeface="Open Sans" panose="020B0606030504020204" pitchFamily="34" charset="0"/>
               </a:rPr>
               <a:t> nicht zulässig, </a:t>
             </a:r>
@@ -12079,13 +12581,17 @@
                 <a:solidFill>
                   <a:srgbClr val="65AC2A"/>
                 </a:solidFill>
-                <a:latin typeface="Kallisto Lined" panose="00000A00000000000000" pitchFamily="50" charset="0"/>
+                <a:latin typeface="Open Sans" panose="020B0606030504020204" pitchFamily="34" charset="0"/>
+                <a:ea typeface="Open Sans" panose="020B0606030504020204" pitchFamily="34" charset="0"/>
+                <a:cs typeface="Open Sans" panose="020B0606030504020204" pitchFamily="34" charset="0"/>
               </a:rPr>
               <a:t>Nummern</a:t>
             </a:r>
             <a:r>
               <a:rPr lang="de-DE" sz="2000" dirty="0">
-                <a:latin typeface="Kallisto Lined" panose="00000A00000000000000" pitchFamily="50" charset="0"/>
+                <a:latin typeface="Open Sans" panose="020B0606030504020204" pitchFamily="34" charset="0"/>
+                <a:ea typeface="Open Sans" panose="020B0606030504020204" pitchFamily="34" charset="0"/>
+                <a:cs typeface="Open Sans" panose="020B0606030504020204" pitchFamily="34" charset="0"/>
               </a:rPr>
               <a:t> und </a:t>
             </a:r>
@@ -12094,13 +12600,17 @@
                 <a:solidFill>
                   <a:srgbClr val="65AC2A"/>
                 </a:solidFill>
-                <a:latin typeface="Kallisto Lined" panose="00000A00000000000000" pitchFamily="50" charset="0"/>
+                <a:latin typeface="Open Sans" panose="020B0606030504020204" pitchFamily="34" charset="0"/>
+                <a:ea typeface="Open Sans" panose="020B0606030504020204" pitchFamily="34" charset="0"/>
+                <a:cs typeface="Open Sans" panose="020B0606030504020204" pitchFamily="34" charset="0"/>
               </a:rPr>
               <a:t>Unterstriche</a:t>
             </a:r>
             <a:r>
               <a:rPr lang="de-DE" sz="2000" dirty="0">
-                <a:latin typeface="Kallisto Lined" panose="00000A00000000000000" pitchFamily="50" charset="0"/>
+                <a:latin typeface="Open Sans" panose="020B0606030504020204" pitchFamily="34" charset="0"/>
+                <a:ea typeface="Open Sans" panose="020B0606030504020204" pitchFamily="34" charset="0"/>
+                <a:cs typeface="Open Sans" panose="020B0606030504020204" pitchFamily="34" charset="0"/>
               </a:rPr>
               <a:t> schon, sollten aber mit Vorsicht angewandt werden</a:t>
             </a:r>
@@ -12112,7 +12622,9 @@
               </a:lnSpc>
             </a:pPr>
             <a:endParaRPr lang="de-DE" sz="600" dirty="0">
-              <a:latin typeface="Kallisto Lined" panose="00000A00000000000000" pitchFamily="50" charset="0"/>
+              <a:latin typeface="Open Sans" panose="020B0606030504020204" pitchFamily="34" charset="0"/>
+              <a:ea typeface="Open Sans" panose="020B0606030504020204" pitchFamily="34" charset="0"/>
+              <a:cs typeface="Open Sans" panose="020B0606030504020204" pitchFamily="34" charset="0"/>
             </a:endParaRPr>
           </a:p>
           <a:p>
@@ -12128,19 +12640,25 @@
             </a:pPr>
             <a:r>
               <a:rPr lang="de-DE" sz="2000" dirty="0">
-                <a:latin typeface="Kallisto Lined" panose="00000A00000000000000" pitchFamily="50" charset="0"/>
+                <a:latin typeface="Open Sans" panose="020B0606030504020204" pitchFamily="34" charset="0"/>
+                <a:ea typeface="Open Sans" panose="020B0606030504020204" pitchFamily="34" charset="0"/>
+                <a:cs typeface="Open Sans" panose="020B0606030504020204" pitchFamily="34" charset="0"/>
               </a:rPr>
               <a:t>Formulierungsbeispiel </a:t>
             </a:r>
             <a:r>
               <a:rPr lang="de-DE" sz="2000" dirty="0" err="1">
-                <a:latin typeface="Kallisto Lined" panose="00000A00000000000000" pitchFamily="50" charset="0"/>
+                <a:latin typeface="Open Sans" panose="020B0606030504020204" pitchFamily="34" charset="0"/>
+                <a:ea typeface="Open Sans" panose="020B0606030504020204" pitchFamily="34" charset="0"/>
+                <a:cs typeface="Open Sans" panose="020B0606030504020204" pitchFamily="34" charset="0"/>
               </a:rPr>
               <a:t>if-function</a:t>
             </a:r>
             <a:r>
               <a:rPr lang="de-DE" sz="2000" dirty="0">
-                <a:latin typeface="Kallisto Lined" panose="00000A00000000000000" pitchFamily="50" charset="0"/>
+                <a:latin typeface="Open Sans" panose="020B0606030504020204" pitchFamily="34" charset="0"/>
+                <a:ea typeface="Open Sans" panose="020B0606030504020204" pitchFamily="34" charset="0"/>
+                <a:cs typeface="Open Sans" panose="020B0606030504020204" pitchFamily="34" charset="0"/>
               </a:rPr>
               <a:t>:</a:t>
             </a:r>
@@ -13097,12 +13615,16 @@
           <a:p>
             <a:r>
               <a:rPr lang="de-DE" sz="3200" b="1" dirty="0">
-                <a:latin typeface="Kallisto Lined" panose="00000A00000000000000" pitchFamily="50" charset="0"/>
+                <a:latin typeface="Open Sans" panose="020B0606030504020204" pitchFamily="34" charset="0"/>
+                <a:ea typeface="Open Sans" panose="020B0606030504020204" pitchFamily="34" charset="0"/>
+                <a:cs typeface="Open Sans" panose="020B0606030504020204" pitchFamily="34" charset="0"/>
               </a:rPr>
               <a:t>FUNKTIONALE PROGRAMMIERUNG</a:t>
             </a:r>
             <a:endParaRPr lang="de-DE" spc="-650" dirty="0">
-              <a:latin typeface="Kallisto Lined" panose="00000A00000000000000" pitchFamily="50" charset="0"/>
+              <a:latin typeface="Open Sans" panose="020B0606030504020204" pitchFamily="34" charset="0"/>
+              <a:ea typeface="Open Sans" panose="020B0606030504020204" pitchFamily="34" charset="0"/>
+              <a:cs typeface="Open Sans" panose="020B0606030504020204" pitchFamily="34" charset="0"/>
             </a:endParaRPr>
           </a:p>
         </p:txBody>
@@ -13142,18 +13664,24 @@
             </a:pPr>
             <a:r>
               <a:rPr lang="de-DE" sz="2000" dirty="0">
-                <a:latin typeface="Kallisto Lined" panose="00000A00000000000000" pitchFamily="50" charset="0"/>
+                <a:latin typeface="Open Sans" panose="020B0606030504020204" pitchFamily="34" charset="0"/>
+                <a:ea typeface="Open Sans" panose="020B0606030504020204" pitchFamily="34" charset="0"/>
+                <a:cs typeface="Open Sans" panose="020B0606030504020204" pitchFamily="34" charset="0"/>
               </a:rPr>
               <a:t>rein funktionale Programmiersprachen brauchen </a:t>
             </a:r>
             <a:r>
               <a:rPr lang="de-DE" sz="2000" b="1" dirty="0">
-                <a:latin typeface="Kallisto Lined" panose="00000A00000000000000" pitchFamily="50" charset="0"/>
+                <a:latin typeface="Open Sans" panose="020B0606030504020204" pitchFamily="34" charset="0"/>
+                <a:ea typeface="Open Sans" panose="020B0606030504020204" pitchFamily="34" charset="0"/>
+                <a:cs typeface="Open Sans" panose="020B0606030504020204" pitchFamily="34" charset="0"/>
               </a:rPr>
               <a:t>Reine Funktionen</a:t>
             </a:r>
             <a:endParaRPr lang="de-DE" sz="2000" dirty="0">
-              <a:latin typeface="Kallisto Lined" panose="00000A00000000000000" pitchFamily="50" charset="0"/>
+              <a:latin typeface="Open Sans" panose="020B0606030504020204" pitchFamily="34" charset="0"/>
+              <a:ea typeface="Open Sans" panose="020B0606030504020204" pitchFamily="34" charset="0"/>
+              <a:cs typeface="Open Sans" panose="020B0606030504020204" pitchFamily="34" charset="0"/>
             </a:endParaRPr>
           </a:p>
           <a:p>
@@ -13172,7 +13700,9 @@
             </a:pPr>
             <a:r>
               <a:rPr lang="de-DE" sz="2000" dirty="0">
-                <a:latin typeface="Kallisto Lined" panose="00000A00000000000000" pitchFamily="50" charset="0"/>
+                <a:latin typeface="Open Sans" panose="020B0606030504020204" pitchFamily="34" charset="0"/>
+                <a:ea typeface="Open Sans" panose="020B0606030504020204" pitchFamily="34" charset="0"/>
+                <a:cs typeface="Open Sans" panose="020B0606030504020204" pitchFamily="34" charset="0"/>
               </a:rPr>
               <a:t>geben immer den gleichen Ausgabewert zurück, wenn der gleiche </a:t>
             </a:r>
@@ -13188,7 +13718,9 @@
             </a:pPr>
             <a:r>
               <a:rPr lang="de-DE" sz="2000" dirty="0">
-                <a:latin typeface="Kallisto Lined" panose="00000A00000000000000" pitchFamily="50" charset="0"/>
+                <a:latin typeface="Open Sans" panose="020B0606030504020204" pitchFamily="34" charset="0"/>
+                <a:ea typeface="Open Sans" panose="020B0606030504020204" pitchFamily="34" charset="0"/>
+                <a:cs typeface="Open Sans" panose="020B0606030504020204" pitchFamily="34" charset="0"/>
               </a:rPr>
               <a:t>	Eingabewert verwendet wird</a:t>
             </a:r>
@@ -13206,7 +13738,9 @@
             <a:r>
               <a:rPr lang="de-DE" sz="2000" b="1" dirty="0">
                 <a:effectLst/>
-                <a:latin typeface="Kallisto Lined" panose="00000A00000000000000" pitchFamily="50" charset="0"/>
+                <a:latin typeface="Open Sans" panose="020B0606030504020204" pitchFamily="34" charset="0"/>
+                <a:ea typeface="Open Sans" panose="020B0606030504020204" pitchFamily="34" charset="0"/>
+                <a:cs typeface="Open Sans" panose="020B0606030504020204" pitchFamily="34" charset="0"/>
               </a:rPr>
               <a:t>	5 	x  +  3              8</a:t>
             </a:r>
@@ -13223,7 +13757,9 @@
             </a:pPr>
             <a:endParaRPr lang="de-DE" sz="400" b="1" dirty="0">
               <a:effectLst/>
-              <a:latin typeface="Kallisto Lined" panose="00000A00000000000000" pitchFamily="50" charset="0"/>
+              <a:latin typeface="Open Sans" panose="020B0606030504020204" pitchFamily="34" charset="0"/>
+              <a:ea typeface="Open Sans" panose="020B0606030504020204" pitchFamily="34" charset="0"/>
+              <a:cs typeface="Open Sans" panose="020B0606030504020204" pitchFamily="34" charset="0"/>
             </a:endParaRPr>
           </a:p>
           <a:p>
@@ -13243,7 +13779,9 @@
             <a:r>
               <a:rPr lang="de-DE" sz="2000" dirty="0">
                 <a:effectLst/>
-                <a:latin typeface="Kallisto Lined" panose="00000A00000000000000" pitchFamily="50" charset="0"/>
+                <a:latin typeface="Open Sans" panose="020B0606030504020204" pitchFamily="34" charset="0"/>
+                <a:ea typeface="Open Sans" panose="020B0606030504020204" pitchFamily="34" charset="0"/>
+                <a:cs typeface="Open Sans" panose="020B0606030504020204" pitchFamily="34" charset="0"/>
               </a:rPr>
               <a:t>	keine Seiteneffekte</a:t>
             </a:r>
@@ -13260,7 +13798,9 @@
             <a:r>
               <a:rPr lang="de-DE" sz="2000" dirty="0">
                 <a:effectLst/>
-                <a:latin typeface="Kallisto Lined" panose="00000A00000000000000" pitchFamily="50" charset="0"/>
+                <a:latin typeface="Open Sans" panose="020B0606030504020204" pitchFamily="34" charset="0"/>
+                <a:ea typeface="Open Sans" panose="020B0606030504020204" pitchFamily="34" charset="0"/>
+                <a:cs typeface="Open Sans" panose="020B0606030504020204" pitchFamily="34" charset="0"/>
               </a:rPr>
               <a:t>	Funktion verändert nur die Eingangsvariablen, hat keine anderen Aufgaben</a:t>
             </a:r>
@@ -13278,12 +13818,16 @@
             <a:r>
               <a:rPr lang="de-DE" sz="2000" b="1" dirty="0">
                 <a:effectLst/>
-                <a:latin typeface="Kallisto Lined" panose="00000A00000000000000" pitchFamily="50" charset="0"/>
+                <a:latin typeface="Open Sans" panose="020B0606030504020204" pitchFamily="34" charset="0"/>
+                <a:ea typeface="Open Sans" panose="020B0606030504020204" pitchFamily="34" charset="0"/>
+                <a:cs typeface="Open Sans" panose="020B0606030504020204" pitchFamily="34" charset="0"/>
               </a:rPr>
               <a:t>	</a:t>
             </a:r>
             <a:endParaRPr lang="de-DE" sz="2000" dirty="0">
-              <a:latin typeface="Kallisto Lined" panose="00000A00000000000000" pitchFamily="50" charset="0"/>
+              <a:latin typeface="Open Sans" panose="020B0606030504020204" pitchFamily="34" charset="0"/>
+              <a:ea typeface="Open Sans" panose="020B0606030504020204" pitchFamily="34" charset="0"/>
+              <a:cs typeface="Open Sans" panose="020B0606030504020204" pitchFamily="34" charset="0"/>
             </a:endParaRPr>
           </a:p>
           <a:p>
@@ -13298,7 +13842,9 @@
             <a:r>
               <a:rPr lang="de-DE" sz="300" dirty="0">
                 <a:effectLst/>
-                <a:latin typeface="Kallisto Lined" panose="00000A00000000000000" pitchFamily="50" charset="0"/>
+                <a:latin typeface="Open Sans" panose="020B0606030504020204" pitchFamily="34" charset="0"/>
+                <a:ea typeface="Open Sans" panose="020B0606030504020204" pitchFamily="34" charset="0"/>
+                <a:cs typeface="Open Sans" panose="020B0606030504020204" pitchFamily="34" charset="0"/>
               </a:rPr>
               <a:t>	</a:t>
             </a:r>
@@ -13320,7 +13866,9 @@
             <a:r>
               <a:rPr lang="de-DE" sz="2000" dirty="0">
                 <a:effectLst/>
-                <a:latin typeface="Kallisto Lined" panose="00000A00000000000000" pitchFamily="50" charset="0"/>
+                <a:latin typeface="Open Sans" panose="020B0606030504020204" pitchFamily="34" charset="0"/>
+                <a:ea typeface="Open Sans" panose="020B0606030504020204" pitchFamily="34" charset="0"/>
+                <a:cs typeface="Open Sans" panose="020B0606030504020204" pitchFamily="34" charset="0"/>
               </a:rPr>
               <a:t>Unveränderbarkeit von Variablen</a:t>
             </a:r>
@@ -13340,10 +13888,30 @@
             </a:r>
             <a:r>
               <a:rPr lang="de-DE" sz="2000" dirty="0">
+                <a:solidFill>
+                  <a:srgbClr val="F1AD00"/>
+                </a:solidFill>
                 <a:latin typeface="Courier New" panose="02070309020205020404" pitchFamily="49" charset="0"/>
                 <a:cs typeface="Courier New" panose="02070309020205020404" pitchFamily="49" charset="0"/>
               </a:rPr>
-              <a:t>Falsch:	Richtig:</a:t>
+              <a:t>Falsch:</a:t>
+            </a:r>
+            <a:r>
+              <a:rPr lang="de-DE" sz="2000" dirty="0">
+                <a:latin typeface="Courier New" panose="02070309020205020404" pitchFamily="49" charset="0"/>
+                <a:cs typeface="Courier New" panose="02070309020205020404" pitchFamily="49" charset="0"/>
+              </a:rPr>
+              <a:t>	</a:t>
+            </a:r>
+            <a:r>
+              <a:rPr lang="de-DE" sz="2000" dirty="0">
+                <a:solidFill>
+                  <a:srgbClr val="7FD03B"/>
+                </a:solidFill>
+                <a:latin typeface="Courier New" panose="02070309020205020404" pitchFamily="49" charset="0"/>
+                <a:cs typeface="Courier New" panose="02070309020205020404" pitchFamily="49" charset="0"/>
+              </a:rPr>
+              <a:t>Richtig:</a:t>
             </a:r>
           </a:p>
           <a:p>
@@ -13658,7 +14226,7 @@
         <p:spPr>
           <a:xfrm>
             <a:off x="988164" y="3928963"/>
-            <a:ext cx="6936636" cy="442942"/>
+            <a:ext cx="6936636" cy="460126"/>
           </a:xfrm>
           <a:prstGeom prst="rect">
             <a:avLst/>
@@ -13693,13 +14261,15 @@
                 </a:solidFill>
                 <a:latin typeface="Kallisto Lined" panose="00000A00000000000000" pitchFamily="50" charset="0"/>
               </a:rPr>
-              <a:t>console.log(x + 3)               </a:t>
+              <a:t>console.log(x + 3)        	            </a:t>
             </a:r>
             <a:r>
               <a:rPr lang="de-DE" sz="2000" b="1" dirty="0">
-                <a:latin typeface="Kallisto Lined" panose="00000A00000000000000" pitchFamily="50" charset="0"/>
-              </a:rPr>
-              <a:t>8</a:t>
+                <a:latin typeface="Open Sans" panose="020B0606030504020204" pitchFamily="34" charset="0"/>
+                <a:ea typeface="Open Sans" panose="020B0606030504020204" pitchFamily="34" charset="0"/>
+                <a:cs typeface="Open Sans" panose="020B0606030504020204" pitchFamily="34" charset="0"/>
+              </a:rPr>
+              <a:t> 8</a:t>
             </a:r>
           </a:p>
         </p:txBody>
@@ -13901,13 +14471,15 @@
               </a:ext>
             </a:extLst>
           </p:cNvPr>
-          <p:cNvCxnSpPr/>
+          <p:cNvCxnSpPr>
+            <a:cxnSpLocks/>
+          </p:cNvCxnSpPr>
           <p:nvPr/>
         </p:nvCxnSpPr>
         <p:spPr>
           <a:xfrm>
-            <a:off x="3131344" y="4204202"/>
-            <a:ext cx="2331244" cy="0"/>
+            <a:off x="2980624" y="4204202"/>
+            <a:ext cx="1852638" cy="0"/>
           </a:xfrm>
           <a:prstGeom prst="line">
             <a:avLst/>
@@ -14991,12 +15563,16 @@
           <a:p>
             <a:r>
               <a:rPr lang="de-DE" sz="3200" b="1" dirty="0">
-                <a:latin typeface="Kallisto Lined" panose="00000A00000000000000" pitchFamily="50" charset="0"/>
+                <a:latin typeface="Open Sans" panose="020B0606030504020204" pitchFamily="34" charset="0"/>
+                <a:ea typeface="Open Sans" panose="020B0606030504020204" pitchFamily="34" charset="0"/>
+                <a:cs typeface="Open Sans" panose="020B0606030504020204" pitchFamily="34" charset="0"/>
               </a:rPr>
               <a:t>FUNKTIONALE PROGRAMMIERUNG</a:t>
             </a:r>
             <a:endParaRPr lang="de-DE" spc="-650" dirty="0">
-              <a:latin typeface="Kallisto Lined" panose="00000A00000000000000" pitchFamily="50" charset="0"/>
+              <a:latin typeface="Open Sans" panose="020B0606030504020204" pitchFamily="34" charset="0"/>
+              <a:ea typeface="Open Sans" panose="020B0606030504020204" pitchFamily="34" charset="0"/>
+              <a:cs typeface="Open Sans" panose="020B0606030504020204" pitchFamily="34" charset="0"/>
             </a:endParaRPr>
           </a:p>
         </p:txBody>
@@ -15036,12 +15612,16 @@
             </a:pPr>
             <a:r>
               <a:rPr lang="de-DE" sz="2000" b="1" dirty="0">
-                <a:latin typeface="Kallisto Lined" panose="00000A00000000000000" pitchFamily="50" charset="0"/>
+                <a:latin typeface="Open Sans" panose="020B0606030504020204" pitchFamily="34" charset="0"/>
+                <a:ea typeface="Open Sans" panose="020B0606030504020204" pitchFamily="34" charset="0"/>
+                <a:cs typeface="Open Sans" panose="020B0606030504020204" pitchFamily="34" charset="0"/>
               </a:rPr>
               <a:t>Rekursion statt Loops</a:t>
             </a:r>
             <a:endParaRPr lang="de-DE" sz="2000" dirty="0">
-              <a:latin typeface="Kallisto Lined" panose="00000A00000000000000" pitchFamily="50" charset="0"/>
+              <a:latin typeface="Open Sans" panose="020B0606030504020204" pitchFamily="34" charset="0"/>
+              <a:ea typeface="Open Sans" panose="020B0606030504020204" pitchFamily="34" charset="0"/>
+              <a:cs typeface="Open Sans" panose="020B0606030504020204" pitchFamily="34" charset="0"/>
             </a:endParaRPr>
           </a:p>
           <a:p>
@@ -15055,7 +15635,9 @@
             </a:pPr>
             <a:r>
               <a:rPr lang="de-DE" sz="2000" dirty="0">
-                <a:latin typeface="Kallisto Lined" panose="00000A00000000000000" pitchFamily="50" charset="0"/>
+                <a:latin typeface="Open Sans" panose="020B0606030504020204" pitchFamily="34" charset="0"/>
+                <a:ea typeface="Open Sans" panose="020B0606030504020204" pitchFamily="34" charset="0"/>
+                <a:cs typeface="Open Sans" panose="020B0606030504020204" pitchFamily="34" charset="0"/>
               </a:rPr>
               <a:t> Problem:</a:t>
             </a:r>
@@ -15118,38 +15700,19 @@
                 <a:solidFill>
                   <a:srgbClr val="5A6278"/>
                 </a:solidFill>
-                <a:latin typeface="Kallisto Lined" panose="00000A00000000000000" pitchFamily="50" charset="0"/>
-                <a:cs typeface="Courier New" panose="02070309020205020404" pitchFamily="49" charset="0"/>
+                <a:latin typeface="Open Sans" panose="020B0606030504020204" pitchFamily="34" charset="0"/>
+                <a:ea typeface="Open Sans" panose="020B0606030504020204" pitchFamily="34" charset="0"/>
+                <a:cs typeface="Open Sans" panose="020B0606030504020204" pitchFamily="34" charset="0"/>
               </a:rPr>
               <a:t>i</a:t>
             </a:r>
             <a:r>
               <a:rPr lang="de-DE" sz="2000" dirty="0">
-                <a:latin typeface="Kallisto Lined" panose="00000A00000000000000" pitchFamily="50" charset="0"/>
-                <a:cs typeface="Courier New" panose="02070309020205020404" pitchFamily="49" charset="0"/>
-              </a:rPr>
-              <a:t> </a:t>
-            </a:r>
-            <a:r>
-              <a:rPr lang="de-DE" sz="2000" spc="-300" dirty="0">
-                <a:latin typeface="Kallisto Lined" panose="00000A00000000000000" pitchFamily="50" charset="0"/>
-                <a:cs typeface="Courier New" panose="02070309020205020404" pitchFamily="49" charset="0"/>
-              </a:rPr>
-              <a:t>w</a:t>
-            </a:r>
-            <a:r>
-              <a:rPr lang="de-DE" sz="2000" spc="300" dirty="0">
-                <a:latin typeface="Kallisto Lined" panose="00000A00000000000000" pitchFamily="50" charset="0"/>
-                <a:cs typeface="Courier New" panose="02070309020205020404" pitchFamily="49" charset="0"/>
-              </a:rPr>
-              <a:t>ir</a:t>
-            </a:r>
-            <a:r>
-              <a:rPr lang="de-DE" sz="2000" dirty="0">
-                <a:latin typeface="Kallisto Lined" panose="00000A00000000000000" pitchFamily="50" charset="0"/>
-                <a:cs typeface="Courier New" panose="02070309020205020404" pitchFamily="49" charset="0"/>
-              </a:rPr>
-              <a:t>d immer wieder überschrieben</a:t>
+                <a:latin typeface="Open Sans" panose="020B0606030504020204" pitchFamily="34" charset="0"/>
+                <a:ea typeface="Open Sans" panose="020B0606030504020204" pitchFamily="34" charset="0"/>
+                <a:cs typeface="Open Sans" panose="020B0606030504020204" pitchFamily="34" charset="0"/>
+              </a:rPr>
+              <a:t> wird immer wieder überschrieben</a:t>
             </a:r>
           </a:p>
           <a:p>
@@ -15163,8 +15726,9 @@
             </a:pPr>
             <a:r>
               <a:rPr lang="de-DE" sz="2000" dirty="0">
-                <a:latin typeface="Kallisto Lined" panose="00000A00000000000000" pitchFamily="50" charset="0"/>
-                <a:cs typeface="Courier New" panose="02070309020205020404" pitchFamily="49" charset="0"/>
+                <a:latin typeface="Open Sans" panose="020B0606030504020204" pitchFamily="34" charset="0"/>
+                <a:ea typeface="Open Sans" panose="020B0606030504020204" pitchFamily="34" charset="0"/>
+                <a:cs typeface="Open Sans" panose="020B0606030504020204" pitchFamily="34" charset="0"/>
               </a:rPr>
               <a:t>Lösung: Rekursionen</a:t>
             </a:r>
@@ -15179,8 +15743,9 @@
               </a:tabLst>
             </a:pPr>
             <a:endParaRPr lang="de-DE" sz="600" dirty="0">
-              <a:latin typeface="Kallisto Lined" panose="00000A00000000000000" pitchFamily="50" charset="0"/>
-              <a:cs typeface="Courier New" panose="02070309020205020404" pitchFamily="49" charset="0"/>
+              <a:latin typeface="Open Sans" panose="020B0606030504020204" pitchFamily="34" charset="0"/>
+              <a:ea typeface="Open Sans" panose="020B0606030504020204" pitchFamily="34" charset="0"/>
+              <a:cs typeface="Open Sans" panose="020B0606030504020204" pitchFamily="34" charset="0"/>
             </a:endParaRPr>
           </a:p>
           <a:p>
@@ -15195,8 +15760,9 @@
             <a:r>
               <a:rPr lang="de-DE" sz="2000" dirty="0">
                 <a:effectLst/>
-                <a:latin typeface="Kallisto Lined" panose="00000A00000000000000" pitchFamily="50" charset="0"/>
-                <a:cs typeface="Courier New" panose="02070309020205020404" pitchFamily="49" charset="0"/>
+                <a:latin typeface="Open Sans" panose="020B0606030504020204" pitchFamily="34" charset="0"/>
+                <a:ea typeface="Open Sans" panose="020B0606030504020204" pitchFamily="34" charset="0"/>
+                <a:cs typeface="Open Sans" panose="020B0606030504020204" pitchFamily="34" charset="0"/>
               </a:rPr>
               <a:t>Beispiel Fakultätsfunktion:</a:t>
             </a:r>
@@ -15547,7 +16113,9 @@
                 <a:solidFill>
                   <a:srgbClr val="65AC2A"/>
                 </a:solidFill>
-                <a:latin typeface="Kallisto Lined" panose="00000A00000000000000" pitchFamily="50" charset="0"/>
+                <a:latin typeface="Open Sans" panose="020B0606030504020204" pitchFamily="34" charset="0"/>
+                <a:ea typeface="Open Sans" panose="020B0606030504020204" pitchFamily="34" charset="0"/>
+                <a:cs typeface="Open Sans" panose="020B0606030504020204" pitchFamily="34" charset="0"/>
               </a:rPr>
               <a:t>// Funktion ruft sich selbst auf</a:t>
             </a:r>
@@ -15568,8 +16136,8 @@
         </p:nvSpPr>
         <p:spPr>
           <a:xfrm>
-            <a:off x="6200609" y="3588444"/>
-            <a:ext cx="5601319" cy="1938992"/>
+            <a:off x="6200609" y="3590751"/>
+            <a:ext cx="5601319" cy="1631216"/>
           </a:xfrm>
           <a:prstGeom prst="rect">
             <a:avLst/>
@@ -15586,7 +16154,9 @@
           <a:p>
             <a:r>
               <a:rPr lang="de-DE" sz="2000" dirty="0">
-                <a:latin typeface="Kallisto Lined" panose="00000A00000000000000" pitchFamily="50" charset="0"/>
+                <a:latin typeface="Open Sans" panose="020B0606030504020204" pitchFamily="34" charset="0"/>
+                <a:ea typeface="Open Sans" panose="020B0606030504020204" pitchFamily="34" charset="0"/>
+                <a:cs typeface="Open Sans" panose="020B0606030504020204" pitchFamily="34" charset="0"/>
               </a:rPr>
               <a:t>EXKURS:</a:t>
             </a:r>
@@ -15594,7 +16164,9 @@
           <a:p>
             <a:r>
               <a:rPr lang="de-DE" sz="2000" dirty="0">
-                <a:latin typeface="Kallisto Lined" panose="00000A00000000000000" pitchFamily="50" charset="0"/>
+                <a:latin typeface="Open Sans" panose="020B0606030504020204" pitchFamily="34" charset="0"/>
+                <a:ea typeface="Open Sans" panose="020B0606030504020204" pitchFamily="34" charset="0"/>
+                <a:cs typeface="Open Sans" panose="020B0606030504020204" pitchFamily="34" charset="0"/>
               </a:rPr>
               <a:t>Die </a:t>
             </a:r>
@@ -15603,13 +16175,17 @@
                 <a:solidFill>
                   <a:srgbClr val="5A6278"/>
                 </a:solidFill>
-                <a:latin typeface="Kallisto Lined" panose="00000A00000000000000" pitchFamily="50" charset="0"/>
+                <a:latin typeface="Open Sans" panose="020B0606030504020204" pitchFamily="34" charset="0"/>
+                <a:ea typeface="Open Sans" panose="020B0606030504020204" pitchFamily="34" charset="0"/>
+                <a:cs typeface="Open Sans" panose="020B0606030504020204" pitchFamily="34" charset="0"/>
               </a:rPr>
               <a:t>Fakultät</a:t>
             </a:r>
             <a:r>
               <a:rPr lang="de-DE" sz="2000" dirty="0">
-                <a:latin typeface="Kallisto Lined" panose="00000A00000000000000" pitchFamily="50" charset="0"/>
+                <a:latin typeface="Open Sans" panose="020B0606030504020204" pitchFamily="34" charset="0"/>
+                <a:ea typeface="Open Sans" panose="020B0606030504020204" pitchFamily="34" charset="0"/>
+                <a:cs typeface="Open Sans" panose="020B0606030504020204" pitchFamily="34" charset="0"/>
               </a:rPr>
               <a:t> ist das Produkt aller ganzen Zahlen, die kleiner gleich der Zahl selbst sind.</a:t>
             </a:r>
@@ -15622,7 +16198,9 @@
             </a:pPr>
             <a:r>
               <a:rPr lang="de-DE" sz="2000" dirty="0">
-                <a:latin typeface="Kallisto Lined" panose="00000A00000000000000" pitchFamily="50" charset="0"/>
+                <a:latin typeface="Open Sans" panose="020B0606030504020204" pitchFamily="34" charset="0"/>
+                <a:ea typeface="Open Sans" panose="020B0606030504020204" pitchFamily="34" charset="0"/>
+                <a:cs typeface="Open Sans" panose="020B0606030504020204" pitchFamily="34" charset="0"/>
               </a:rPr>
               <a:t>	! 3 = 3 * 2 * 1</a:t>
             </a:r>
@@ -15635,57 +16213,11 @@
             </a:pPr>
             <a:r>
               <a:rPr lang="de-DE" sz="2000" dirty="0">
-                <a:latin typeface="Kallisto Lined" panose="00000A00000000000000" pitchFamily="50" charset="0"/>
-              </a:rPr>
-              <a:t>	! 1</a:t>
-            </a:r>
-            <a:r>
-              <a:rPr lang="de-DE" sz="2000" spc="-500" dirty="0">
-                <a:latin typeface="Kallisto Lined" panose="00000A00000000000000" pitchFamily="50" charset="0"/>
-              </a:rPr>
-              <a:t>00</a:t>
-            </a:r>
-            <a:r>
-              <a:rPr lang="de-DE" sz="2000" dirty="0">
-                <a:latin typeface="Kallisto Lined" panose="00000A00000000000000" pitchFamily="50" charset="0"/>
-              </a:rPr>
-              <a:t> = 1</a:t>
-            </a:r>
-            <a:r>
-              <a:rPr lang="de-DE" sz="2000" spc="-500" dirty="0">
-                <a:latin typeface="Kallisto Lined" panose="00000A00000000000000" pitchFamily="50" charset="0"/>
-              </a:rPr>
-              <a:t>00</a:t>
-            </a:r>
-            <a:r>
-              <a:rPr lang="de-DE" sz="2000" dirty="0">
-                <a:latin typeface="Kallisto Lined" panose="00000A00000000000000" pitchFamily="50" charset="0"/>
-              </a:rPr>
-              <a:t> * </a:t>
-            </a:r>
-            <a:r>
-              <a:rPr lang="de-DE" sz="2000" spc="-300" dirty="0">
-                <a:latin typeface="Kallisto Lined" panose="00000A00000000000000" pitchFamily="50" charset="0"/>
-              </a:rPr>
-              <a:t>99</a:t>
-            </a:r>
-            <a:r>
-              <a:rPr lang="de-DE" sz="2000" dirty="0">
-                <a:latin typeface="Kallisto Lined" panose="00000A00000000000000" pitchFamily="50" charset="0"/>
-              </a:rPr>
-              <a:t> * </a:t>
-            </a:r>
-            <a:r>
-              <a:rPr lang="de-DE" sz="2000" spc="-300" dirty="0">
-                <a:latin typeface="Kallisto Lined" panose="00000A00000000000000" pitchFamily="50" charset="0"/>
-              </a:rPr>
-              <a:t>98</a:t>
-            </a:r>
-            <a:r>
-              <a:rPr lang="de-DE" sz="2000" dirty="0">
-                <a:latin typeface="Kallisto Lined" panose="00000A00000000000000" pitchFamily="50" charset="0"/>
-              </a:rPr>
-              <a:t> * … * 1</a:t>
+                <a:latin typeface="Open Sans" panose="020B0606030504020204" pitchFamily="34" charset="0"/>
+                <a:ea typeface="Open Sans" panose="020B0606030504020204" pitchFamily="34" charset="0"/>
+                <a:cs typeface="Open Sans" panose="020B0606030504020204" pitchFamily="34" charset="0"/>
+              </a:rPr>
+              <a:t>	! 100 = 100 * 99 * 98 * … * 1</a:t>
             </a:r>
           </a:p>
         </p:txBody>
@@ -15704,7 +16236,7 @@
         </p:nvCxnSpPr>
         <p:spPr>
           <a:xfrm>
-            <a:off x="6212880" y="5047557"/>
+            <a:off x="6309702" y="4707010"/>
             <a:ext cx="406400" cy="0"/>
           </a:xfrm>
           <a:prstGeom prst="straightConnector1">
@@ -15746,7 +16278,7 @@
         </p:nvCxnSpPr>
         <p:spPr>
           <a:xfrm>
-            <a:off x="6212880" y="5338269"/>
+            <a:off x="6306243" y="5000127"/>
             <a:ext cx="406400" cy="0"/>
           </a:xfrm>
           <a:prstGeom prst="straightConnector1">
@@ -15865,8 +16397,9 @@
             </a:pPr>
             <a:r>
               <a:rPr lang="de-DE" sz="2000" dirty="0">
-                <a:latin typeface="Kallisto Lined" panose="00000A00000000000000" pitchFamily="50" charset="0"/>
-                <a:cs typeface="Courier New" panose="02070309020205020404" pitchFamily="49" charset="0"/>
+                <a:latin typeface="Open Sans" panose="020B0606030504020204" pitchFamily="34" charset="0"/>
+                <a:ea typeface="Open Sans" panose="020B0606030504020204" pitchFamily="34" charset="0"/>
+                <a:cs typeface="Open Sans" panose="020B0606030504020204" pitchFamily="34" charset="0"/>
               </a:rPr>
               <a:t>Verdeutlichung:</a:t>
             </a:r>
@@ -15904,7 +16437,7 @@
                 <a:latin typeface="Courier New" panose="02070309020205020404" pitchFamily="49" charset="0"/>
                 <a:cs typeface="Courier New" panose="02070309020205020404" pitchFamily="49" charset="0"/>
               </a:rPr>
-              <a:t>= 3 + </a:t>
+              <a:t>= 3 * </a:t>
             </a:r>
             <a:r>
               <a:rPr lang="de-DE" sz="2000" dirty="0" err="1">
@@ -15927,7 +16460,7 @@
                 <a:latin typeface="Courier New" panose="02070309020205020404" pitchFamily="49" charset="0"/>
                 <a:cs typeface="Courier New" panose="02070309020205020404" pitchFamily="49" charset="0"/>
               </a:rPr>
-              <a:t>= 3 + 2 + </a:t>
+              <a:t>= 3 * 2 * </a:t>
             </a:r>
             <a:r>
               <a:rPr lang="de-DE" sz="2000" dirty="0" err="1">
@@ -15950,7 +16483,7 @@
                 <a:latin typeface="Courier New" panose="02070309020205020404" pitchFamily="49" charset="0"/>
                 <a:cs typeface="Courier New" panose="02070309020205020404" pitchFamily="49" charset="0"/>
               </a:rPr>
-              <a:t>= 3 + 2 + 1</a:t>
+              <a:t>= 3 * 2 * 1</a:t>
             </a:r>
           </a:p>
           <a:p>
@@ -16869,6 +17402,9 @@
                                   <p:stCondLst>
                                     <p:cond delay="0"/>
                                   </p:stCondLst>
+                                  <p:iterate type="lt">
+                                    <p:tmPct val="0"/>
+                                  </p:iterate>
                                   <p:childTnLst>
                                     <p:set>
                                       <p:cBhvr>
@@ -17371,7 +17907,7 @@
         <p:spPr>
           <a:xfrm>
             <a:off x="468662" y="1444695"/>
-            <a:ext cx="11202638" cy="2363468"/>
+            <a:ext cx="11202638" cy="2779222"/>
           </a:xfrm>
           <a:prstGeom prst="rect">
             <a:avLst/>
@@ -17391,7 +17927,9 @@
             </a:pPr>
             <a:r>
               <a:rPr lang="de-DE" sz="2000" b="1" dirty="0">
-                <a:latin typeface="Kallisto Lined" panose="00000A00000000000000" pitchFamily="50" charset="0"/>
+                <a:latin typeface="Open Sans" panose="020B0606030504020204" pitchFamily="34" charset="0"/>
+                <a:ea typeface="Open Sans" panose="020B0606030504020204" pitchFamily="34" charset="0"/>
+                <a:cs typeface="Open Sans" panose="020B0606030504020204" pitchFamily="34" charset="0"/>
               </a:rPr>
               <a:t>Funktionen höherer Ordnung</a:t>
             </a:r>
@@ -17440,7 +17978,9 @@
             <a:r>
               <a:rPr lang="de-DE" sz="2000" dirty="0">
                 <a:effectLst/>
-                <a:latin typeface="Kallisto Lined" panose="00000A00000000000000" pitchFamily="50" charset="0"/>
+                <a:latin typeface="Open Sans" panose="020B0606030504020204" pitchFamily="34" charset="0"/>
+                <a:ea typeface="Open Sans" panose="020B0606030504020204" pitchFamily="34" charset="0"/>
+                <a:cs typeface="Open Sans" panose="020B0606030504020204" pitchFamily="34" charset="0"/>
               </a:rPr>
               <a:t>=  Funktion erster Ordnung</a:t>
             </a:r>
@@ -17456,7 +17996,9 @@
             </a:pPr>
             <a:endParaRPr lang="de-DE" sz="1100" dirty="0">
               <a:effectLst/>
-              <a:latin typeface="Kallisto Lined" panose="00000A00000000000000" pitchFamily="50" charset="0"/>
+              <a:latin typeface="Open Sans" panose="020B0606030504020204" pitchFamily="34" charset="0"/>
+              <a:ea typeface="Open Sans" panose="020B0606030504020204" pitchFamily="34" charset="0"/>
+              <a:cs typeface="Open Sans" panose="020B0606030504020204" pitchFamily="34" charset="0"/>
             </a:endParaRPr>
           </a:p>
           <a:p>
@@ -17470,7 +18012,9 @@
             </a:pPr>
             <a:r>
               <a:rPr lang="de-DE" sz="2000" dirty="0">
-                <a:latin typeface="Kallisto Lined" panose="00000A00000000000000" pitchFamily="50" charset="0"/>
+                <a:latin typeface="Open Sans" panose="020B0606030504020204" pitchFamily="34" charset="0"/>
+                <a:ea typeface="Open Sans" panose="020B0606030504020204" pitchFamily="34" charset="0"/>
+                <a:cs typeface="Open Sans" panose="020B0606030504020204" pitchFamily="34" charset="0"/>
               </a:rPr>
               <a:t>		„normaler“ Wert als Parameter</a:t>
             </a:r>
@@ -17486,7 +18030,9 @@
             </a:pPr>
             <a:endParaRPr lang="de-DE" sz="500" dirty="0">
               <a:effectLst/>
-              <a:latin typeface="Kallisto Lined" panose="00000A00000000000000" pitchFamily="50" charset="0"/>
+              <a:latin typeface="Open Sans" panose="020B0606030504020204" pitchFamily="34" charset="0"/>
+              <a:ea typeface="Open Sans" panose="020B0606030504020204" pitchFamily="34" charset="0"/>
+              <a:cs typeface="Open Sans" panose="020B0606030504020204" pitchFamily="34" charset="0"/>
             </a:endParaRPr>
           </a:p>
           <a:p>
@@ -17505,7 +18051,9 @@
             </a:pPr>
             <a:r>
               <a:rPr lang="de-DE" sz="2000" dirty="0">
-                <a:latin typeface="Kallisto Lined" panose="00000A00000000000000" pitchFamily="50" charset="0"/>
+                <a:latin typeface="Open Sans" panose="020B0606030504020204" pitchFamily="34" charset="0"/>
+                <a:ea typeface="Open Sans" panose="020B0606030504020204" pitchFamily="34" charset="0"/>
+                <a:cs typeface="Open Sans" panose="020B0606030504020204" pitchFamily="34" charset="0"/>
               </a:rPr>
               <a:t>höhere Funktionen können ganze Funktionen als Parameter enthalten</a:t>
             </a:r>
@@ -17525,31 +18073,52 @@
             <a:r>
               <a:rPr lang="de-DE" sz="2000" dirty="0">
                 <a:effectLst/>
-                <a:latin typeface="Kallisto Lined" panose="00000A00000000000000" pitchFamily="50" charset="0"/>
-              </a:rPr>
-              <a:t>	können zur </a:t>
-            </a:r>
-            <a:r>
-              <a:rPr lang="de-DE" sz="2000" spc="-300" dirty="0">
+                <a:latin typeface="Open Sans" panose="020B0606030504020204" pitchFamily="34" charset="0"/>
+                <a:ea typeface="Open Sans" panose="020B0606030504020204" pitchFamily="34" charset="0"/>
+                <a:cs typeface="Open Sans" panose="020B0606030504020204" pitchFamily="34" charset="0"/>
+              </a:rPr>
+              <a:t>	so können </a:t>
+            </a:r>
+            <a:r>
+              <a:rPr lang="de-DE" sz="2000" b="1" dirty="0">
+                <a:solidFill>
+                  <a:srgbClr val="5A6278"/>
+                </a:solidFill>
                 <a:effectLst/>
-                <a:latin typeface="Kallisto Lined" panose="00000A00000000000000" pitchFamily="50" charset="0"/>
-              </a:rPr>
-              <a:t>w</a:t>
-            </a:r>
-            <a:r>
-              <a:rPr lang="de-DE" sz="2000" spc="300" dirty="0">
-                <a:effectLst/>
-                <a:latin typeface="Kallisto Lined" panose="00000A00000000000000" pitchFamily="50" charset="0"/>
-              </a:rPr>
-              <a:t>ei</a:t>
+                <a:latin typeface="Open Sans" panose="020B0606030504020204" pitchFamily="34" charset="0"/>
+                <a:ea typeface="Open Sans" panose="020B0606030504020204" pitchFamily="34" charset="0"/>
+                <a:cs typeface="Open Sans" panose="020B0606030504020204" pitchFamily="34" charset="0"/>
+              </a:rPr>
+              <a:t>zwei reine Funktionen</a:t>
             </a:r>
             <a:r>
               <a:rPr lang="de-DE" sz="2000" dirty="0">
                 <a:effectLst/>
-                <a:latin typeface="Kallisto Lined" panose="00000A00000000000000" pitchFamily="50" charset="0"/>
-              </a:rPr>
-              <a:t>teren Benutzung zusammen verwendet werden</a:t>
-            </a:r>
+                <a:latin typeface="Open Sans" panose="020B0606030504020204" pitchFamily="34" charset="0"/>
+                <a:ea typeface="Open Sans" panose="020B0606030504020204" pitchFamily="34" charset="0"/>
+                <a:cs typeface="Open Sans" panose="020B0606030504020204" pitchFamily="34" charset="0"/>
+              </a:rPr>
+              <a:t> mit einander Kombiniert werden</a:t>
+            </a:r>
+          </a:p>
+          <a:p>
+            <a:pPr>
+              <a:lnSpc>
+                <a:spcPct val="130000"/>
+              </a:lnSpc>
+              <a:buClr>
+                <a:srgbClr val="F1AD00"/>
+              </a:buClr>
+              <a:tabLst>
+                <a:tab pos="896938" algn="l"/>
+              </a:tabLst>
+            </a:pPr>
+            <a:endParaRPr lang="de-DE" sz="2000" dirty="0">
+              <a:effectLst/>
+              <a:latin typeface="Open Sans" panose="020B0606030504020204" pitchFamily="34" charset="0"/>
+              <a:ea typeface="Open Sans" panose="020B0606030504020204" pitchFamily="34" charset="0"/>
+              <a:cs typeface="Open Sans" panose="020B0606030504020204" pitchFamily="34" charset="0"/>
+            </a:endParaRPr>
           </a:p>
         </p:txBody>
       </p:sp>
@@ -18155,24 +18724,32 @@
           <a:p>
             <a:r>
               <a:rPr lang="de-DE" sz="3200" b="1" dirty="0">
-                <a:latin typeface="Kallisto Lined" panose="00000A00000000000000" pitchFamily="50" charset="0"/>
+                <a:latin typeface="Open Sans" panose="020B0606030504020204" pitchFamily="34" charset="0"/>
+                <a:ea typeface="Open Sans" panose="020B0606030504020204" pitchFamily="34" charset="0"/>
+                <a:cs typeface="Open Sans" panose="020B0606030504020204" pitchFamily="34" charset="0"/>
               </a:rPr>
               <a:t>ARCH</a:t>
             </a:r>
             <a:r>
               <a:rPr lang="de-DE" sz="3200" b="1" spc="300" dirty="0">
-                <a:latin typeface="Kallisto Lined" panose="00000A00000000000000" pitchFamily="50" charset="0"/>
+                <a:latin typeface="Open Sans" panose="020B0606030504020204" pitchFamily="34" charset="0"/>
+                <a:ea typeface="Open Sans" panose="020B0606030504020204" pitchFamily="34" charset="0"/>
+                <a:cs typeface="Open Sans" panose="020B0606030504020204" pitchFamily="34" charset="0"/>
               </a:rPr>
               <a:t>IT</a:t>
             </a:r>
             <a:r>
               <a:rPr lang="de-DE" sz="3200" b="1" dirty="0">
-                <a:latin typeface="Kallisto Lined" panose="00000A00000000000000" pitchFamily="50" charset="0"/>
+                <a:latin typeface="Open Sans" panose="020B0606030504020204" pitchFamily="34" charset="0"/>
+                <a:ea typeface="Open Sans" panose="020B0606030504020204" pitchFamily="34" charset="0"/>
+                <a:cs typeface="Open Sans" panose="020B0606030504020204" pitchFamily="34" charset="0"/>
               </a:rPr>
               <a:t>EKTUR</a:t>
             </a:r>
             <a:endParaRPr lang="de-DE" spc="-650" dirty="0">
-              <a:latin typeface="Kallisto Lined" panose="00000A00000000000000" pitchFamily="50" charset="0"/>
+              <a:latin typeface="Open Sans" panose="020B0606030504020204" pitchFamily="34" charset="0"/>
+              <a:ea typeface="Open Sans" panose="020B0606030504020204" pitchFamily="34" charset="0"/>
+              <a:cs typeface="Open Sans" panose="020B0606030504020204" pitchFamily="34" charset="0"/>
             </a:endParaRPr>
           </a:p>
         </p:txBody>
@@ -18309,21 +18886,27 @@
             </a:pPr>
             <a:r>
               <a:rPr lang="de-DE" sz="2000" dirty="0">
-                <a:latin typeface="Kallisto Lined" panose="00000A00000000000000" pitchFamily="50" charset="0"/>
-              </a:rPr>
-              <a:t>g</a:t>
+                <a:latin typeface="Open Sans" panose="020B0606030504020204" pitchFamily="34" charset="0"/>
+                <a:ea typeface="Open Sans" panose="020B0606030504020204" pitchFamily="34" charset="0"/>
+                <a:cs typeface="Open Sans" panose="020B0606030504020204" pitchFamily="34" charset="0"/>
+              </a:rPr>
+              <a:t>G</a:t>
             </a:r>
             <a:r>
               <a:rPr lang="de-DE" sz="2000" dirty="0">
                 <a:effectLst/>
-                <a:latin typeface="Kallisto Lined" panose="00000A00000000000000" pitchFamily="50" charset="0"/>
+                <a:latin typeface="Open Sans" panose="020B0606030504020204" pitchFamily="34" charset="0"/>
+                <a:ea typeface="Open Sans" panose="020B0606030504020204" pitchFamily="34" charset="0"/>
+                <a:cs typeface="Open Sans" panose="020B0606030504020204" pitchFamily="34" charset="0"/>
               </a:rPr>
               <a:t>eeignet für die Erstellung interaktiver Programme (</a:t>
             </a:r>
             <a:r>
               <a:rPr lang="de-DE" sz="2000" b="1" dirty="0">
                 <a:effectLst/>
-                <a:latin typeface="Kallisto Lined" panose="00000A00000000000000" pitchFamily="50" charset="0"/>
+                <a:latin typeface="Open Sans" panose="020B0606030504020204" pitchFamily="34" charset="0"/>
+                <a:ea typeface="Open Sans" panose="020B0606030504020204" pitchFamily="34" charset="0"/>
+                <a:cs typeface="Open Sans" panose="020B0606030504020204" pitchFamily="34" charset="0"/>
               </a:rPr>
               <a:t>Apps und Spiele)</a:t>
             </a:r>
@@ -18341,7 +18924,9 @@
             </a:pPr>
             <a:r>
               <a:rPr lang="de-DE" sz="2000" dirty="0">
-                <a:latin typeface="Kallisto Lined" panose="00000A00000000000000" pitchFamily="50" charset="0"/>
+                <a:latin typeface="Open Sans" panose="020B0606030504020204" pitchFamily="34" charset="0"/>
+                <a:ea typeface="Open Sans" panose="020B0606030504020204" pitchFamily="34" charset="0"/>
+                <a:cs typeface="Open Sans" panose="020B0606030504020204" pitchFamily="34" charset="0"/>
               </a:rPr>
               <a:t>Das Grundmuster:</a:t>
             </a:r>
@@ -18357,7 +18942,9 @@
             </a:pPr>
             <a:endParaRPr lang="de-DE" sz="2000" dirty="0">
               <a:effectLst/>
-              <a:latin typeface="Kallisto Lined" panose="00000A00000000000000" pitchFamily="50" charset="0"/>
+              <a:latin typeface="Open Sans" panose="020B0606030504020204" pitchFamily="34" charset="0"/>
+              <a:ea typeface="Open Sans" panose="020B0606030504020204" pitchFamily="34" charset="0"/>
+              <a:cs typeface="Open Sans" panose="020B0606030504020204" pitchFamily="34" charset="0"/>
             </a:endParaRPr>
           </a:p>
           <a:p>
@@ -18370,7 +18957,9 @@
               </a:buClr>
             </a:pPr>
             <a:endParaRPr lang="de-DE" sz="2000" dirty="0">
-              <a:latin typeface="Kallisto Lined" panose="00000A00000000000000" pitchFamily="50" charset="0"/>
+              <a:latin typeface="Open Sans" panose="020B0606030504020204" pitchFamily="34" charset="0"/>
+              <a:ea typeface="Open Sans" panose="020B0606030504020204" pitchFamily="34" charset="0"/>
+              <a:cs typeface="Open Sans" panose="020B0606030504020204" pitchFamily="34" charset="0"/>
             </a:endParaRPr>
           </a:p>
           <a:p>
@@ -18384,7 +18973,9 @@
             </a:pPr>
             <a:endParaRPr lang="de-DE" sz="2000" dirty="0">
               <a:effectLst/>
-              <a:latin typeface="Kallisto Lined" panose="00000A00000000000000" pitchFamily="50" charset="0"/>
+              <a:latin typeface="Open Sans" panose="020B0606030504020204" pitchFamily="34" charset="0"/>
+              <a:ea typeface="Open Sans" panose="020B0606030504020204" pitchFamily="34" charset="0"/>
+              <a:cs typeface="Open Sans" panose="020B0606030504020204" pitchFamily="34" charset="0"/>
             </a:endParaRPr>
           </a:p>
           <a:p>
@@ -18397,7 +18988,9 @@
               </a:buClr>
             </a:pPr>
             <a:endParaRPr lang="de-DE" sz="2000" dirty="0">
-              <a:latin typeface="Kallisto Lined" panose="00000A00000000000000" pitchFamily="50" charset="0"/>
+              <a:latin typeface="Open Sans" panose="020B0606030504020204" pitchFamily="34" charset="0"/>
+              <a:ea typeface="Open Sans" panose="020B0606030504020204" pitchFamily="34" charset="0"/>
+              <a:cs typeface="Open Sans" panose="020B0606030504020204" pitchFamily="34" charset="0"/>
             </a:endParaRPr>
           </a:p>
           <a:p>
@@ -18411,7 +19004,9 @@
             </a:pPr>
             <a:endParaRPr lang="de-DE" sz="600" dirty="0">
               <a:effectLst/>
-              <a:latin typeface="Kallisto Lined" panose="00000A00000000000000" pitchFamily="50" charset="0"/>
+              <a:latin typeface="Open Sans" panose="020B0606030504020204" pitchFamily="34" charset="0"/>
+              <a:ea typeface="Open Sans" panose="020B0606030504020204" pitchFamily="34" charset="0"/>
+              <a:cs typeface="Open Sans" panose="020B0606030504020204" pitchFamily="34" charset="0"/>
             </a:endParaRPr>
           </a:p>
           <a:p>
@@ -18427,7 +19022,9 @@
             </a:pPr>
             <a:r>
               <a:rPr lang="de-DE" sz="2000" dirty="0">
-                <a:latin typeface="Kallisto Lined" panose="00000A00000000000000" pitchFamily="50" charset="0"/>
+                <a:latin typeface="Open Sans" panose="020B0606030504020204" pitchFamily="34" charset="0"/>
+                <a:ea typeface="Open Sans" panose="020B0606030504020204" pitchFamily="34" charset="0"/>
+                <a:cs typeface="Open Sans" panose="020B0606030504020204" pitchFamily="34" charset="0"/>
               </a:rPr>
               <a:t>Was passiert innerhalb des Elm Programmes?</a:t>
             </a:r>
@@ -18993,7 +19590,9 @@
             <a:pPr algn="ctr"/>
             <a:r>
               <a:rPr lang="de-DE" sz="2000" dirty="0">
-                <a:latin typeface="Kallisto Lined" panose="00000A00000000000000" pitchFamily="50" charset="0"/>
+                <a:latin typeface="Open Sans" panose="020B0606030504020204" pitchFamily="34" charset="0"/>
+                <a:ea typeface="Open Sans" panose="020B0606030504020204" pitchFamily="34" charset="0"/>
+                <a:cs typeface="Open Sans" panose="020B0606030504020204" pitchFamily="34" charset="0"/>
               </a:rPr>
               <a:t>Kern der ELM- Architektur</a:t>
             </a:r>

</xml_diff>

<commit_message>
Überarbeitung in der Gruppe
</commit_message>
<xml_diff>
--- a/ORGINAL.pptx
+++ b/ORGINAL.pptx
@@ -18,7 +18,7 @@
     <p:sldId id="269" r:id="rId9"/>
     <p:sldId id="270" r:id="rId10"/>
     <p:sldId id="271" r:id="rId11"/>
-    <p:sldId id="281" r:id="rId12"/>
+    <p:sldId id="283" r:id="rId12"/>
     <p:sldId id="276" r:id="rId13"/>
     <p:sldId id="277" r:id="rId14"/>
   </p:sldIdLst>
@@ -249,7 +249,7 @@
           <a:p>
             <a:fld id="{B4E54C08-6F04-4474-B109-EF04CDCC6547}" type="datetimeFigureOut">
               <a:rPr lang="de-DE" smtClean="0"/>
-              <a:t>06.11.19</a:t>
+              <a:t>07.11.19</a:t>
             </a:fld>
             <a:endParaRPr lang="de-DE"/>
           </a:p>
@@ -1186,118 +1186,6 @@
           <a:bodyPr/>
           <a:lstStyle/>
           <a:p>
-            <a:pPr marL="0" marR="0" lvl="0" indent="0" algn="l" defTabSz="914400" rtl="0" eaLnBrk="1" fontAlgn="auto" latinLnBrk="0" hangingPunct="1">
-              <a:lnSpc>
-                <a:spcPct val="100000"/>
-              </a:lnSpc>
-              <a:spcBef>
-                <a:spcPts val="0"/>
-              </a:spcBef>
-              <a:spcAft>
-                <a:spcPts val="0"/>
-              </a:spcAft>
-              <a:buClrTx/>
-              <a:buSzTx/>
-              <a:buFontTx/>
-              <a:buNone/>
-              <a:tabLst/>
-              <a:defRPr/>
-            </a:pPr>
-            <a:r>
-              <a:rPr lang="de-DE" dirty="0"/>
-              <a:t>Wir müssen den String in Klammern setzten, damit der Compiler </a:t>
-            </a:r>
-            <a:r>
-              <a:rPr lang="de-DE"/>
-              <a:t>nicht durch einander kommt mit der Verkettung von Strings.</a:t>
-            </a:r>
-            <a:endParaRPr lang="de-DE" dirty="0"/>
-          </a:p>
-          <a:p>
-            <a:endParaRPr lang="de-DE" dirty="0"/>
-          </a:p>
-        </p:txBody>
-      </p:sp>
-      <p:sp>
-        <p:nvSpPr>
-          <p:cNvPr id="4" name="Foliennummernplatzhalter 3"/>
-          <p:cNvSpPr>
-            <a:spLocks noGrp="1"/>
-          </p:cNvSpPr>
-          <p:nvPr>
-            <p:ph type="sldNum" sz="quarter" idx="5"/>
-          </p:nvPr>
-        </p:nvSpPr>
-        <p:spPr/>
-        <p:txBody>
-          <a:bodyPr/>
-          <a:lstStyle/>
-          <a:p>
-            <a:fld id="{5DC9EF4A-F8D7-48F7-82A7-E61885A6BB32}" type="slidenum">
-              <a:rPr lang="de-DE" smtClean="0"/>
-              <a:t>11</a:t>
-            </a:fld>
-            <a:endParaRPr lang="de-DE"/>
-          </a:p>
-        </p:txBody>
-      </p:sp>
-    </p:spTree>
-    <p:extLst>
-      <p:ext uri="{BB962C8B-B14F-4D97-AF65-F5344CB8AC3E}">
-        <p14:creationId xmlns:p14="http://schemas.microsoft.com/office/powerpoint/2010/main" val="4131630600"/>
-      </p:ext>
-    </p:extLst>
-  </p:cSld>
-  <p:clrMapOvr>
-    <a:masterClrMapping/>
-  </p:clrMapOvr>
-</p:notes>
-</file>
-
-<file path=ppt/notesSlides/notesSlide8.xml><?xml version="1.0" encoding="utf-8"?>
-<p:notes xmlns:a="http://schemas.openxmlformats.org/drawingml/2006/main" xmlns:r="http://schemas.openxmlformats.org/officeDocument/2006/relationships" xmlns:p="http://schemas.openxmlformats.org/presentationml/2006/main">
-  <p:cSld>
-    <p:spTree>
-      <p:nvGrpSpPr>
-        <p:cNvPr id="1" name=""/>
-        <p:cNvGrpSpPr/>
-        <p:nvPr/>
-      </p:nvGrpSpPr>
-      <p:grpSpPr>
-        <a:xfrm>
-          <a:off x="0" y="0"/>
-          <a:ext cx="0" cy="0"/>
-          <a:chOff x="0" y="0"/>
-          <a:chExt cx="0" cy="0"/>
-        </a:xfrm>
-      </p:grpSpPr>
-      <p:sp>
-        <p:nvSpPr>
-          <p:cNvPr id="2" name="Folienbildplatzhalter 1"/>
-          <p:cNvSpPr>
-            <a:spLocks noGrp="1" noRot="1" noChangeAspect="1"/>
-          </p:cNvSpPr>
-          <p:nvPr>
-            <p:ph type="sldImg"/>
-          </p:nvPr>
-        </p:nvSpPr>
-        <p:spPr/>
-      </p:sp>
-      <p:sp>
-        <p:nvSpPr>
-          <p:cNvPr id="3" name="Notizenplatzhalter 2"/>
-          <p:cNvSpPr>
-            <a:spLocks noGrp="1"/>
-          </p:cNvSpPr>
-          <p:nvPr>
-            <p:ph type="body" idx="1"/>
-          </p:nvPr>
-        </p:nvSpPr>
-        <p:spPr/>
-        <p:txBody>
-          <a:bodyPr/>
-          <a:lstStyle/>
-          <a:p>
             <a:endParaRPr lang="de-DE" dirty="0"/>
           </a:p>
         </p:txBody>
@@ -1485,7 +1373,7 @@
           <a:p>
             <a:fld id="{B81AF98B-18BF-42AA-A0FC-32820FA6E810}" type="datetimeFigureOut">
               <a:rPr lang="de-DE" smtClean="0"/>
-              <a:t>06.11.19</a:t>
+              <a:t>07.11.19</a:t>
             </a:fld>
             <a:endParaRPr lang="de-DE"/>
           </a:p>
@@ -1683,7 +1571,7 @@
           <a:p>
             <a:fld id="{B81AF98B-18BF-42AA-A0FC-32820FA6E810}" type="datetimeFigureOut">
               <a:rPr lang="de-DE" smtClean="0"/>
-              <a:t>06.11.19</a:t>
+              <a:t>07.11.19</a:t>
             </a:fld>
             <a:endParaRPr lang="de-DE"/>
           </a:p>
@@ -1891,7 +1779,7 @@
           <a:p>
             <a:fld id="{B81AF98B-18BF-42AA-A0FC-32820FA6E810}" type="datetimeFigureOut">
               <a:rPr lang="de-DE" smtClean="0"/>
-              <a:t>06.11.19</a:t>
+              <a:t>07.11.19</a:t>
             </a:fld>
             <a:endParaRPr lang="de-DE"/>
           </a:p>
@@ -2089,7 +1977,7 @@
           <a:p>
             <a:fld id="{B81AF98B-18BF-42AA-A0FC-32820FA6E810}" type="datetimeFigureOut">
               <a:rPr lang="de-DE" smtClean="0"/>
-              <a:t>06.11.19</a:t>
+              <a:t>07.11.19</a:t>
             </a:fld>
             <a:endParaRPr lang="de-DE"/>
           </a:p>
@@ -2364,7 +2252,7 @@
           <a:p>
             <a:fld id="{B81AF98B-18BF-42AA-A0FC-32820FA6E810}" type="datetimeFigureOut">
               <a:rPr lang="de-DE" smtClean="0"/>
-              <a:t>06.11.19</a:t>
+              <a:t>07.11.19</a:t>
             </a:fld>
             <a:endParaRPr lang="de-DE"/>
           </a:p>
@@ -2629,7 +2517,7 @@
           <a:p>
             <a:fld id="{B81AF98B-18BF-42AA-A0FC-32820FA6E810}" type="datetimeFigureOut">
               <a:rPr lang="de-DE" smtClean="0"/>
-              <a:t>06.11.19</a:t>
+              <a:t>07.11.19</a:t>
             </a:fld>
             <a:endParaRPr lang="de-DE"/>
           </a:p>
@@ -3041,7 +2929,7 @@
           <a:p>
             <a:fld id="{B81AF98B-18BF-42AA-A0FC-32820FA6E810}" type="datetimeFigureOut">
               <a:rPr lang="de-DE" smtClean="0"/>
-              <a:t>06.11.19</a:t>
+              <a:t>07.11.19</a:t>
             </a:fld>
             <a:endParaRPr lang="de-DE"/>
           </a:p>
@@ -3182,7 +3070,7 @@
           <a:p>
             <a:fld id="{B81AF98B-18BF-42AA-A0FC-32820FA6E810}" type="datetimeFigureOut">
               <a:rPr lang="de-DE" smtClean="0"/>
-              <a:t>06.11.19</a:t>
+              <a:t>07.11.19</a:t>
             </a:fld>
             <a:endParaRPr lang="de-DE"/>
           </a:p>
@@ -3296,7 +3184,7 @@
             <a:fld id="{B61BEF0D-F0BB-DE4B-95CE-6DB70DBA9567}" type="datetimeFigureOut">
               <a:rPr lang="en-US" smtClean="0"/>
               <a:pPr/>
-              <a:t>11/6/19</a:t>
+              <a:t>11/7/19</a:t>
             </a:fld>
             <a:endParaRPr lang="en-US" dirty="0"/>
           </a:p>
@@ -3954,7 +3842,7 @@
           <a:p>
             <a:fld id="{B81AF98B-18BF-42AA-A0FC-32820FA6E810}" type="datetimeFigureOut">
               <a:rPr lang="de-DE" smtClean="0"/>
-              <a:t>06.11.19</a:t>
+              <a:t>07.11.19</a:t>
             </a:fld>
             <a:endParaRPr lang="de-DE"/>
           </a:p>
@@ -4242,7 +4130,7 @@
           <a:p>
             <a:fld id="{B81AF98B-18BF-42AA-A0FC-32820FA6E810}" type="datetimeFigureOut">
               <a:rPr lang="de-DE" smtClean="0"/>
-              <a:t>06.11.19</a:t>
+              <a:t>07.11.19</a:t>
             </a:fld>
             <a:endParaRPr lang="de-DE"/>
           </a:p>
@@ -4483,7 +4371,7 @@
           <a:p>
             <a:fld id="{B81AF98B-18BF-42AA-A0FC-32820FA6E810}" type="datetimeFigureOut">
               <a:rPr lang="de-DE" smtClean="0"/>
-              <a:t>06.11.19</a:t>
+              <a:t>07.11.19</a:t>
             </a:fld>
             <a:endParaRPr lang="de-DE"/>
           </a:p>
@@ -5182,18 +5070,7 @@
                 <a:ea typeface="Open Sans" panose="020B0606030504020204" pitchFamily="34" charset="0"/>
                 <a:cs typeface="Open Sans" panose="020B0606030504020204" pitchFamily="34" charset="0"/>
               </a:rPr>
-              <a:t>funktionale</a:t>
-            </a:r>
-            <a:r>
-              <a:rPr lang="de-DE" sz="3600" dirty="0">
-                <a:solidFill>
-                  <a:schemeClr val="bg1"/>
-                </a:solidFill>
-                <a:latin typeface="Kallisto Lined" panose="00000A00000000000000" pitchFamily="50" charset="0"/>
-                <a:ea typeface="MS Gothic" panose="020B0609070205080204" pitchFamily="49" charset="-128"/>
-                <a:cs typeface="Open Sans" panose="020B0606030504020204" pitchFamily="34" charset="0"/>
-              </a:rPr>
-              <a:t> Programmiersprache</a:t>
+              <a:t>funktionale Programmiersprache</a:t>
             </a:r>
           </a:p>
         </p:txBody>
@@ -6554,87 +6431,270 @@
       </p:grpSpPr>
       <p:sp>
         <p:nvSpPr>
-          <p:cNvPr id="3" name="Rechteck 2">
+          <p:cNvPr id="4" name="Textfeld 3">
             <a:extLst>
               <a:ext uri="{FF2B5EF4-FFF2-40B4-BE49-F238E27FC236}">
-                <a16:creationId xmlns:a16="http://schemas.microsoft.com/office/drawing/2014/main" id="{FCA8989D-5AA3-B248-BD99-C024BC5C1C6B}"/>
+                <a16:creationId xmlns:a16="http://schemas.microsoft.com/office/drawing/2014/main" id="{EC93504B-DEEB-49ED-8DBB-7139D3B8424D}"/>
               </a:ext>
             </a:extLst>
           </p:cNvPr>
-          <p:cNvSpPr/>
+          <p:cNvSpPr txBox="1"/>
           <p:nvPr/>
         </p:nvSpPr>
         <p:spPr>
           <a:xfrm>
-            <a:off x="627529" y="797510"/>
-            <a:ext cx="7193280" cy="5262979"/>
+            <a:off x="451589" y="682566"/>
+            <a:ext cx="450850" cy="584775"/>
           </a:xfrm>
           <a:prstGeom prst="rect">
             <a:avLst/>
           </a:prstGeom>
+          <a:noFill/>
         </p:spPr>
         <p:txBody>
-          <a:bodyPr wrap="square">
+          <a:bodyPr wrap="square" rtlCol="0">
+            <a:noAutofit/>
+          </a:bodyPr>
+          <a:lstStyle/>
+          <a:p>
+            <a:r>
+              <a:rPr lang="de-DE" sz="3200" b="1" dirty="0">
+                <a:solidFill>
+                  <a:srgbClr val="5A6278"/>
+                </a:solidFill>
+                <a:latin typeface="Kallisto Lined" panose="00000A00000000000000" pitchFamily="50" charset="0"/>
+              </a:rPr>
+              <a:t>E</a:t>
+            </a:r>
+            <a:endParaRPr lang="de-DE" dirty="0">
+              <a:solidFill>
+                <a:srgbClr val="5A6278"/>
+              </a:solidFill>
+              <a:latin typeface="Kallisto Lined" panose="00000A00000000000000" pitchFamily="50" charset="0"/>
+            </a:endParaRPr>
+          </a:p>
+        </p:txBody>
+      </p:sp>
+      <p:sp>
+        <p:nvSpPr>
+          <p:cNvPr id="6" name="Textfeld 5">
+            <a:extLst>
+              <a:ext uri="{FF2B5EF4-FFF2-40B4-BE49-F238E27FC236}">
+                <a16:creationId xmlns:a16="http://schemas.microsoft.com/office/drawing/2014/main" id="{DF5BA668-2F39-4FD1-A0B4-90E132A873C3}"/>
+              </a:ext>
+            </a:extLst>
+          </p:cNvPr>
+          <p:cNvSpPr txBox="1"/>
+          <p:nvPr/>
+        </p:nvSpPr>
+        <p:spPr>
+          <a:xfrm>
+            <a:off x="1473939" y="678205"/>
+            <a:ext cx="4258553" cy="584775"/>
+          </a:xfrm>
+          <a:prstGeom prst="rect">
+            <a:avLst/>
+          </a:prstGeom>
+          <a:noFill/>
+        </p:spPr>
+        <p:txBody>
+          <a:bodyPr wrap="square" rtlCol="0">
             <a:spAutoFit/>
           </a:bodyPr>
           <a:lstStyle/>
           <a:p>
             <a:r>
-              <a:rPr lang="de-DE" sz="2400" dirty="0" err="1">
+              <a:rPr lang="de-DE" sz="3200" b="1" dirty="0">
+                <a:latin typeface="Open Sans" panose="020B0606030504020204" pitchFamily="34" charset="0"/>
+                <a:ea typeface="Open Sans" panose="020B0606030504020204" pitchFamily="34" charset="0"/>
+                <a:cs typeface="Open Sans" panose="020B0606030504020204" pitchFamily="34" charset="0"/>
+              </a:rPr>
+              <a:t>CODEBEISPIEL</a:t>
+            </a:r>
+            <a:endParaRPr lang="de-DE" dirty="0">
+              <a:latin typeface="Open Sans" panose="020B0606030504020204" pitchFamily="34" charset="0"/>
+              <a:ea typeface="Open Sans" panose="020B0606030504020204" pitchFamily="34" charset="0"/>
+              <a:cs typeface="Open Sans" panose="020B0606030504020204" pitchFamily="34" charset="0"/>
+            </a:endParaRPr>
+          </a:p>
+        </p:txBody>
+      </p:sp>
+      <p:sp>
+        <p:nvSpPr>
+          <p:cNvPr id="7" name="Textfeld 6">
+            <a:extLst>
+              <a:ext uri="{FF2B5EF4-FFF2-40B4-BE49-F238E27FC236}">
+                <a16:creationId xmlns:a16="http://schemas.microsoft.com/office/drawing/2014/main" id="{3E37BFC1-836E-483A-BF30-B22DA56D38FE}"/>
+              </a:ext>
+            </a:extLst>
+          </p:cNvPr>
+          <p:cNvSpPr txBox="1"/>
+          <p:nvPr/>
+        </p:nvSpPr>
+        <p:spPr>
+          <a:xfrm>
+            <a:off x="727814" y="682566"/>
+            <a:ext cx="450850" cy="584775"/>
+          </a:xfrm>
+          <a:prstGeom prst="rect">
+            <a:avLst/>
+          </a:prstGeom>
+          <a:noFill/>
+        </p:spPr>
+        <p:txBody>
+          <a:bodyPr wrap="square" rtlCol="0">
+            <a:noAutofit/>
+          </a:bodyPr>
+          <a:lstStyle/>
+          <a:p>
+            <a:r>
+              <a:rPr lang="de-DE" sz="3200" b="1" dirty="0">
+                <a:solidFill>
+                  <a:srgbClr val="5A6278"/>
+                </a:solidFill>
+                <a:latin typeface="Kallisto Lined" panose="00000A00000000000000" pitchFamily="50" charset="0"/>
+              </a:rPr>
+              <a:t>L</a:t>
+            </a:r>
+            <a:endParaRPr lang="de-DE" dirty="0">
+              <a:solidFill>
+                <a:srgbClr val="5A6278"/>
+              </a:solidFill>
+              <a:latin typeface="Kallisto Lined" panose="00000A00000000000000" pitchFamily="50" charset="0"/>
+            </a:endParaRPr>
+          </a:p>
+        </p:txBody>
+      </p:sp>
+      <p:sp>
+        <p:nvSpPr>
+          <p:cNvPr id="8" name="Textfeld 7">
+            <a:extLst>
+              <a:ext uri="{FF2B5EF4-FFF2-40B4-BE49-F238E27FC236}">
+                <a16:creationId xmlns:a16="http://schemas.microsoft.com/office/drawing/2014/main" id="{9020D034-C67A-432A-B4AE-F339CE2EF2C3}"/>
+              </a:ext>
+            </a:extLst>
+          </p:cNvPr>
+          <p:cNvSpPr txBox="1"/>
+          <p:nvPr/>
+        </p:nvSpPr>
+        <p:spPr>
+          <a:xfrm>
+            <a:off x="962764" y="682565"/>
+            <a:ext cx="450850" cy="584775"/>
+          </a:xfrm>
+          <a:prstGeom prst="rect">
+            <a:avLst/>
+          </a:prstGeom>
+          <a:noFill/>
+        </p:spPr>
+        <p:txBody>
+          <a:bodyPr wrap="square" rtlCol="0">
+            <a:noAutofit/>
+          </a:bodyPr>
+          <a:lstStyle/>
+          <a:p>
+            <a:r>
+              <a:rPr lang="de-DE" sz="3200" b="1" dirty="0">
+                <a:solidFill>
+                  <a:srgbClr val="5A6278"/>
+                </a:solidFill>
+                <a:latin typeface="Kallisto Lined" panose="00000A00000000000000" pitchFamily="50" charset="0"/>
+              </a:rPr>
+              <a:t>M</a:t>
+            </a:r>
+            <a:endParaRPr lang="de-DE" dirty="0">
+              <a:solidFill>
+                <a:srgbClr val="5A6278"/>
+              </a:solidFill>
+              <a:latin typeface="Kallisto Lined" panose="00000A00000000000000" pitchFamily="50" charset="0"/>
+            </a:endParaRPr>
+          </a:p>
+        </p:txBody>
+      </p:sp>
+      <p:sp>
+        <p:nvSpPr>
+          <p:cNvPr id="26" name="Textfeld 25">
+            <a:extLst>
+              <a:ext uri="{FF2B5EF4-FFF2-40B4-BE49-F238E27FC236}">
+                <a16:creationId xmlns:a16="http://schemas.microsoft.com/office/drawing/2014/main" id="{298BDE2F-3959-43E6-8763-79B495E92B09}"/>
+              </a:ext>
+            </a:extLst>
+          </p:cNvPr>
+          <p:cNvSpPr txBox="1"/>
+          <p:nvPr/>
+        </p:nvSpPr>
+        <p:spPr>
+          <a:xfrm>
+            <a:off x="451589" y="1357980"/>
+            <a:ext cx="10727040" cy="4401205"/>
+          </a:xfrm>
+          <a:prstGeom prst="rect">
+            <a:avLst/>
+          </a:prstGeom>
+          <a:noFill/>
+        </p:spPr>
+        <p:txBody>
+          <a:bodyPr wrap="square" rtlCol="0">
+            <a:spAutoFit/>
+          </a:bodyPr>
+          <a:lstStyle/>
+          <a:p>
+            <a:r>
+              <a:rPr lang="de-DE" sz="2000" dirty="0" err="1">
                 <a:latin typeface="Courier New" panose="02070309020205020404" pitchFamily="49" charset="0"/>
                 <a:cs typeface="Courier New" panose="02070309020205020404" pitchFamily="49" charset="0"/>
               </a:rPr>
               <a:t>import</a:t>
             </a:r>
             <a:r>
-              <a:rPr lang="de-DE" sz="2400" dirty="0">
+              <a:rPr lang="de-DE" sz="2000" dirty="0">
                 <a:latin typeface="Courier New" panose="02070309020205020404" pitchFamily="49" charset="0"/>
                 <a:cs typeface="Courier New" panose="02070309020205020404" pitchFamily="49" charset="0"/>
               </a:rPr>
               <a:t> </a:t>
             </a:r>
             <a:r>
-              <a:rPr lang="de-DE" sz="2400" dirty="0" err="1">
+              <a:rPr lang="de-DE" sz="2000" dirty="0" err="1">
                 <a:latin typeface="Courier New" panose="02070309020205020404" pitchFamily="49" charset="0"/>
                 <a:cs typeface="Courier New" panose="02070309020205020404" pitchFamily="49" charset="0"/>
               </a:rPr>
               <a:t>Html</a:t>
             </a:r>
-            <a:endParaRPr lang="de-DE" sz="2400" dirty="0">
+            <a:endParaRPr lang="de-DE" sz="2000" dirty="0">
               <a:latin typeface="Courier New" panose="02070309020205020404" pitchFamily="49" charset="0"/>
               <a:cs typeface="Courier New" panose="02070309020205020404" pitchFamily="49" charset="0"/>
             </a:endParaRPr>
           </a:p>
           <a:p>
-            <a:endParaRPr lang="de-DE" sz="2400" dirty="0">
+            <a:endParaRPr lang="de-DE" sz="2000" dirty="0">
               <a:latin typeface="Courier New" panose="02070309020205020404" pitchFamily="49" charset="0"/>
               <a:cs typeface="Courier New" panose="02070309020205020404" pitchFamily="49" charset="0"/>
             </a:endParaRPr>
           </a:p>
           <a:p>
             <a:r>
-              <a:rPr lang="de-DE" sz="2400" dirty="0" err="1">
+              <a:rPr lang="de-DE" sz="2000" dirty="0" err="1">
                 <a:latin typeface="Courier New" panose="02070309020205020404" pitchFamily="49" charset="0"/>
                 <a:cs typeface="Courier New" panose="02070309020205020404" pitchFamily="49" charset="0"/>
               </a:rPr>
               <a:t>test</a:t>
             </a:r>
             <a:r>
-              <a:rPr lang="de-DE" sz="2400" dirty="0">
+              <a:rPr lang="de-DE" sz="2000" dirty="0">
                 <a:latin typeface="Courier New" panose="02070309020205020404" pitchFamily="49" charset="0"/>
                 <a:cs typeface="Courier New" panose="02070309020205020404" pitchFamily="49" charset="0"/>
               </a:rPr>
               <a:t> </a:t>
             </a:r>
             <a:r>
-              <a:rPr lang="de-DE" sz="2400" dirty="0" err="1">
+              <a:rPr lang="de-DE" sz="2000" dirty="0" err="1">
                 <a:latin typeface="Courier New" panose="02070309020205020404" pitchFamily="49" charset="0"/>
                 <a:cs typeface="Courier New" panose="02070309020205020404" pitchFamily="49" charset="0"/>
               </a:rPr>
               <a:t>n</a:t>
             </a:r>
             <a:r>
-              <a:rPr lang="de-DE" sz="2400" dirty="0">
+              <a:rPr lang="de-DE" sz="2000" dirty="0">
                 <a:latin typeface="Courier New" panose="02070309020205020404" pitchFamily="49" charset="0"/>
                 <a:cs typeface="Courier New" panose="02070309020205020404" pitchFamily="49" charset="0"/>
               </a:rPr>
@@ -6643,55 +6703,55 @@
           </a:p>
           <a:p>
             <a:r>
-              <a:rPr lang="de-DE" sz="2400" dirty="0">
+              <a:rPr lang="de-DE" sz="2000" dirty="0">
                 <a:latin typeface="Courier New" panose="02070309020205020404" pitchFamily="49" charset="0"/>
                 <a:cs typeface="Courier New" panose="02070309020205020404" pitchFamily="49" charset="0"/>
               </a:rPr>
               <a:t>  </a:t>
             </a:r>
             <a:r>
-              <a:rPr lang="de-DE" sz="2400" dirty="0" err="1">
+              <a:rPr lang="de-DE" sz="2000" dirty="0" err="1">
                 <a:latin typeface="Courier New" panose="02070309020205020404" pitchFamily="49" charset="0"/>
                 <a:cs typeface="Courier New" panose="02070309020205020404" pitchFamily="49" charset="0"/>
               </a:rPr>
               <a:t>if</a:t>
             </a:r>
             <a:r>
-              <a:rPr lang="de-DE" sz="2400" dirty="0">
+              <a:rPr lang="de-DE" sz="2000" dirty="0">
                 <a:latin typeface="Courier New" panose="02070309020205020404" pitchFamily="49" charset="0"/>
                 <a:cs typeface="Courier New" panose="02070309020205020404" pitchFamily="49" charset="0"/>
               </a:rPr>
               <a:t> </a:t>
             </a:r>
             <a:r>
-              <a:rPr lang="de-DE" sz="2400" dirty="0" err="1">
+              <a:rPr lang="de-DE" sz="2000" dirty="0" err="1">
                 <a:latin typeface="Courier New" panose="02070309020205020404" pitchFamily="49" charset="0"/>
                 <a:cs typeface="Courier New" panose="02070309020205020404" pitchFamily="49" charset="0"/>
               </a:rPr>
               <a:t>n</a:t>
             </a:r>
             <a:r>
-              <a:rPr lang="de-DE" sz="2400" dirty="0">
+              <a:rPr lang="de-DE" sz="2000" dirty="0">
                 <a:latin typeface="Courier New" panose="02070309020205020404" pitchFamily="49" charset="0"/>
                 <a:cs typeface="Courier New" panose="02070309020205020404" pitchFamily="49" charset="0"/>
               </a:rPr>
               <a:t> &gt; 0 </a:t>
             </a:r>
             <a:r>
-              <a:rPr lang="de-DE" sz="2400" dirty="0" err="1">
+              <a:rPr lang="de-DE" sz="2000" dirty="0" err="1">
                 <a:latin typeface="Courier New" panose="02070309020205020404" pitchFamily="49" charset="0"/>
                 <a:cs typeface="Courier New" panose="02070309020205020404" pitchFamily="49" charset="0"/>
               </a:rPr>
               <a:t>then</a:t>
             </a:r>
-            <a:endParaRPr lang="de-DE" sz="2400" dirty="0">
+            <a:endParaRPr lang="de-DE" sz="2000" dirty="0">
               <a:latin typeface="Courier New" panose="02070309020205020404" pitchFamily="49" charset="0"/>
               <a:cs typeface="Courier New" panose="02070309020205020404" pitchFamily="49" charset="0"/>
             </a:endParaRPr>
           </a:p>
           <a:p>
             <a:r>
-              <a:rPr lang="de-DE" sz="2400" dirty="0">
+              <a:rPr lang="de-DE" sz="2000" dirty="0">
                 <a:latin typeface="Courier New" panose="02070309020205020404" pitchFamily="49" charset="0"/>
                 <a:cs typeface="Courier New" panose="02070309020205020404" pitchFamily="49" charset="0"/>
               </a:rPr>
@@ -6699,76 +6759,76 @@
             </a:r>
           </a:p>
           <a:p>
-            <a:endParaRPr lang="de-DE" sz="2400" dirty="0">
+            <a:endParaRPr lang="de-DE" sz="2000" dirty="0">
               <a:latin typeface="Courier New" panose="02070309020205020404" pitchFamily="49" charset="0"/>
               <a:cs typeface="Courier New" panose="02070309020205020404" pitchFamily="49" charset="0"/>
             </a:endParaRPr>
           </a:p>
           <a:p>
             <a:r>
-              <a:rPr lang="de-DE" sz="2400" dirty="0">
+              <a:rPr lang="de-DE" sz="2000" dirty="0">
                 <a:latin typeface="Courier New" panose="02070309020205020404" pitchFamily="49" charset="0"/>
                 <a:cs typeface="Courier New" panose="02070309020205020404" pitchFamily="49" charset="0"/>
               </a:rPr>
               <a:t>  </a:t>
             </a:r>
             <a:r>
-              <a:rPr lang="de-DE" sz="2400" dirty="0" err="1">
+              <a:rPr lang="de-DE" sz="2000" dirty="0" err="1">
                 <a:latin typeface="Courier New" panose="02070309020205020404" pitchFamily="49" charset="0"/>
                 <a:cs typeface="Courier New" panose="02070309020205020404" pitchFamily="49" charset="0"/>
               </a:rPr>
               <a:t>else</a:t>
             </a:r>
             <a:r>
-              <a:rPr lang="de-DE" sz="2400" dirty="0">
+              <a:rPr lang="de-DE" sz="2000" dirty="0">
                 <a:latin typeface="Courier New" panose="02070309020205020404" pitchFamily="49" charset="0"/>
                 <a:cs typeface="Courier New" panose="02070309020205020404" pitchFamily="49" charset="0"/>
               </a:rPr>
               <a:t> </a:t>
             </a:r>
             <a:r>
-              <a:rPr lang="de-DE" sz="2400" dirty="0" err="1">
+              <a:rPr lang="de-DE" sz="2000" dirty="0" err="1">
                 <a:latin typeface="Courier New" panose="02070309020205020404" pitchFamily="49" charset="0"/>
                 <a:cs typeface="Courier New" panose="02070309020205020404" pitchFamily="49" charset="0"/>
               </a:rPr>
               <a:t>if</a:t>
             </a:r>
             <a:r>
-              <a:rPr lang="de-DE" sz="2400" dirty="0">
+              <a:rPr lang="de-DE" sz="2000" dirty="0">
                 <a:latin typeface="Courier New" panose="02070309020205020404" pitchFamily="49" charset="0"/>
                 <a:cs typeface="Courier New" panose="02070309020205020404" pitchFamily="49" charset="0"/>
               </a:rPr>
               <a:t> </a:t>
             </a:r>
             <a:r>
-              <a:rPr lang="de-DE" sz="2400" dirty="0" err="1">
+              <a:rPr lang="de-DE" sz="2000" dirty="0" err="1">
                 <a:latin typeface="Courier New" panose="02070309020205020404" pitchFamily="49" charset="0"/>
                 <a:cs typeface="Courier New" panose="02070309020205020404" pitchFamily="49" charset="0"/>
               </a:rPr>
               <a:t>n</a:t>
             </a:r>
             <a:r>
-              <a:rPr lang="de-DE" sz="2400" dirty="0">
+              <a:rPr lang="de-DE" sz="2000" dirty="0">
                 <a:latin typeface="Courier New" panose="02070309020205020404" pitchFamily="49" charset="0"/>
                 <a:cs typeface="Courier New" panose="02070309020205020404" pitchFamily="49" charset="0"/>
               </a:rPr>
               <a:t> &lt; 0 </a:t>
             </a:r>
             <a:r>
-              <a:rPr lang="de-DE" sz="2400" dirty="0" err="1">
+              <a:rPr lang="de-DE" sz="2000" dirty="0" err="1">
                 <a:latin typeface="Courier New" panose="02070309020205020404" pitchFamily="49" charset="0"/>
                 <a:cs typeface="Courier New" panose="02070309020205020404" pitchFamily="49" charset="0"/>
               </a:rPr>
               <a:t>then</a:t>
             </a:r>
-            <a:endParaRPr lang="de-DE" sz="2400" dirty="0">
+            <a:endParaRPr lang="de-DE" sz="2000" dirty="0">
               <a:latin typeface="Courier New" panose="02070309020205020404" pitchFamily="49" charset="0"/>
               <a:cs typeface="Courier New" panose="02070309020205020404" pitchFamily="49" charset="0"/>
             </a:endParaRPr>
           </a:p>
           <a:p>
             <a:r>
-              <a:rPr lang="de-DE" sz="2400" dirty="0">
+              <a:rPr lang="de-DE" sz="2000" dirty="0">
                 <a:latin typeface="Courier New" panose="02070309020205020404" pitchFamily="49" charset="0"/>
                 <a:cs typeface="Courier New" panose="02070309020205020404" pitchFamily="49" charset="0"/>
               </a:rPr>
@@ -6776,34 +6836,34 @@
             </a:r>
           </a:p>
           <a:p>
-            <a:endParaRPr lang="de-DE" sz="2400" dirty="0">
+            <a:endParaRPr lang="de-DE" sz="2000" dirty="0">
               <a:latin typeface="Courier New" panose="02070309020205020404" pitchFamily="49" charset="0"/>
               <a:cs typeface="Courier New" panose="02070309020205020404" pitchFamily="49" charset="0"/>
             </a:endParaRPr>
           </a:p>
           <a:p>
             <a:r>
-              <a:rPr lang="de-DE" sz="2400" dirty="0">
+              <a:rPr lang="de-DE" sz="2000" dirty="0">
                 <a:latin typeface="Courier New" panose="02070309020205020404" pitchFamily="49" charset="0"/>
                 <a:cs typeface="Courier New" panose="02070309020205020404" pitchFamily="49" charset="0"/>
               </a:rPr>
               <a:t>  </a:t>
             </a:r>
             <a:r>
-              <a:rPr lang="de-DE" sz="2400" dirty="0" err="1">
+              <a:rPr lang="de-DE" sz="2000" dirty="0" err="1">
                 <a:latin typeface="Courier New" panose="02070309020205020404" pitchFamily="49" charset="0"/>
                 <a:cs typeface="Courier New" panose="02070309020205020404" pitchFamily="49" charset="0"/>
               </a:rPr>
               <a:t>else</a:t>
             </a:r>
-            <a:endParaRPr lang="de-DE" sz="2400" dirty="0">
+            <a:endParaRPr lang="de-DE" sz="2000" dirty="0">
               <a:latin typeface="Courier New" panose="02070309020205020404" pitchFamily="49" charset="0"/>
               <a:cs typeface="Courier New" panose="02070309020205020404" pitchFamily="49" charset="0"/>
             </a:endParaRPr>
           </a:p>
           <a:p>
             <a:r>
-              <a:rPr lang="de-DE" sz="2400" dirty="0">
+              <a:rPr lang="de-DE" sz="2000" dirty="0">
                 <a:latin typeface="Courier New" panose="02070309020205020404" pitchFamily="49" charset="0"/>
                 <a:cs typeface="Courier New" panose="02070309020205020404" pitchFamily="49" charset="0"/>
               </a:rPr>
@@ -6812,7 +6872,7 @@
           </a:p>
           <a:p>
             <a:r>
-              <a:rPr lang="de-DE" sz="2400" dirty="0">
+              <a:rPr lang="de-DE" sz="2000" dirty="0">
                 <a:latin typeface="Courier New" panose="02070309020205020404" pitchFamily="49" charset="0"/>
                 <a:cs typeface="Courier New" panose="02070309020205020404" pitchFamily="49" charset="0"/>
               </a:rPr>
@@ -6821,14 +6881,14 @@
           </a:p>
           <a:p>
             <a:r>
-              <a:rPr lang="de-DE" sz="2400" dirty="0" err="1">
+              <a:rPr lang="de-DE" sz="2000" dirty="0" err="1">
                 <a:latin typeface="Courier New" panose="02070309020205020404" pitchFamily="49" charset="0"/>
                 <a:cs typeface="Courier New" panose="02070309020205020404" pitchFamily="49" charset="0"/>
               </a:rPr>
               <a:t>main</a:t>
             </a:r>
             <a:r>
-              <a:rPr lang="de-DE" sz="2400" dirty="0">
+              <a:rPr lang="de-DE" sz="2000" dirty="0">
                 <a:latin typeface="Courier New" panose="02070309020205020404" pitchFamily="49" charset="0"/>
                 <a:cs typeface="Courier New" panose="02070309020205020404" pitchFamily="49" charset="0"/>
               </a:rPr>
@@ -6837,35 +6897,35 @@
           </a:p>
           <a:p>
             <a:r>
-              <a:rPr lang="de-DE" sz="2400" dirty="0">
+              <a:rPr lang="de-DE" sz="2000" dirty="0">
                 <a:latin typeface="Courier New" panose="02070309020205020404" pitchFamily="49" charset="0"/>
                 <a:cs typeface="Courier New" panose="02070309020205020404" pitchFamily="49" charset="0"/>
               </a:rPr>
               <a:t>  </a:t>
             </a:r>
             <a:r>
-              <a:rPr lang="de-DE" sz="2400" dirty="0" err="1">
+              <a:rPr lang="de-DE" sz="2000" dirty="0" err="1">
                 <a:latin typeface="Courier New" panose="02070309020205020404" pitchFamily="49" charset="0"/>
                 <a:cs typeface="Courier New" panose="02070309020205020404" pitchFamily="49" charset="0"/>
               </a:rPr>
               <a:t>Html.text</a:t>
             </a:r>
             <a:r>
-              <a:rPr lang="de-DE" sz="2400" dirty="0">
+              <a:rPr lang="de-DE" sz="2000" dirty="0">
                 <a:latin typeface="Courier New" panose="02070309020205020404" pitchFamily="49" charset="0"/>
                 <a:cs typeface="Courier New" panose="02070309020205020404" pitchFamily="49" charset="0"/>
               </a:rPr>
               <a:t> ("Ergebnis: " ++ </a:t>
             </a:r>
             <a:r>
-              <a:rPr lang="de-DE" sz="2400" dirty="0" err="1">
+              <a:rPr lang="de-DE" sz="2000" dirty="0" err="1">
                 <a:latin typeface="Courier New" panose="02070309020205020404" pitchFamily="49" charset="0"/>
                 <a:cs typeface="Courier New" panose="02070309020205020404" pitchFamily="49" charset="0"/>
               </a:rPr>
               <a:t>test</a:t>
             </a:r>
             <a:r>
-              <a:rPr lang="de-DE" sz="2400" dirty="0">
+              <a:rPr lang="de-DE" sz="2000" dirty="0">
                 <a:latin typeface="Courier New" panose="02070309020205020404" pitchFamily="49" charset="0"/>
                 <a:cs typeface="Courier New" panose="02070309020205020404" pitchFamily="49" charset="0"/>
               </a:rPr>
@@ -6877,13 +6937,842 @@
     </p:spTree>
     <p:extLst>
       <p:ext uri="{BB962C8B-B14F-4D97-AF65-F5344CB8AC3E}">
-        <p14:creationId xmlns:p14="http://schemas.microsoft.com/office/powerpoint/2010/main" val="4112260837"/>
+        <p14:creationId xmlns:p14="http://schemas.microsoft.com/office/powerpoint/2010/main" val="3586158469"/>
       </p:ext>
     </p:extLst>
   </p:cSld>
   <p:clrMapOvr>
     <a:masterClrMapping/>
   </p:clrMapOvr>
+  <p:timing>
+    <p:tnLst>
+      <p:par>
+        <p:cTn id="1" dur="indefinite" restart="never" nodeType="tmRoot">
+          <p:childTnLst>
+            <p:seq concurrent="1" nextAc="seek">
+              <p:cTn id="2" dur="indefinite" nodeType="mainSeq">
+                <p:childTnLst>
+                  <p:par>
+                    <p:cTn id="3" fill="hold">
+                      <p:stCondLst>
+                        <p:cond delay="indefinite"/>
+                        <p:cond evt="onBegin" delay="0">
+                          <p:tn val="2"/>
+                        </p:cond>
+                      </p:stCondLst>
+                      <p:childTnLst>
+                        <p:par>
+                          <p:cTn id="4" fill="hold">
+                            <p:stCondLst>
+                              <p:cond delay="0"/>
+                            </p:stCondLst>
+                            <p:childTnLst>
+                              <p:par>
+                                <p:cTn id="5" presetID="2" presetClass="entr" presetSubtype="9" fill="hold" grpId="0" nodeType="afterEffect">
+                                  <p:stCondLst>
+                                    <p:cond delay="0"/>
+                                  </p:stCondLst>
+                                  <p:childTnLst>
+                                    <p:set>
+                                      <p:cBhvr>
+                                        <p:cTn id="6" dur="1" fill="hold">
+                                          <p:stCondLst>
+                                            <p:cond delay="0"/>
+                                          </p:stCondLst>
+                                        </p:cTn>
+                                        <p:tgtEl>
+                                          <p:spTgt spid="4"/>
+                                        </p:tgtEl>
+                                        <p:attrNameLst>
+                                          <p:attrName>style.visibility</p:attrName>
+                                        </p:attrNameLst>
+                                      </p:cBhvr>
+                                      <p:to>
+                                        <p:strVal val="visible"/>
+                                      </p:to>
+                                    </p:set>
+                                    <p:anim calcmode="lin" valueType="num">
+                                      <p:cBhvr additive="base">
+                                        <p:cTn id="7" dur="250" fill="hold"/>
+                                        <p:tgtEl>
+                                          <p:spTgt spid="4"/>
+                                        </p:tgtEl>
+                                        <p:attrNameLst>
+                                          <p:attrName>ppt_x</p:attrName>
+                                        </p:attrNameLst>
+                                      </p:cBhvr>
+                                      <p:tavLst>
+                                        <p:tav tm="0">
+                                          <p:val>
+                                            <p:strVal val="0-#ppt_w/2"/>
+                                          </p:val>
+                                        </p:tav>
+                                        <p:tav tm="100000">
+                                          <p:val>
+                                            <p:strVal val="#ppt_x"/>
+                                          </p:val>
+                                        </p:tav>
+                                      </p:tavLst>
+                                    </p:anim>
+                                    <p:anim calcmode="lin" valueType="num">
+                                      <p:cBhvr additive="base">
+                                        <p:cTn id="8" dur="250" fill="hold"/>
+                                        <p:tgtEl>
+                                          <p:spTgt spid="4"/>
+                                        </p:tgtEl>
+                                        <p:attrNameLst>
+                                          <p:attrName>ppt_y</p:attrName>
+                                        </p:attrNameLst>
+                                      </p:cBhvr>
+                                      <p:tavLst>
+                                        <p:tav tm="0">
+                                          <p:val>
+                                            <p:strVal val="0-#ppt_h/2"/>
+                                          </p:val>
+                                        </p:tav>
+                                        <p:tav tm="100000">
+                                          <p:val>
+                                            <p:strVal val="#ppt_y"/>
+                                          </p:val>
+                                        </p:tav>
+                                      </p:tavLst>
+                                    </p:anim>
+                                  </p:childTnLst>
+                                </p:cTn>
+                              </p:par>
+                            </p:childTnLst>
+                          </p:cTn>
+                        </p:par>
+                        <p:par>
+                          <p:cTn id="9" fill="hold">
+                            <p:stCondLst>
+                              <p:cond delay="250"/>
+                            </p:stCondLst>
+                            <p:childTnLst>
+                              <p:par>
+                                <p:cTn id="10" presetID="2" presetClass="entr" presetSubtype="1" fill="hold" grpId="0" nodeType="afterEffect">
+                                  <p:stCondLst>
+                                    <p:cond delay="0"/>
+                                  </p:stCondLst>
+                                  <p:childTnLst>
+                                    <p:set>
+                                      <p:cBhvr>
+                                        <p:cTn id="11" dur="1" fill="hold">
+                                          <p:stCondLst>
+                                            <p:cond delay="0"/>
+                                          </p:stCondLst>
+                                        </p:cTn>
+                                        <p:tgtEl>
+                                          <p:spTgt spid="7"/>
+                                        </p:tgtEl>
+                                        <p:attrNameLst>
+                                          <p:attrName>style.visibility</p:attrName>
+                                        </p:attrNameLst>
+                                      </p:cBhvr>
+                                      <p:to>
+                                        <p:strVal val="visible"/>
+                                      </p:to>
+                                    </p:set>
+                                    <p:anim calcmode="lin" valueType="num">
+                                      <p:cBhvr additive="base">
+                                        <p:cTn id="12" dur="250" fill="hold"/>
+                                        <p:tgtEl>
+                                          <p:spTgt spid="7"/>
+                                        </p:tgtEl>
+                                        <p:attrNameLst>
+                                          <p:attrName>ppt_x</p:attrName>
+                                        </p:attrNameLst>
+                                      </p:cBhvr>
+                                      <p:tavLst>
+                                        <p:tav tm="0">
+                                          <p:val>
+                                            <p:strVal val="#ppt_x"/>
+                                          </p:val>
+                                        </p:tav>
+                                        <p:tav tm="100000">
+                                          <p:val>
+                                            <p:strVal val="#ppt_x"/>
+                                          </p:val>
+                                        </p:tav>
+                                      </p:tavLst>
+                                    </p:anim>
+                                    <p:anim calcmode="lin" valueType="num">
+                                      <p:cBhvr additive="base">
+                                        <p:cTn id="13" dur="250" fill="hold"/>
+                                        <p:tgtEl>
+                                          <p:spTgt spid="7"/>
+                                        </p:tgtEl>
+                                        <p:attrNameLst>
+                                          <p:attrName>ppt_y</p:attrName>
+                                        </p:attrNameLst>
+                                      </p:cBhvr>
+                                      <p:tavLst>
+                                        <p:tav tm="0">
+                                          <p:val>
+                                            <p:strVal val="0-#ppt_h/2"/>
+                                          </p:val>
+                                        </p:tav>
+                                        <p:tav tm="100000">
+                                          <p:val>
+                                            <p:strVal val="#ppt_y"/>
+                                          </p:val>
+                                        </p:tav>
+                                      </p:tavLst>
+                                    </p:anim>
+                                  </p:childTnLst>
+                                </p:cTn>
+                              </p:par>
+                            </p:childTnLst>
+                          </p:cTn>
+                        </p:par>
+                        <p:par>
+                          <p:cTn id="14" fill="hold">
+                            <p:stCondLst>
+                              <p:cond delay="500"/>
+                            </p:stCondLst>
+                            <p:childTnLst>
+                              <p:par>
+                                <p:cTn id="15" presetID="2" presetClass="entr" presetSubtype="3" fill="hold" grpId="0" nodeType="afterEffect">
+                                  <p:stCondLst>
+                                    <p:cond delay="0"/>
+                                  </p:stCondLst>
+                                  <p:childTnLst>
+                                    <p:set>
+                                      <p:cBhvr>
+                                        <p:cTn id="16" dur="1" fill="hold">
+                                          <p:stCondLst>
+                                            <p:cond delay="0"/>
+                                          </p:stCondLst>
+                                        </p:cTn>
+                                        <p:tgtEl>
+                                          <p:spTgt spid="8"/>
+                                        </p:tgtEl>
+                                        <p:attrNameLst>
+                                          <p:attrName>style.visibility</p:attrName>
+                                        </p:attrNameLst>
+                                      </p:cBhvr>
+                                      <p:to>
+                                        <p:strVal val="visible"/>
+                                      </p:to>
+                                    </p:set>
+                                    <p:anim calcmode="lin" valueType="num">
+                                      <p:cBhvr additive="base">
+                                        <p:cTn id="17" dur="250" fill="hold"/>
+                                        <p:tgtEl>
+                                          <p:spTgt spid="8"/>
+                                        </p:tgtEl>
+                                        <p:attrNameLst>
+                                          <p:attrName>ppt_x</p:attrName>
+                                        </p:attrNameLst>
+                                      </p:cBhvr>
+                                      <p:tavLst>
+                                        <p:tav tm="0">
+                                          <p:val>
+                                            <p:strVal val="1+#ppt_w/2"/>
+                                          </p:val>
+                                        </p:tav>
+                                        <p:tav tm="100000">
+                                          <p:val>
+                                            <p:strVal val="#ppt_x"/>
+                                          </p:val>
+                                        </p:tav>
+                                      </p:tavLst>
+                                    </p:anim>
+                                    <p:anim calcmode="lin" valueType="num">
+                                      <p:cBhvr additive="base">
+                                        <p:cTn id="18" dur="250" fill="hold"/>
+                                        <p:tgtEl>
+                                          <p:spTgt spid="8"/>
+                                        </p:tgtEl>
+                                        <p:attrNameLst>
+                                          <p:attrName>ppt_y</p:attrName>
+                                        </p:attrNameLst>
+                                      </p:cBhvr>
+                                      <p:tavLst>
+                                        <p:tav tm="0">
+                                          <p:val>
+                                            <p:strVal val="0-#ppt_h/2"/>
+                                          </p:val>
+                                        </p:tav>
+                                        <p:tav tm="100000">
+                                          <p:val>
+                                            <p:strVal val="#ppt_y"/>
+                                          </p:val>
+                                        </p:tav>
+                                      </p:tavLst>
+                                    </p:anim>
+                                  </p:childTnLst>
+                                </p:cTn>
+                              </p:par>
+                            </p:childTnLst>
+                          </p:cTn>
+                        </p:par>
+                        <p:par>
+                          <p:cTn id="19" fill="hold">
+                            <p:stCondLst>
+                              <p:cond delay="750"/>
+                            </p:stCondLst>
+                            <p:childTnLst>
+                              <p:par>
+                                <p:cTn id="20" presetID="22" presetClass="entr" presetSubtype="8" fill="hold" grpId="0" nodeType="afterEffect">
+                                  <p:stCondLst>
+                                    <p:cond delay="250"/>
+                                  </p:stCondLst>
+                                  <p:childTnLst>
+                                    <p:set>
+                                      <p:cBhvr>
+                                        <p:cTn id="21" dur="1" fill="hold">
+                                          <p:stCondLst>
+                                            <p:cond delay="0"/>
+                                          </p:stCondLst>
+                                        </p:cTn>
+                                        <p:tgtEl>
+                                          <p:spTgt spid="6"/>
+                                        </p:tgtEl>
+                                        <p:attrNameLst>
+                                          <p:attrName>style.visibility</p:attrName>
+                                        </p:attrNameLst>
+                                      </p:cBhvr>
+                                      <p:to>
+                                        <p:strVal val="visible"/>
+                                      </p:to>
+                                    </p:set>
+                                    <p:animEffect transition="in" filter="wipe(left)">
+                                      <p:cBhvr>
+                                        <p:cTn id="22" dur="250"/>
+                                        <p:tgtEl>
+                                          <p:spTgt spid="6"/>
+                                        </p:tgtEl>
+                                      </p:cBhvr>
+                                    </p:animEffect>
+                                  </p:childTnLst>
+                                </p:cTn>
+                              </p:par>
+                            </p:childTnLst>
+                          </p:cTn>
+                        </p:par>
+                      </p:childTnLst>
+                    </p:cTn>
+                  </p:par>
+                  <p:par>
+                    <p:cTn id="23" fill="hold">
+                      <p:stCondLst>
+                        <p:cond delay="indefinite"/>
+                      </p:stCondLst>
+                      <p:childTnLst>
+                        <p:par>
+                          <p:cTn id="24" fill="hold">
+                            <p:stCondLst>
+                              <p:cond delay="0"/>
+                            </p:stCondLst>
+                            <p:childTnLst>
+                              <p:par>
+                                <p:cTn id="25" presetID="10" presetClass="entr" presetSubtype="0" fill="hold" nodeType="clickEffect">
+                                  <p:stCondLst>
+                                    <p:cond delay="0"/>
+                                  </p:stCondLst>
+                                  <p:childTnLst>
+                                    <p:set>
+                                      <p:cBhvr>
+                                        <p:cTn id="26" dur="1" fill="hold">
+                                          <p:stCondLst>
+                                            <p:cond delay="0"/>
+                                          </p:stCondLst>
+                                        </p:cTn>
+                                        <p:tgtEl>
+                                          <p:spTgt spid="26">
+                                            <p:txEl>
+                                              <p:pRg st="0" end="0"/>
+                                            </p:txEl>
+                                          </p:spTgt>
+                                        </p:tgtEl>
+                                        <p:attrNameLst>
+                                          <p:attrName>style.visibility</p:attrName>
+                                        </p:attrNameLst>
+                                      </p:cBhvr>
+                                      <p:to>
+                                        <p:strVal val="visible"/>
+                                      </p:to>
+                                    </p:set>
+                                    <p:animEffect transition="in" filter="fade">
+                                      <p:cBhvr>
+                                        <p:cTn id="27" dur="500"/>
+                                        <p:tgtEl>
+                                          <p:spTgt spid="26">
+                                            <p:txEl>
+                                              <p:pRg st="0" end="0"/>
+                                            </p:txEl>
+                                          </p:spTgt>
+                                        </p:tgtEl>
+                                      </p:cBhvr>
+                                    </p:animEffect>
+                                  </p:childTnLst>
+                                </p:cTn>
+                              </p:par>
+                              <p:par>
+                                <p:cTn id="28" presetID="10" presetClass="entr" presetSubtype="0" fill="hold" nodeType="withEffect">
+                                  <p:stCondLst>
+                                    <p:cond delay="0"/>
+                                  </p:stCondLst>
+                                  <p:childTnLst>
+                                    <p:set>
+                                      <p:cBhvr>
+                                        <p:cTn id="29" dur="1" fill="hold">
+                                          <p:stCondLst>
+                                            <p:cond delay="0"/>
+                                          </p:stCondLst>
+                                        </p:cTn>
+                                        <p:tgtEl>
+                                          <p:spTgt spid="26">
+                                            <p:txEl>
+                                              <p:pRg st="2" end="2"/>
+                                            </p:txEl>
+                                          </p:spTgt>
+                                        </p:tgtEl>
+                                        <p:attrNameLst>
+                                          <p:attrName>style.visibility</p:attrName>
+                                        </p:attrNameLst>
+                                      </p:cBhvr>
+                                      <p:to>
+                                        <p:strVal val="visible"/>
+                                      </p:to>
+                                    </p:set>
+                                    <p:animEffect transition="in" filter="fade">
+                                      <p:cBhvr>
+                                        <p:cTn id="30" dur="500"/>
+                                        <p:tgtEl>
+                                          <p:spTgt spid="26">
+                                            <p:txEl>
+                                              <p:pRg st="2" end="2"/>
+                                            </p:txEl>
+                                          </p:spTgt>
+                                        </p:tgtEl>
+                                      </p:cBhvr>
+                                    </p:animEffect>
+                                  </p:childTnLst>
+                                </p:cTn>
+                              </p:par>
+                              <p:par>
+                                <p:cTn id="31" presetID="10" presetClass="entr" presetSubtype="0" fill="hold" nodeType="withEffect">
+                                  <p:stCondLst>
+                                    <p:cond delay="0"/>
+                                  </p:stCondLst>
+                                  <p:childTnLst>
+                                    <p:set>
+                                      <p:cBhvr>
+                                        <p:cTn id="32" dur="1" fill="hold">
+                                          <p:stCondLst>
+                                            <p:cond delay="0"/>
+                                          </p:stCondLst>
+                                        </p:cTn>
+                                        <p:tgtEl>
+                                          <p:spTgt spid="26">
+                                            <p:txEl>
+                                              <p:pRg st="3" end="3"/>
+                                            </p:txEl>
+                                          </p:spTgt>
+                                        </p:tgtEl>
+                                        <p:attrNameLst>
+                                          <p:attrName>style.visibility</p:attrName>
+                                        </p:attrNameLst>
+                                      </p:cBhvr>
+                                      <p:to>
+                                        <p:strVal val="visible"/>
+                                      </p:to>
+                                    </p:set>
+                                    <p:animEffect transition="in" filter="fade">
+                                      <p:cBhvr>
+                                        <p:cTn id="33" dur="500"/>
+                                        <p:tgtEl>
+                                          <p:spTgt spid="26">
+                                            <p:txEl>
+                                              <p:pRg st="3" end="3"/>
+                                            </p:txEl>
+                                          </p:spTgt>
+                                        </p:tgtEl>
+                                      </p:cBhvr>
+                                    </p:animEffect>
+                                  </p:childTnLst>
+                                </p:cTn>
+                              </p:par>
+                              <p:par>
+                                <p:cTn id="34" presetID="10" presetClass="entr" presetSubtype="0" fill="hold" nodeType="withEffect">
+                                  <p:stCondLst>
+                                    <p:cond delay="0"/>
+                                  </p:stCondLst>
+                                  <p:childTnLst>
+                                    <p:set>
+                                      <p:cBhvr>
+                                        <p:cTn id="35" dur="1" fill="hold">
+                                          <p:stCondLst>
+                                            <p:cond delay="0"/>
+                                          </p:stCondLst>
+                                        </p:cTn>
+                                        <p:tgtEl>
+                                          <p:spTgt spid="26">
+                                            <p:txEl>
+                                              <p:pRg st="4" end="4"/>
+                                            </p:txEl>
+                                          </p:spTgt>
+                                        </p:tgtEl>
+                                        <p:attrNameLst>
+                                          <p:attrName>style.visibility</p:attrName>
+                                        </p:attrNameLst>
+                                      </p:cBhvr>
+                                      <p:to>
+                                        <p:strVal val="visible"/>
+                                      </p:to>
+                                    </p:set>
+                                    <p:animEffect transition="in" filter="fade">
+                                      <p:cBhvr>
+                                        <p:cTn id="36" dur="500"/>
+                                        <p:tgtEl>
+                                          <p:spTgt spid="26">
+                                            <p:txEl>
+                                              <p:pRg st="4" end="4"/>
+                                            </p:txEl>
+                                          </p:spTgt>
+                                        </p:tgtEl>
+                                      </p:cBhvr>
+                                    </p:animEffect>
+                                  </p:childTnLst>
+                                </p:cTn>
+                              </p:par>
+                              <p:par>
+                                <p:cTn id="37" presetID="10" presetClass="entr" presetSubtype="0" fill="hold" nodeType="withEffect">
+                                  <p:stCondLst>
+                                    <p:cond delay="0"/>
+                                  </p:stCondLst>
+                                  <p:childTnLst>
+                                    <p:set>
+                                      <p:cBhvr>
+                                        <p:cTn id="38" dur="1" fill="hold">
+                                          <p:stCondLst>
+                                            <p:cond delay="0"/>
+                                          </p:stCondLst>
+                                        </p:cTn>
+                                        <p:tgtEl>
+                                          <p:spTgt spid="26">
+                                            <p:txEl>
+                                              <p:pRg st="6" end="6"/>
+                                            </p:txEl>
+                                          </p:spTgt>
+                                        </p:tgtEl>
+                                        <p:attrNameLst>
+                                          <p:attrName>style.visibility</p:attrName>
+                                        </p:attrNameLst>
+                                      </p:cBhvr>
+                                      <p:to>
+                                        <p:strVal val="visible"/>
+                                      </p:to>
+                                    </p:set>
+                                    <p:animEffect transition="in" filter="fade">
+                                      <p:cBhvr>
+                                        <p:cTn id="39" dur="500"/>
+                                        <p:tgtEl>
+                                          <p:spTgt spid="26">
+                                            <p:txEl>
+                                              <p:pRg st="6" end="6"/>
+                                            </p:txEl>
+                                          </p:spTgt>
+                                        </p:tgtEl>
+                                      </p:cBhvr>
+                                    </p:animEffect>
+                                  </p:childTnLst>
+                                </p:cTn>
+                              </p:par>
+                              <p:par>
+                                <p:cTn id="40" presetID="10" presetClass="entr" presetSubtype="0" fill="hold" nodeType="withEffect">
+                                  <p:stCondLst>
+                                    <p:cond delay="0"/>
+                                  </p:stCondLst>
+                                  <p:childTnLst>
+                                    <p:set>
+                                      <p:cBhvr>
+                                        <p:cTn id="41" dur="1" fill="hold">
+                                          <p:stCondLst>
+                                            <p:cond delay="0"/>
+                                          </p:stCondLst>
+                                        </p:cTn>
+                                        <p:tgtEl>
+                                          <p:spTgt spid="26">
+                                            <p:txEl>
+                                              <p:pRg st="7" end="7"/>
+                                            </p:txEl>
+                                          </p:spTgt>
+                                        </p:tgtEl>
+                                        <p:attrNameLst>
+                                          <p:attrName>style.visibility</p:attrName>
+                                        </p:attrNameLst>
+                                      </p:cBhvr>
+                                      <p:to>
+                                        <p:strVal val="visible"/>
+                                      </p:to>
+                                    </p:set>
+                                    <p:animEffect transition="in" filter="fade">
+                                      <p:cBhvr>
+                                        <p:cTn id="42" dur="500"/>
+                                        <p:tgtEl>
+                                          <p:spTgt spid="26">
+                                            <p:txEl>
+                                              <p:pRg st="7" end="7"/>
+                                            </p:txEl>
+                                          </p:spTgt>
+                                        </p:tgtEl>
+                                      </p:cBhvr>
+                                    </p:animEffect>
+                                  </p:childTnLst>
+                                </p:cTn>
+                              </p:par>
+                              <p:par>
+                                <p:cTn id="43" presetID="10" presetClass="entr" presetSubtype="0" fill="hold" nodeType="withEffect">
+                                  <p:stCondLst>
+                                    <p:cond delay="0"/>
+                                  </p:stCondLst>
+                                  <p:childTnLst>
+                                    <p:set>
+                                      <p:cBhvr>
+                                        <p:cTn id="44" dur="1" fill="hold">
+                                          <p:stCondLst>
+                                            <p:cond delay="0"/>
+                                          </p:stCondLst>
+                                        </p:cTn>
+                                        <p:tgtEl>
+                                          <p:spTgt spid="26">
+                                            <p:txEl>
+                                              <p:pRg st="9" end="9"/>
+                                            </p:txEl>
+                                          </p:spTgt>
+                                        </p:tgtEl>
+                                        <p:attrNameLst>
+                                          <p:attrName>style.visibility</p:attrName>
+                                        </p:attrNameLst>
+                                      </p:cBhvr>
+                                      <p:to>
+                                        <p:strVal val="visible"/>
+                                      </p:to>
+                                    </p:set>
+                                    <p:animEffect transition="in" filter="fade">
+                                      <p:cBhvr>
+                                        <p:cTn id="45" dur="500"/>
+                                        <p:tgtEl>
+                                          <p:spTgt spid="26">
+                                            <p:txEl>
+                                              <p:pRg st="9" end="9"/>
+                                            </p:txEl>
+                                          </p:spTgt>
+                                        </p:tgtEl>
+                                      </p:cBhvr>
+                                    </p:animEffect>
+                                  </p:childTnLst>
+                                </p:cTn>
+                              </p:par>
+                              <p:par>
+                                <p:cTn id="46" presetID="10" presetClass="entr" presetSubtype="0" fill="hold" nodeType="withEffect">
+                                  <p:stCondLst>
+                                    <p:cond delay="0"/>
+                                  </p:stCondLst>
+                                  <p:childTnLst>
+                                    <p:set>
+                                      <p:cBhvr>
+                                        <p:cTn id="47" dur="1" fill="hold">
+                                          <p:stCondLst>
+                                            <p:cond delay="0"/>
+                                          </p:stCondLst>
+                                        </p:cTn>
+                                        <p:tgtEl>
+                                          <p:spTgt spid="26">
+                                            <p:txEl>
+                                              <p:pRg st="10" end="10"/>
+                                            </p:txEl>
+                                          </p:spTgt>
+                                        </p:tgtEl>
+                                        <p:attrNameLst>
+                                          <p:attrName>style.visibility</p:attrName>
+                                        </p:attrNameLst>
+                                      </p:cBhvr>
+                                      <p:to>
+                                        <p:strVal val="visible"/>
+                                      </p:to>
+                                    </p:set>
+                                    <p:animEffect transition="in" filter="fade">
+                                      <p:cBhvr>
+                                        <p:cTn id="48" dur="500"/>
+                                        <p:tgtEl>
+                                          <p:spTgt spid="26">
+                                            <p:txEl>
+                                              <p:pRg st="10" end="10"/>
+                                            </p:txEl>
+                                          </p:spTgt>
+                                        </p:tgtEl>
+                                      </p:cBhvr>
+                                    </p:animEffect>
+                                  </p:childTnLst>
+                                </p:cTn>
+                              </p:par>
+                              <p:par>
+                                <p:cTn id="49" presetID="10" presetClass="entr" presetSubtype="0" fill="hold" nodeType="withEffect">
+                                  <p:stCondLst>
+                                    <p:cond delay="0"/>
+                                  </p:stCondLst>
+                                  <p:childTnLst>
+                                    <p:set>
+                                      <p:cBhvr>
+                                        <p:cTn id="50" dur="1" fill="hold">
+                                          <p:stCondLst>
+                                            <p:cond delay="0"/>
+                                          </p:stCondLst>
+                                        </p:cTn>
+                                        <p:tgtEl>
+                                          <p:spTgt spid="26">
+                                            <p:txEl>
+                                              <p:pRg st="11" end="11"/>
+                                            </p:txEl>
+                                          </p:spTgt>
+                                        </p:tgtEl>
+                                        <p:attrNameLst>
+                                          <p:attrName>style.visibility</p:attrName>
+                                        </p:attrNameLst>
+                                      </p:cBhvr>
+                                      <p:to>
+                                        <p:strVal val="visible"/>
+                                      </p:to>
+                                    </p:set>
+                                    <p:animEffect transition="in" filter="fade">
+                                      <p:cBhvr>
+                                        <p:cTn id="51" dur="500"/>
+                                        <p:tgtEl>
+                                          <p:spTgt spid="26">
+                                            <p:txEl>
+                                              <p:pRg st="11" end="11"/>
+                                            </p:txEl>
+                                          </p:spTgt>
+                                        </p:tgtEl>
+                                      </p:cBhvr>
+                                    </p:animEffect>
+                                  </p:childTnLst>
+                                </p:cTn>
+                              </p:par>
+                              <p:par>
+                                <p:cTn id="52" presetID="10" presetClass="entr" presetSubtype="0" fill="hold" nodeType="withEffect">
+                                  <p:stCondLst>
+                                    <p:cond delay="0"/>
+                                  </p:stCondLst>
+                                  <p:childTnLst>
+                                    <p:set>
+                                      <p:cBhvr>
+                                        <p:cTn id="53" dur="1" fill="hold">
+                                          <p:stCondLst>
+                                            <p:cond delay="0"/>
+                                          </p:stCondLst>
+                                        </p:cTn>
+                                        <p:tgtEl>
+                                          <p:spTgt spid="26">
+                                            <p:txEl>
+                                              <p:pRg st="12" end="12"/>
+                                            </p:txEl>
+                                          </p:spTgt>
+                                        </p:tgtEl>
+                                        <p:attrNameLst>
+                                          <p:attrName>style.visibility</p:attrName>
+                                        </p:attrNameLst>
+                                      </p:cBhvr>
+                                      <p:to>
+                                        <p:strVal val="visible"/>
+                                      </p:to>
+                                    </p:set>
+                                    <p:animEffect transition="in" filter="fade">
+                                      <p:cBhvr>
+                                        <p:cTn id="54" dur="500"/>
+                                        <p:tgtEl>
+                                          <p:spTgt spid="26">
+                                            <p:txEl>
+                                              <p:pRg st="12" end="12"/>
+                                            </p:txEl>
+                                          </p:spTgt>
+                                        </p:tgtEl>
+                                      </p:cBhvr>
+                                    </p:animEffect>
+                                  </p:childTnLst>
+                                </p:cTn>
+                              </p:par>
+                              <p:par>
+                                <p:cTn id="55" presetID="10" presetClass="entr" presetSubtype="0" fill="hold" nodeType="withEffect">
+                                  <p:stCondLst>
+                                    <p:cond delay="0"/>
+                                  </p:stCondLst>
+                                  <p:childTnLst>
+                                    <p:set>
+                                      <p:cBhvr>
+                                        <p:cTn id="56" dur="1" fill="hold">
+                                          <p:stCondLst>
+                                            <p:cond delay="0"/>
+                                          </p:stCondLst>
+                                        </p:cTn>
+                                        <p:tgtEl>
+                                          <p:spTgt spid="26">
+                                            <p:txEl>
+                                              <p:pRg st="13" end="13"/>
+                                            </p:txEl>
+                                          </p:spTgt>
+                                        </p:tgtEl>
+                                        <p:attrNameLst>
+                                          <p:attrName>style.visibility</p:attrName>
+                                        </p:attrNameLst>
+                                      </p:cBhvr>
+                                      <p:to>
+                                        <p:strVal val="visible"/>
+                                      </p:to>
+                                    </p:set>
+                                    <p:animEffect transition="in" filter="fade">
+                                      <p:cBhvr>
+                                        <p:cTn id="57" dur="500"/>
+                                        <p:tgtEl>
+                                          <p:spTgt spid="26">
+                                            <p:txEl>
+                                              <p:pRg st="13" end="13"/>
+                                            </p:txEl>
+                                          </p:spTgt>
+                                        </p:tgtEl>
+                                      </p:cBhvr>
+                                    </p:animEffect>
+                                  </p:childTnLst>
+                                </p:cTn>
+                              </p:par>
+                            </p:childTnLst>
+                          </p:cTn>
+                        </p:par>
+                      </p:childTnLst>
+                    </p:cTn>
+                  </p:par>
+                </p:childTnLst>
+              </p:cTn>
+              <p:prevCondLst>
+                <p:cond evt="onPrev" delay="0">
+                  <p:tgtEl>
+                    <p:sldTgt/>
+                  </p:tgtEl>
+                </p:cond>
+              </p:prevCondLst>
+              <p:nextCondLst>
+                <p:cond evt="onNext" delay="0">
+                  <p:tgtEl>
+                    <p:sldTgt/>
+                  </p:tgtEl>
+                </p:cond>
+              </p:nextCondLst>
+            </p:seq>
+          </p:childTnLst>
+        </p:cTn>
+      </p:par>
+    </p:tnLst>
+    <p:bldLst>
+      <p:bldP spid="4" grpId="0"/>
+      <p:bldP spid="6" grpId="0"/>
+      <p:bldP spid="7" grpId="0"/>
+      <p:bldP spid="8" grpId="0"/>
+    </p:bldLst>
+  </p:timing>
 </p:sld>
 </file>
 
@@ -8262,8 +9151,8 @@
                 <a:solidFill>
                   <a:schemeClr val="bg1"/>
                 </a:solidFill>
-                <a:latin typeface="Kallisto Lined" panose="00000A00000000000000" pitchFamily="50" charset="0"/>
-                <a:ea typeface="MS Gothic" panose="020B0609070205080204" pitchFamily="49" charset="-128"/>
+                <a:latin typeface="Open Sans" panose="020B0606030504020204" pitchFamily="34" charset="0"/>
+                <a:ea typeface="Open Sans" panose="020B0606030504020204" pitchFamily="34" charset="0"/>
                 <a:cs typeface="Open Sans" panose="020B0606030504020204" pitchFamily="34" charset="0"/>
               </a:rPr>
               <a:t> Fragen?</a:t>
@@ -14199,12 +15088,22 @@
             <a:r>
               <a:rPr lang="de-DE" sz="2000" dirty="0">
                 <a:solidFill>
+                  <a:srgbClr val="65AC2A"/>
+                </a:solidFill>
+                <a:latin typeface="Courier New" panose="02070309020205020404" pitchFamily="49" charset="0"/>
+                <a:cs typeface="Courier New" panose="02070309020205020404" pitchFamily="49" charset="0"/>
+              </a:rPr>
+              <a:t>Richtig</a:t>
+            </a:r>
+            <a:r>
+              <a:rPr lang="de-DE" sz="2000" dirty="0">
+                <a:solidFill>
                   <a:srgbClr val="7FD03B"/>
                 </a:solidFill>
                 <a:latin typeface="Courier New" panose="02070309020205020404" pitchFamily="49" charset="0"/>
                 <a:cs typeface="Courier New" panose="02070309020205020404" pitchFamily="49" charset="0"/>
               </a:rPr>
-              <a:t>Richtig:</a:t>
+              <a:t>:</a:t>
             </a:r>
           </a:p>
           <a:p>
@@ -14554,7 +15453,7 @@
                 </a:solidFill>
                 <a:latin typeface="Kallisto Lined" panose="00000A00000000000000" pitchFamily="50" charset="0"/>
               </a:rPr>
-              <a:t>console.log(x + 3)        	            </a:t>
+              <a:t>console.log(x + 3)        	  </a:t>
             </a:r>
             <a:r>
               <a:rPr lang="de-DE" sz="2000" b="1" dirty="0">
@@ -14562,7 +15461,7 @@
                 <a:ea typeface="Open Sans" panose="020B0606030504020204" pitchFamily="34" charset="0"/>
                 <a:cs typeface="Open Sans" panose="020B0606030504020204" pitchFamily="34" charset="0"/>
               </a:rPr>
-              <a:t> 8</a:t>
+              <a:t>8</a:t>
             </a:r>
           </a:p>
         </p:txBody>
@@ -14675,8 +15574,8 @@
         </p:nvSpPr>
         <p:spPr>
           <a:xfrm rot="10800000">
-            <a:off x="5520981" y="3964508"/>
-            <a:ext cx="120650" cy="408754"/>
+            <a:off x="4837293" y="3964508"/>
+            <a:ext cx="132715" cy="408754"/>
           </a:xfrm>
           <a:prstGeom prst="leftBrace">
             <a:avLst>
@@ -14727,7 +15626,7 @@
         </p:nvCxnSpPr>
         <p:spPr>
           <a:xfrm>
-            <a:off x="5898271" y="4180387"/>
+            <a:off x="5235004" y="4180387"/>
             <a:ext cx="406400" cy="0"/>
           </a:xfrm>
           <a:prstGeom prst="straightConnector1">
@@ -16366,7 +17265,9 @@
                 <a:solidFill>
                   <a:srgbClr val="65AC2A"/>
                 </a:solidFill>
-                <a:latin typeface="Kallisto Lined" panose="00000A00000000000000" pitchFamily="50" charset="0"/>
+                <a:latin typeface="Open Sans" panose="020B0606030504020204" pitchFamily="34" charset="0"/>
+                <a:ea typeface="Open Sans" panose="020B0606030504020204" pitchFamily="34" charset="0"/>
+                <a:cs typeface="Open Sans" panose="020B0606030504020204" pitchFamily="34" charset="0"/>
               </a:rPr>
               <a:t>// Fakultät von 1  = 1</a:t>
             </a:r>
@@ -18391,7 +19292,24 @@
                 <a:ea typeface="Open Sans" panose="020B0606030504020204" pitchFamily="34" charset="0"/>
                 <a:cs typeface="Open Sans" panose="020B0606030504020204" pitchFamily="34" charset="0"/>
               </a:rPr>
-              <a:t> mit einander Kombiniert werden</a:t>
+              <a:t> miteinander </a:t>
+            </a:r>
+            <a:r>
+              <a:rPr lang="de-DE" sz="2000" dirty="0">
+                <a:latin typeface="Open Sans" panose="020B0606030504020204" pitchFamily="34" charset="0"/>
+                <a:ea typeface="Open Sans" panose="020B0606030504020204" pitchFamily="34" charset="0"/>
+                <a:cs typeface="Open Sans" panose="020B0606030504020204" pitchFamily="34" charset="0"/>
+              </a:rPr>
+              <a:t>k</a:t>
+            </a:r>
+            <a:r>
+              <a:rPr lang="de-DE" sz="2000" dirty="0">
+                <a:effectLst/>
+                <a:latin typeface="Open Sans" panose="020B0606030504020204" pitchFamily="34" charset="0"/>
+                <a:ea typeface="Open Sans" panose="020B0606030504020204" pitchFamily="34" charset="0"/>
+                <a:cs typeface="Open Sans" panose="020B0606030504020204" pitchFamily="34" charset="0"/>
+              </a:rPr>
+              <a:t>ombiniert werden</a:t>
             </a:r>
           </a:p>
           <a:p>
@@ -19192,7 +20110,7 @@
                 <a:ea typeface="Open Sans" panose="020B0606030504020204" pitchFamily="34" charset="0"/>
                 <a:cs typeface="Open Sans" panose="020B0606030504020204" pitchFamily="34" charset="0"/>
               </a:rPr>
-              <a:t>eeignet für die Erstellung interaktiver Programme (</a:t>
+              <a:t>eeignet für die Erstellung interaktiver Programme </a:t>
             </a:r>
             <a:r>
               <a:rPr lang="de-DE" sz="2000" b="1" dirty="0">
@@ -19201,7 +20119,7 @@
                 <a:ea typeface="Open Sans" panose="020B0606030504020204" pitchFamily="34" charset="0"/>
                 <a:cs typeface="Open Sans" panose="020B0606030504020204" pitchFamily="34" charset="0"/>
               </a:rPr>
-              <a:t>Apps und Spiele)</a:t>
+              <a:t>(Apps und Spiele)</a:t>
             </a:r>
           </a:p>
           <a:p>
@@ -19556,7 +20474,7 @@
         </p:nvSpPr>
         <p:spPr>
           <a:xfrm>
-            <a:off x="2066553" y="4601913"/>
+            <a:off x="2826572" y="4601913"/>
             <a:ext cx="1088760" cy="400110"/>
           </a:xfrm>
           <a:prstGeom prst="rect">
@@ -19600,7 +20518,7 @@
         </p:nvCxnSpPr>
         <p:spPr>
           <a:xfrm>
-            <a:off x="3155313" y="4801968"/>
+            <a:off x="3915332" y="4801968"/>
             <a:ext cx="627736" cy="500137"/>
           </a:xfrm>
           <a:prstGeom prst="curvedConnector2">
@@ -19642,7 +20560,7 @@
         </p:nvSpPr>
         <p:spPr>
           <a:xfrm>
-            <a:off x="3155313" y="5302105"/>
+            <a:off x="3915332" y="5302105"/>
             <a:ext cx="1255472" cy="400110"/>
           </a:xfrm>
           <a:prstGeom prst="rect">
@@ -19682,7 +20600,7 @@
         </p:nvSpPr>
         <p:spPr>
           <a:xfrm>
-            <a:off x="238830" y="5302105"/>
+            <a:off x="998849" y="5302105"/>
             <a:ext cx="2000869" cy="400110"/>
           </a:xfrm>
           <a:prstGeom prst="rect">
@@ -19726,7 +20644,7 @@
         </p:nvCxnSpPr>
         <p:spPr>
           <a:xfrm rot="5400000" flipH="1" flipV="1">
-            <a:off x="1402841" y="4638393"/>
+            <a:off x="2162860" y="4638393"/>
             <a:ext cx="500137" cy="827288"/>
           </a:xfrm>
           <a:prstGeom prst="curvedConnector2">
@@ -19771,7 +20689,7 @@
         </p:nvCxnSpPr>
         <p:spPr>
           <a:xfrm flipH="1">
-            <a:off x="2239699" y="5502160"/>
+            <a:off x="2999718" y="5502160"/>
             <a:ext cx="797270" cy="0"/>
           </a:xfrm>
           <a:prstGeom prst="straightConnector1">
@@ -19813,7 +20731,7 @@
         </p:nvSpPr>
         <p:spPr>
           <a:xfrm>
-            <a:off x="4325228" y="4681635"/>
+            <a:off x="5085247" y="4681635"/>
             <a:ext cx="393913" cy="1270674"/>
           </a:xfrm>
           <a:prstGeom prst="rightBrace">
@@ -19866,7 +20784,7 @@
         </p:nvSpPr>
         <p:spPr>
           <a:xfrm>
-            <a:off x="4731779" y="4898492"/>
+            <a:off x="5491798" y="4898492"/>
             <a:ext cx="2388311" cy="707886"/>
           </a:xfrm>
           <a:prstGeom prst="rect">

</xml_diff>